<commit_message>
readme updated, ppt updated
</commit_message>
<xml_diff>
--- a/Project_3.pptx
+++ b/Project_3.pptx
@@ -16,8 +16,8 @@
     <p:sldId id="318" r:id="rId4"/>
     <p:sldId id="319" r:id="rId5"/>
     <p:sldId id="1457" r:id="rId6"/>
-    <p:sldId id="4274" r:id="rId7"/>
-    <p:sldId id="4275" r:id="rId8"/>
+    <p:sldId id="4275" r:id="rId7"/>
+    <p:sldId id="4274" r:id="rId8"/>
     <p:sldId id="4262" r:id="rId9"/>
     <p:sldId id="4270" r:id="rId10"/>
   </p:sldIdLst>
@@ -2551,7 +2551,7 @@
           <a:p>
             <a:fld id="{BCEF14C7-72B9-1B46-9114-4453611BBF43}" type="slidenum">
               <a:rPr lang="en-US" smtClean="0"/>
-              <a:t>7</a:t>
+              <a:t>6</a:t>
             </a:fld>
             <a:endParaRPr lang="en-US" dirty="0"/>
           </a:p>
@@ -18991,122 +18991,6 @@
       </p:sp>
       <p:sp>
         <p:nvSpPr>
-          <p:cNvPr id="4" name="Content Placeholder 3">
-            <a:extLst>
-              <a:ext uri="{FF2B5EF4-FFF2-40B4-BE49-F238E27FC236}">
-                <a16:creationId xmlns:a16="http://schemas.microsoft.com/office/drawing/2014/main" id="{9A51B892-AA72-40B9-AC8A-05BE64B0217E}"/>
-              </a:ext>
-            </a:extLst>
-          </p:cNvPr>
-          <p:cNvSpPr>
-            <a:spLocks noGrp="1"/>
-          </p:cNvSpPr>
-          <p:nvPr>
-            <p:ph sz="quarter" idx="13"/>
-          </p:nvPr>
-        </p:nvSpPr>
-        <p:spPr/>
-        <p:txBody>
-          <a:bodyPr/>
-          <a:lstStyle/>
-          <a:p>
-            <a:endParaRPr lang="en-US" dirty="0"/>
-          </a:p>
-        </p:txBody>
-      </p:sp>
-      <p:sp>
-        <p:nvSpPr>
-          <p:cNvPr id="5" name="Title 4">
-            <a:extLst>
-              <a:ext uri="{FF2B5EF4-FFF2-40B4-BE49-F238E27FC236}">
-                <a16:creationId xmlns:a16="http://schemas.microsoft.com/office/drawing/2014/main" id="{045B8B9F-D6E0-40D0-804E-1512F318E5AD}"/>
-              </a:ext>
-            </a:extLst>
-          </p:cNvPr>
-          <p:cNvSpPr>
-            <a:spLocks noGrp="1"/>
-          </p:cNvSpPr>
-          <p:nvPr>
-            <p:ph type="title"/>
-          </p:nvPr>
-        </p:nvSpPr>
-        <p:spPr/>
-        <p:txBody>
-          <a:bodyPr/>
-          <a:lstStyle/>
-          <a:p>
-            <a:r>
-              <a:rPr lang="en-US" dirty="0"/>
-              <a:t>Placeholder – Visualizing the Data</a:t>
-            </a:r>
-          </a:p>
-        </p:txBody>
-      </p:sp>
-    </p:spTree>
-    <p:extLst>
-      <p:ext uri="{BB962C8B-B14F-4D97-AF65-F5344CB8AC3E}">
-        <p14:creationId xmlns:p14="http://schemas.microsoft.com/office/powerpoint/2010/main" val="3552195715"/>
-      </p:ext>
-    </p:extLst>
-  </p:cSld>
-  <p:clrMapOvr>
-    <a:masterClrMapping/>
-  </p:clrMapOvr>
-  <p:transition>
-    <p:fade/>
-  </p:transition>
-</p:sld>
-</file>
-
-<file path=ppt/slides/slide7.xml><?xml version="1.0" encoding="utf-8"?>
-<p:sld xmlns:a="http://schemas.openxmlformats.org/drawingml/2006/main" xmlns:r="http://schemas.openxmlformats.org/officeDocument/2006/relationships" xmlns:p="http://schemas.openxmlformats.org/presentationml/2006/main">
-  <p:cSld>
-    <p:spTree>
-      <p:nvGrpSpPr>
-        <p:cNvPr id="1" name=""/>
-        <p:cNvGrpSpPr/>
-        <p:nvPr/>
-      </p:nvGrpSpPr>
-      <p:grpSpPr>
-        <a:xfrm>
-          <a:off x="0" y="0"/>
-          <a:ext cx="0" cy="0"/>
-          <a:chOff x="0" y="0"/>
-          <a:chExt cx="0" cy="0"/>
-        </a:xfrm>
-      </p:grpSpPr>
-      <p:sp>
-        <p:nvSpPr>
-          <p:cNvPr id="3" name="Slide Number Placeholder 2">
-            <a:extLst>
-              <a:ext uri="{FF2B5EF4-FFF2-40B4-BE49-F238E27FC236}">
-                <a16:creationId xmlns:a16="http://schemas.microsoft.com/office/drawing/2014/main" id="{768D8E60-FE2B-45AF-ABB4-232B2C4BF43A}"/>
-              </a:ext>
-            </a:extLst>
-          </p:cNvPr>
-          <p:cNvSpPr>
-            <a:spLocks noGrp="1"/>
-          </p:cNvSpPr>
-          <p:nvPr>
-            <p:ph type="sldNum" sz="quarter" idx="16"/>
-          </p:nvPr>
-        </p:nvSpPr>
-        <p:spPr/>
-        <p:txBody>
-          <a:bodyPr/>
-          <a:lstStyle/>
-          <a:p>
-            <a:fld id="{34971C27-C87E-45F4-8EEB-007BFB32C23B}" type="slidenum">
-              <a:rPr lang="en-US" smtClean="0"/>
-              <a:pPr/>
-              <a:t>7</a:t>
-            </a:fld>
-            <a:endParaRPr lang="en-US" dirty="0"/>
-          </a:p>
-        </p:txBody>
-      </p:sp>
-      <p:sp>
-        <p:nvSpPr>
           <p:cNvPr id="5" name="Title 4">
             <a:extLst>
               <a:ext uri="{FF2B5EF4-FFF2-40B4-BE49-F238E27FC236}">
@@ -19148,14 +19032,14 @@
           <p:nvPr>
             <p:extLst>
               <p:ext uri="{D42A27DB-BD31-4B8C-83A1-F6EECF244321}">
-                <p14:modId xmlns:p14="http://schemas.microsoft.com/office/powerpoint/2010/main" val="686955626"/>
+                <p14:modId xmlns:p14="http://schemas.microsoft.com/office/powerpoint/2010/main" val="4224405646"/>
               </p:ext>
             </p:extLst>
           </p:nvPr>
         </p:nvGraphicFramePr>
         <p:xfrm>
-          <a:off x="357351" y="1573874"/>
-          <a:ext cx="6188619" cy="1855126"/>
+          <a:off x="357352" y="1573874"/>
+          <a:ext cx="4653921" cy="1744834"/>
         </p:xfrm>
         <a:graphic>
           <a:graphicData uri="http://schemas.openxmlformats.org/drawingml/2006/table">
@@ -19164,21 +19048,21 @@
                 <a:tableStyleId>{5C22544A-7EE6-4342-B048-85BDC9FD1C3A}</a:tableStyleId>
               </a:tblPr>
               <a:tblGrid>
-                <a:gridCol w="2062873">
+                <a:gridCol w="1551307">
                   <a:extLst>
                     <a:ext uri="{9D8B030D-6E8A-4147-A177-3AD203B41FA5}">
                       <a16:colId xmlns:a16="http://schemas.microsoft.com/office/drawing/2014/main" val="1856198662"/>
                     </a:ext>
                   </a:extLst>
                 </a:gridCol>
-                <a:gridCol w="2062873">
+                <a:gridCol w="1551307">
                   <a:extLst>
                     <a:ext uri="{9D8B030D-6E8A-4147-A177-3AD203B41FA5}">
                       <a16:colId xmlns:a16="http://schemas.microsoft.com/office/drawing/2014/main" val="1943932598"/>
                     </a:ext>
                   </a:extLst>
                 </a:gridCol>
-                <a:gridCol w="2062873">
+                <a:gridCol w="1551307">
                   <a:extLst>
                     <a:ext uri="{9D8B030D-6E8A-4147-A177-3AD203B41FA5}">
                       <a16:colId xmlns:a16="http://schemas.microsoft.com/office/drawing/2014/main" val="4253247503"/>
@@ -19186,14 +19070,14 @@
                   </a:extLst>
                 </a:gridCol>
               </a:tblGrid>
-              <a:tr h="574966">
+              <a:tr h="523564">
                 <a:tc>
                   <a:txBody>
                     <a:bodyPr/>
                     <a:lstStyle/>
                     <a:p>
                       <a:pPr algn="ctr"/>
-                      <a:endParaRPr lang="en-US" dirty="0"/>
+                      <a:endParaRPr lang="en-US" sz="1600" dirty="0"/>
                     </a:p>
                   </a:txBody>
                   <a:tcPr>
@@ -19209,7 +19093,7 @@
                     <a:p>
                       <a:pPr algn="ctr"/>
                       <a:r>
-                        <a:rPr lang="en-US" dirty="0"/>
+                        <a:rPr lang="en-US" sz="1600" dirty="0"/>
                         <a:t>Actual Resubmit</a:t>
                       </a:r>
                     </a:p>
@@ -19223,7 +19107,7 @@
                     <a:p>
                       <a:pPr algn="ctr"/>
                       <a:r>
-                        <a:rPr lang="en-US" dirty="0"/>
+                        <a:rPr lang="en-US" sz="1600" dirty="0"/>
                         <a:t>Actual Write Off</a:t>
                       </a:r>
                     </a:p>
@@ -19236,7 +19120,7 @@
                   </a:ext>
                 </a:extLst>
               </a:tr>
-              <a:tr h="607743">
+              <a:tr h="582857">
                 <a:tc>
                   <a:txBody>
                     <a:bodyPr/>
@@ -19244,7 +19128,7 @@
                     <a:p>
                       <a:pPr marL="0" algn="ctr" defTabSz="914400" rtl="0" eaLnBrk="1" latinLnBrk="0" hangingPunct="1"/>
                       <a:r>
-                        <a:rPr lang="en-US" sz="1800" b="1" kern="1200" dirty="0">
+                        <a:rPr lang="en-US" sz="1600" b="1" kern="1200" dirty="0">
                           <a:solidFill>
                             <a:schemeClr val="lt1"/>
                           </a:solidFill>
@@ -19269,7 +19153,7 @@
                     <a:p>
                       <a:pPr algn="ctr"/>
                       <a:r>
-                        <a:rPr lang="en-US" dirty="0"/>
+                        <a:rPr lang="en-US" sz="1600" dirty="0"/>
                         <a:t>8,663</a:t>
                       </a:r>
                     </a:p>
@@ -19283,7 +19167,7 @@
                     <a:p>
                       <a:pPr algn="ctr"/>
                       <a:r>
-                        <a:rPr lang="en-US" dirty="0"/>
+                        <a:rPr lang="en-US" sz="1600" dirty="0"/>
                         <a:t>415</a:t>
                       </a:r>
                     </a:p>
@@ -19296,7 +19180,7 @@
                   </a:ext>
                 </a:extLst>
               </a:tr>
-              <a:tr h="607743">
+              <a:tr h="582857">
                 <a:tc>
                   <a:txBody>
                     <a:bodyPr/>
@@ -19304,7 +19188,7 @@
                     <a:p>
                       <a:pPr marL="0" algn="ctr" defTabSz="914400" rtl="0" eaLnBrk="1" latinLnBrk="0" hangingPunct="1"/>
                       <a:r>
-                        <a:rPr lang="en-US" sz="1800" b="1" kern="1200" dirty="0">
+                        <a:rPr lang="en-US" sz="1600" b="1" kern="1200" dirty="0">
                           <a:solidFill>
                             <a:schemeClr val="lt1"/>
                           </a:solidFill>
@@ -19329,7 +19213,7 @@
                     <a:p>
                       <a:pPr algn="ctr"/>
                       <a:r>
-                        <a:rPr lang="en-US" dirty="0"/>
+                        <a:rPr lang="en-US" sz="1600" dirty="0"/>
                         <a:t>426</a:t>
                       </a:r>
                     </a:p>
@@ -19343,7 +19227,7 @@
                     <a:p>
                       <a:pPr algn="ctr"/>
                       <a:r>
-                        <a:rPr lang="en-US" dirty="0"/>
+                        <a:rPr lang="en-US" sz="1600" dirty="0"/>
                         <a:t>4,596</a:t>
                       </a:r>
                     </a:p>
@@ -19375,14 +19259,14 @@
           <p:nvPr>
             <p:extLst>
               <p:ext uri="{D42A27DB-BD31-4B8C-83A1-F6EECF244321}">
-                <p14:modId xmlns:p14="http://schemas.microsoft.com/office/powerpoint/2010/main" val="1156196865"/>
+                <p14:modId xmlns:p14="http://schemas.microsoft.com/office/powerpoint/2010/main" val="1771435160"/>
               </p:ext>
             </p:extLst>
           </p:nvPr>
         </p:nvGraphicFramePr>
         <p:xfrm>
-          <a:off x="357350" y="3837276"/>
-          <a:ext cx="6188620" cy="2398195"/>
+          <a:off x="357348" y="3837276"/>
+          <a:ext cx="5461939" cy="2553298"/>
         </p:xfrm>
         <a:graphic>
           <a:graphicData uri="http://schemas.openxmlformats.org/drawingml/2006/table">
@@ -19391,35 +19275,35 @@
                 <a:tableStyleId>{5C22544A-7EE6-4342-B048-85BDC9FD1C3A}</a:tableStyleId>
               </a:tblPr>
               <a:tblGrid>
-                <a:gridCol w="1237724">
+                <a:gridCol w="1165543">
                   <a:extLst>
                     <a:ext uri="{9D8B030D-6E8A-4147-A177-3AD203B41FA5}">
                       <a16:colId xmlns:a16="http://schemas.microsoft.com/office/drawing/2014/main" val="1856198662"/>
                     </a:ext>
                   </a:extLst>
                 </a:gridCol>
-                <a:gridCol w="1237724">
+                <a:gridCol w="1154430">
                   <a:extLst>
                     <a:ext uri="{9D8B030D-6E8A-4147-A177-3AD203B41FA5}">
                       <a16:colId xmlns:a16="http://schemas.microsoft.com/office/drawing/2014/main" val="1943932598"/>
                     </a:ext>
                   </a:extLst>
                 </a:gridCol>
-                <a:gridCol w="1237724">
+                <a:gridCol w="838517">
                   <a:extLst>
                     <a:ext uri="{9D8B030D-6E8A-4147-A177-3AD203B41FA5}">
                       <a16:colId xmlns:a16="http://schemas.microsoft.com/office/drawing/2014/main" val="4253247503"/>
                     </a:ext>
                   </a:extLst>
                 </a:gridCol>
-                <a:gridCol w="1237724">
+                <a:gridCol w="1130617">
                   <a:extLst>
                     <a:ext uri="{9D8B030D-6E8A-4147-A177-3AD203B41FA5}">
                       <a16:colId xmlns:a16="http://schemas.microsoft.com/office/drawing/2014/main" val="2296049458"/>
                     </a:ext>
                   </a:extLst>
                 </a:gridCol>
-                <a:gridCol w="1237724">
+                <a:gridCol w="1172832">
                   <a:extLst>
                     <a:ext uri="{9D8B030D-6E8A-4147-A177-3AD203B41FA5}">
                       <a16:colId xmlns:a16="http://schemas.microsoft.com/office/drawing/2014/main" val="1057586314"/>
@@ -19427,14 +19311,14 @@
                   </a:extLst>
                 </a:gridCol>
               </a:tblGrid>
-              <a:tr h="574966">
+              <a:tr h="601067">
                 <a:tc>
                   <a:txBody>
                     <a:bodyPr/>
                     <a:lstStyle/>
                     <a:p>
                       <a:pPr algn="ctr"/>
-                      <a:endParaRPr lang="en-US" dirty="0"/>
+                      <a:endParaRPr lang="en-US" sz="1600" dirty="0"/>
                     </a:p>
                   </a:txBody>
                   <a:tcPr>
@@ -19450,7 +19334,7 @@
                     <a:p>
                       <a:pPr algn="ctr"/>
                       <a:r>
-                        <a:rPr lang="en-US" dirty="0"/>
+                        <a:rPr lang="en-US" sz="1600" dirty="0"/>
                         <a:t>Precision</a:t>
                       </a:r>
                     </a:p>
@@ -19464,7 +19348,7 @@
                     <a:p>
                       <a:pPr algn="ctr"/>
                       <a:r>
-                        <a:rPr lang="en-US" dirty="0"/>
+                        <a:rPr lang="en-US" sz="1600" dirty="0"/>
                         <a:t>Recall</a:t>
                       </a:r>
                     </a:p>
@@ -19478,7 +19362,7 @@
                     <a:p>
                       <a:pPr algn="ctr"/>
                       <a:r>
-                        <a:rPr lang="en-US" dirty="0"/>
+                        <a:rPr lang="en-US" sz="1600" dirty="0"/>
                         <a:t>F1–score</a:t>
                       </a:r>
                     </a:p>
@@ -19492,7 +19376,7 @@
                     <a:p>
                       <a:pPr algn="ctr"/>
                       <a:r>
-                        <a:rPr lang="en-US" dirty="0"/>
+                        <a:rPr lang="en-US" sz="1600" dirty="0"/>
                         <a:t>Support</a:t>
                       </a:r>
                     </a:p>
@@ -19505,7 +19389,7 @@
                   </a:ext>
                 </a:extLst>
               </a:tr>
-              <a:tr h="607743">
+              <a:tr h="681567">
                 <a:tc>
                   <a:txBody>
                     <a:bodyPr/>
@@ -19513,7 +19397,7 @@
                     <a:p>
                       <a:pPr marL="0" algn="ctr" defTabSz="914400" rtl="0" eaLnBrk="1" latinLnBrk="0" hangingPunct="1"/>
                       <a:r>
-                        <a:rPr lang="en-US" sz="1800" b="1" kern="1200" dirty="0">
+                        <a:rPr lang="en-US" sz="1600" b="1" kern="1200" dirty="0">
                           <a:solidFill>
                             <a:schemeClr val="lt1"/>
                           </a:solidFill>
@@ -19538,7 +19422,7 @@
                     <a:p>
                       <a:pPr algn="ctr"/>
                       <a:r>
-                        <a:rPr lang="en-US" dirty="0"/>
+                        <a:rPr lang="en-US" sz="1600" dirty="0"/>
                         <a:t>0.95</a:t>
                       </a:r>
                     </a:p>
@@ -19552,7 +19436,7 @@
                     <a:p>
                       <a:pPr algn="ctr"/>
                       <a:r>
-                        <a:rPr lang="en-US" dirty="0"/>
+                        <a:rPr lang="en-US" sz="1600" dirty="0"/>
                         <a:t>0.95</a:t>
                       </a:r>
                     </a:p>
@@ -19566,7 +19450,7 @@
                     <a:p>
                       <a:pPr algn="ctr"/>
                       <a:r>
-                        <a:rPr lang="en-US" dirty="0"/>
+                        <a:rPr lang="en-US" sz="1600" dirty="0"/>
                         <a:t>0.95</a:t>
                       </a:r>
                     </a:p>
@@ -19580,7 +19464,7 @@
                     <a:p>
                       <a:pPr algn="ctr"/>
                       <a:r>
-                        <a:rPr lang="en-US" dirty="0"/>
+                        <a:rPr lang="en-US" sz="1600" dirty="0"/>
                         <a:t>9,078</a:t>
                       </a:r>
                     </a:p>
@@ -19593,7 +19477,7 @@
                   </a:ext>
                 </a:extLst>
               </a:tr>
-              <a:tr h="607743">
+              <a:tr h="635332">
                 <a:tc>
                   <a:txBody>
                     <a:bodyPr/>
@@ -19601,7 +19485,7 @@
                     <a:p>
                       <a:pPr marL="0" algn="ctr" defTabSz="914400" rtl="0" eaLnBrk="1" latinLnBrk="0" hangingPunct="1"/>
                       <a:r>
-                        <a:rPr lang="en-US" sz="1800" b="1" kern="1200" dirty="0">
+                        <a:rPr lang="en-US" sz="1600" b="1" kern="1200" dirty="0">
                           <a:solidFill>
                             <a:schemeClr val="lt1"/>
                           </a:solidFill>
@@ -19626,7 +19510,7 @@
                     <a:p>
                       <a:pPr algn="ctr"/>
                       <a:r>
-                        <a:rPr lang="en-US" dirty="0"/>
+                        <a:rPr lang="en-US" sz="1600" dirty="0"/>
                         <a:t>0.92</a:t>
                       </a:r>
                     </a:p>
@@ -19640,7 +19524,7 @@
                     <a:p>
                       <a:pPr algn="ctr"/>
                       <a:r>
-                        <a:rPr lang="en-US" dirty="0"/>
+                        <a:rPr lang="en-US" sz="1600" dirty="0"/>
                         <a:t>0.92</a:t>
                       </a:r>
                     </a:p>
@@ -19654,7 +19538,7 @@
                     <a:p>
                       <a:pPr algn="ctr"/>
                       <a:r>
-                        <a:rPr lang="en-US" dirty="0"/>
+                        <a:rPr lang="en-US" sz="1600" dirty="0"/>
                         <a:t>0.92</a:t>
                       </a:r>
                     </a:p>
@@ -19668,7 +19552,7 @@
                     <a:p>
                       <a:pPr algn="ctr"/>
                       <a:r>
-                        <a:rPr lang="en-US" dirty="0"/>
+                        <a:rPr lang="en-US" sz="1600" dirty="0"/>
                         <a:t>5,022</a:t>
                       </a:r>
                     </a:p>
@@ -19681,7 +19565,7 @@
                   </a:ext>
                 </a:extLst>
               </a:tr>
-              <a:tr h="607743">
+              <a:tr h="635332">
                 <a:tc>
                   <a:txBody>
                     <a:bodyPr/>
@@ -19689,7 +19573,7 @@
                     <a:p>
                       <a:pPr marL="0" algn="ctr" defTabSz="914400" rtl="0" eaLnBrk="1" latinLnBrk="0" hangingPunct="1"/>
                       <a:r>
-                        <a:rPr lang="en-US" sz="1800" b="1" kern="1200" dirty="0">
+                        <a:rPr lang="en-US" sz="1600" b="1" kern="1200" dirty="0">
                           <a:solidFill>
                             <a:schemeClr val="lt1"/>
                           </a:solidFill>
@@ -19713,7 +19597,7 @@
                     <a:lstStyle/>
                     <a:p>
                       <a:pPr algn="ctr"/>
-                      <a:endParaRPr lang="en-US" dirty="0"/>
+                      <a:endParaRPr lang="en-US" sz="1600" dirty="0"/>
                     </a:p>
                   </a:txBody>
                   <a:tcPr/>
@@ -19724,7 +19608,7 @@
                     <a:lstStyle/>
                     <a:p>
                       <a:pPr algn="ctr"/>
-                      <a:endParaRPr lang="en-US" dirty="0"/>
+                      <a:endParaRPr lang="en-US" sz="1600" dirty="0"/>
                     </a:p>
                   </a:txBody>
                   <a:tcPr/>
@@ -19736,7 +19620,7 @@
                     <a:p>
                       <a:pPr algn="ctr"/>
                       <a:r>
-                        <a:rPr lang="en-US" dirty="0"/>
+                        <a:rPr lang="en-US" sz="1600" dirty="0"/>
                         <a:t>0.94</a:t>
                       </a:r>
                     </a:p>
@@ -19750,7 +19634,7 @@
                     <a:p>
                       <a:pPr algn="ctr"/>
                       <a:r>
-                        <a:rPr lang="en-US" dirty="0"/>
+                        <a:rPr lang="en-US" sz="1600" dirty="0"/>
                         <a:t>14,100</a:t>
                       </a:r>
                     </a:p>
@@ -19781,7 +19665,7 @@
         </p:nvSpPr>
         <p:spPr>
           <a:xfrm>
-            <a:off x="6687671" y="3837276"/>
+            <a:off x="6275294" y="4036014"/>
             <a:ext cx="3720353" cy="2308324"/>
           </a:xfrm>
           <a:prstGeom prst="rect">
@@ -19924,10 +19808,156 @@
           </a:p>
         </p:txBody>
       </p:sp>
+      <p:pic>
+        <p:nvPicPr>
+          <p:cNvPr id="7" name="Picture 6">
+            <a:extLst>
+              <a:ext uri="{FF2B5EF4-FFF2-40B4-BE49-F238E27FC236}">
+                <a16:creationId xmlns:a16="http://schemas.microsoft.com/office/drawing/2014/main" id="{999099BE-00C9-4DF4-979B-8D2BC2F2C24D}"/>
+              </a:ext>
+            </a:extLst>
+          </p:cNvPr>
+          <p:cNvPicPr>
+            <a:picLocks noChangeAspect="1"/>
+          </p:cNvPicPr>
+          <p:nvPr/>
+        </p:nvPicPr>
+        <p:blipFill>
+          <a:blip r:embed="rId3"/>
+          <a:stretch>
+            <a:fillRect/>
+          </a:stretch>
+        </p:blipFill>
+        <p:spPr>
+          <a:xfrm>
+            <a:off x="5243233" y="1305269"/>
+            <a:ext cx="6419850" cy="2457450"/>
+          </a:xfrm>
+          <a:prstGeom prst="rect">
+            <a:avLst/>
+          </a:prstGeom>
+        </p:spPr>
+      </p:pic>
     </p:spTree>
     <p:extLst>
       <p:ext uri="{BB962C8B-B14F-4D97-AF65-F5344CB8AC3E}">
         <p14:creationId xmlns:p14="http://schemas.microsoft.com/office/powerpoint/2010/main" val="3749372390"/>
+      </p:ext>
+    </p:extLst>
+  </p:cSld>
+  <p:clrMapOvr>
+    <a:masterClrMapping/>
+  </p:clrMapOvr>
+  <p:transition>
+    <p:fade/>
+  </p:transition>
+</p:sld>
+</file>
+
+<file path=ppt/slides/slide7.xml><?xml version="1.0" encoding="utf-8"?>
+<p:sld xmlns:a="http://schemas.openxmlformats.org/drawingml/2006/main" xmlns:r="http://schemas.openxmlformats.org/officeDocument/2006/relationships" xmlns:p="http://schemas.openxmlformats.org/presentationml/2006/main">
+  <p:cSld>
+    <p:spTree>
+      <p:nvGrpSpPr>
+        <p:cNvPr id="1" name=""/>
+        <p:cNvGrpSpPr/>
+        <p:nvPr/>
+      </p:nvGrpSpPr>
+      <p:grpSpPr>
+        <a:xfrm>
+          <a:off x="0" y="0"/>
+          <a:ext cx="0" cy="0"/>
+          <a:chOff x="0" y="0"/>
+          <a:chExt cx="0" cy="0"/>
+        </a:xfrm>
+      </p:grpSpPr>
+      <p:sp>
+        <p:nvSpPr>
+          <p:cNvPr id="3" name="Slide Number Placeholder 2">
+            <a:extLst>
+              <a:ext uri="{FF2B5EF4-FFF2-40B4-BE49-F238E27FC236}">
+                <a16:creationId xmlns:a16="http://schemas.microsoft.com/office/drawing/2014/main" id="{768D8E60-FE2B-45AF-ABB4-232B2C4BF43A}"/>
+              </a:ext>
+            </a:extLst>
+          </p:cNvPr>
+          <p:cNvSpPr>
+            <a:spLocks noGrp="1"/>
+          </p:cNvSpPr>
+          <p:nvPr>
+            <p:ph type="sldNum" sz="quarter" idx="16"/>
+          </p:nvPr>
+        </p:nvSpPr>
+        <p:spPr/>
+        <p:txBody>
+          <a:bodyPr/>
+          <a:lstStyle/>
+          <a:p>
+            <a:fld id="{34971C27-C87E-45F4-8EEB-007BFB32C23B}" type="slidenum">
+              <a:rPr lang="en-US" smtClean="0"/>
+              <a:pPr/>
+              <a:t>7</a:t>
+            </a:fld>
+            <a:endParaRPr lang="en-US" dirty="0"/>
+          </a:p>
+        </p:txBody>
+      </p:sp>
+      <p:sp>
+        <p:nvSpPr>
+          <p:cNvPr id="4" name="Content Placeholder 3">
+            <a:extLst>
+              <a:ext uri="{FF2B5EF4-FFF2-40B4-BE49-F238E27FC236}">
+                <a16:creationId xmlns:a16="http://schemas.microsoft.com/office/drawing/2014/main" id="{9A51B892-AA72-40B9-AC8A-05BE64B0217E}"/>
+              </a:ext>
+            </a:extLst>
+          </p:cNvPr>
+          <p:cNvSpPr>
+            <a:spLocks noGrp="1"/>
+          </p:cNvSpPr>
+          <p:nvPr>
+            <p:ph sz="quarter" idx="13"/>
+          </p:nvPr>
+        </p:nvSpPr>
+        <p:spPr/>
+        <p:txBody>
+          <a:bodyPr/>
+          <a:lstStyle/>
+          <a:p>
+            <a:endParaRPr lang="en-US" dirty="0"/>
+          </a:p>
+        </p:txBody>
+      </p:sp>
+      <p:sp>
+        <p:nvSpPr>
+          <p:cNvPr id="5" name="Title 4">
+            <a:extLst>
+              <a:ext uri="{FF2B5EF4-FFF2-40B4-BE49-F238E27FC236}">
+                <a16:creationId xmlns:a16="http://schemas.microsoft.com/office/drawing/2014/main" id="{045B8B9F-D6E0-40D0-804E-1512F318E5AD}"/>
+              </a:ext>
+            </a:extLst>
+          </p:cNvPr>
+          <p:cNvSpPr>
+            <a:spLocks noGrp="1"/>
+          </p:cNvSpPr>
+          <p:nvPr>
+            <p:ph type="title"/>
+          </p:nvPr>
+        </p:nvSpPr>
+        <p:spPr/>
+        <p:txBody>
+          <a:bodyPr/>
+          <a:lstStyle/>
+          <a:p>
+            <a:r>
+              <a:rPr lang="en-US" dirty="0"/>
+              <a:t>Placeholder – Visualizing the Data</a:t>
+            </a:r>
+          </a:p>
+        </p:txBody>
+      </p:sp>
+    </p:spTree>
+    <p:extLst>
+      <p:ext uri="{BB962C8B-B14F-4D97-AF65-F5344CB8AC3E}">
+        <p14:creationId xmlns:p14="http://schemas.microsoft.com/office/powerpoint/2010/main" val="3552195715"/>
       </p:ext>
     </p:extLst>
   </p:cSld>
@@ -20046,6 +20076,17 @@
             <a:r>
               <a:rPr lang="en-US" dirty="0"/>
               <a:t>Apply these visualizations and models to other business units (one of four represented)</a:t>
+            </a:r>
+          </a:p>
+          <a:p>
+            <a:pPr>
+              <a:spcAft>
+                <a:spcPts val="1200"/>
+              </a:spcAft>
+            </a:pPr>
+            <a:r>
+              <a:rPr lang="en-US" dirty="0"/>
+              <a:t>Apply across different time horizons to see if model accuracy remains high</a:t>
             </a:r>
           </a:p>
           <a:p>

</xml_diff>

<commit_message>
3rd and final iteration of random forest classifier added. more parsimonious
</commit_message>
<xml_diff>
--- a/Project_3.pptx
+++ b/Project_3.pptx
@@ -2480,8 +2480,13 @@
             </a:pPr>
             <a:r>
               <a:rPr lang="en-US" sz="1000" dirty="0"/>
-              <a:t>Used feature importance </a:t>
-            </a:r>
+              <a:t>Used feature importance to keep </a:t>
+            </a:r>
+            <a:r>
+              <a:rPr lang="en-US" sz="1000"/>
+              <a:t>scaling down</a:t>
+            </a:r>
+            <a:endParaRPr lang="en-US" sz="1000" dirty="0"/>
           </a:p>
           <a:p>
             <a:endParaRPr lang="en-US" dirty="0"/>
@@ -2505,7 +2510,7 @@
           <a:p>
             <a:fld id="{58B8B8CD-F4D7-423F-966E-8A058DF60DFE}" type="datetime1">
               <a:rPr lang="en-US" smtClean="0"/>
-              <a:t>4/21/2021</a:t>
+              <a:t>4/24/2021</a:t>
             </a:fld>
             <a:endParaRPr lang="en-US" dirty="0"/>
           </a:p>
@@ -7566,226 +7571,6 @@
 </file>
 
 <file path=ppt/slideLayouts/slideLayout24.xml><?xml version="1.0" encoding="utf-8"?>
-<p:sldLayout xmlns:a="http://schemas.openxmlformats.org/drawingml/2006/main" xmlns:r="http://schemas.openxmlformats.org/officeDocument/2006/relationships" xmlns:p="http://schemas.openxmlformats.org/presentationml/2006/main" type="twoObj">
-  <p:cSld name="1_Two Content">
-    <p:spTree>
-      <p:nvGrpSpPr>
-        <p:cNvPr id="1" name=""/>
-        <p:cNvGrpSpPr/>
-        <p:nvPr/>
-      </p:nvGrpSpPr>
-      <p:grpSpPr>
-        <a:xfrm>
-          <a:off x="0" y="0"/>
-          <a:ext cx="0" cy="0"/>
-          <a:chOff x="0" y="0"/>
-          <a:chExt cx="0" cy="0"/>
-        </a:xfrm>
-      </p:grpSpPr>
-      <p:sp>
-        <p:nvSpPr>
-          <p:cNvPr id="2" name="Title 1"/>
-          <p:cNvSpPr>
-            <a:spLocks noGrp="1"/>
-          </p:cNvSpPr>
-          <p:nvPr>
-            <p:ph type="title"/>
-          </p:nvPr>
-        </p:nvSpPr>
-        <p:spPr/>
-        <p:txBody>
-          <a:bodyPr/>
-          <a:lstStyle/>
-          <a:p>
-            <a:r>
-              <a:rPr lang="en-US"/>
-              <a:t>Click to edit Master title style</a:t>
-            </a:r>
-          </a:p>
-        </p:txBody>
-      </p:sp>
-      <p:sp>
-        <p:nvSpPr>
-          <p:cNvPr id="3" name="Content Placeholder 2"/>
-          <p:cNvSpPr>
-            <a:spLocks noGrp="1"/>
-          </p:cNvSpPr>
-          <p:nvPr>
-            <p:ph sz="half" idx="1"/>
-          </p:nvPr>
-        </p:nvSpPr>
-        <p:spPr>
-          <a:xfrm>
-            <a:off x="304800" y="1274764"/>
-            <a:ext cx="5689600" cy="5240337"/>
-          </a:xfrm>
-        </p:spPr>
-        <p:txBody>
-          <a:bodyPr/>
-          <a:lstStyle>
-            <a:lvl1pPr>
-              <a:defRPr sz="3214"/>
-            </a:lvl1pPr>
-            <a:lvl2pPr>
-              <a:defRPr sz="2755"/>
-            </a:lvl2pPr>
-            <a:lvl3pPr>
-              <a:defRPr sz="2296"/>
-            </a:lvl3pPr>
-            <a:lvl4pPr>
-              <a:defRPr sz="2112"/>
-            </a:lvl4pPr>
-            <a:lvl5pPr>
-              <a:defRPr sz="2112"/>
-            </a:lvl5pPr>
-            <a:lvl6pPr>
-              <a:defRPr sz="2112"/>
-            </a:lvl6pPr>
-            <a:lvl7pPr>
-              <a:defRPr sz="2112"/>
-            </a:lvl7pPr>
-            <a:lvl8pPr>
-              <a:defRPr sz="2112"/>
-            </a:lvl8pPr>
-            <a:lvl9pPr>
-              <a:defRPr sz="2112"/>
-            </a:lvl9pPr>
-          </a:lstStyle>
-          <a:p>
-            <a:pPr lvl="0"/>
-            <a:r>
-              <a:rPr lang="en-US"/>
-              <a:t>Click to edit Master text styles</a:t>
-            </a:r>
-          </a:p>
-          <a:p>
-            <a:pPr lvl="1"/>
-            <a:r>
-              <a:rPr lang="en-US"/>
-              <a:t>Second level</a:t>
-            </a:r>
-          </a:p>
-          <a:p>
-            <a:pPr lvl="2"/>
-            <a:r>
-              <a:rPr lang="en-US"/>
-              <a:t>Third level</a:t>
-            </a:r>
-          </a:p>
-          <a:p>
-            <a:pPr lvl="3"/>
-            <a:r>
-              <a:rPr lang="en-US"/>
-              <a:t>Fourth level</a:t>
-            </a:r>
-          </a:p>
-          <a:p>
-            <a:pPr lvl="4"/>
-            <a:r>
-              <a:rPr lang="en-US"/>
-              <a:t>Fifth level</a:t>
-            </a:r>
-          </a:p>
-        </p:txBody>
-      </p:sp>
-      <p:sp>
-        <p:nvSpPr>
-          <p:cNvPr id="4" name="Content Placeholder 3"/>
-          <p:cNvSpPr>
-            <a:spLocks noGrp="1"/>
-          </p:cNvSpPr>
-          <p:nvPr>
-            <p:ph sz="half" idx="2"/>
-          </p:nvPr>
-        </p:nvSpPr>
-        <p:spPr>
-          <a:xfrm>
-            <a:off x="6197600" y="1274764"/>
-            <a:ext cx="5689600" cy="5240337"/>
-          </a:xfrm>
-        </p:spPr>
-        <p:txBody>
-          <a:bodyPr/>
-          <a:lstStyle>
-            <a:lvl1pPr>
-              <a:defRPr sz="3214"/>
-            </a:lvl1pPr>
-            <a:lvl2pPr>
-              <a:defRPr sz="2755"/>
-            </a:lvl2pPr>
-            <a:lvl3pPr>
-              <a:defRPr sz="2296"/>
-            </a:lvl3pPr>
-            <a:lvl4pPr>
-              <a:defRPr sz="2112"/>
-            </a:lvl4pPr>
-            <a:lvl5pPr>
-              <a:defRPr sz="2112"/>
-            </a:lvl5pPr>
-            <a:lvl6pPr>
-              <a:defRPr sz="2112"/>
-            </a:lvl6pPr>
-            <a:lvl7pPr>
-              <a:defRPr sz="2112"/>
-            </a:lvl7pPr>
-            <a:lvl8pPr>
-              <a:defRPr sz="2112"/>
-            </a:lvl8pPr>
-            <a:lvl9pPr>
-              <a:defRPr sz="2112"/>
-            </a:lvl9pPr>
-          </a:lstStyle>
-          <a:p>
-            <a:pPr lvl="0"/>
-            <a:r>
-              <a:rPr lang="en-US"/>
-              <a:t>Click to edit Master text styles</a:t>
-            </a:r>
-          </a:p>
-          <a:p>
-            <a:pPr lvl="1"/>
-            <a:r>
-              <a:rPr lang="en-US"/>
-              <a:t>Second level</a:t>
-            </a:r>
-          </a:p>
-          <a:p>
-            <a:pPr lvl="2"/>
-            <a:r>
-              <a:rPr lang="en-US"/>
-              <a:t>Third level</a:t>
-            </a:r>
-          </a:p>
-          <a:p>
-            <a:pPr lvl="3"/>
-            <a:r>
-              <a:rPr lang="en-US"/>
-              <a:t>Fourth level</a:t>
-            </a:r>
-          </a:p>
-          <a:p>
-            <a:pPr lvl="4"/>
-            <a:r>
-              <a:rPr lang="en-US"/>
-              <a:t>Fifth level</a:t>
-            </a:r>
-          </a:p>
-        </p:txBody>
-      </p:sp>
-    </p:spTree>
-    <p:extLst>
-      <p:ext uri="{BB962C8B-B14F-4D97-AF65-F5344CB8AC3E}">
-        <p14:creationId xmlns:p14="http://schemas.microsoft.com/office/powerpoint/2010/main" val="3366752726"/>
-      </p:ext>
-    </p:extLst>
-  </p:cSld>
-  <p:clrMapOvr>
-    <a:masterClrMapping/>
-  </p:clrMapOvr>
-</p:sldLayout>
-</file>
-
-<file path=ppt/slideLayouts/slideLayout25.xml><?xml version="1.0" encoding="utf-8"?>
 <p:sldLayout xmlns:a="http://schemas.openxmlformats.org/drawingml/2006/main" xmlns:r="http://schemas.openxmlformats.org/officeDocument/2006/relationships" xmlns:p="http://schemas.openxmlformats.org/presentationml/2006/main" userDrawn="1">
   <p:cSld name="Divider Slide">
     <p:bg>
@@ -8065,7 +7850,7 @@
 </p:sldLayout>
 </file>
 
-<file path=ppt/slideLayouts/slideLayout26.xml><?xml version="1.0" encoding="utf-8"?>
+<file path=ppt/slideLayouts/slideLayout25.xml><?xml version="1.0" encoding="utf-8"?>
 <p:sldLayout xmlns:a="http://schemas.openxmlformats.org/drawingml/2006/main" xmlns:r="http://schemas.openxmlformats.org/officeDocument/2006/relationships" xmlns:p="http://schemas.openxmlformats.org/presentationml/2006/main" type="title">
   <p:cSld name="Title Slide">
     <p:spTree>
@@ -8314,7 +8099,7 @@
 </p:sldLayout>
 </file>
 
-<file path=ppt/slideLayouts/slideLayout27.xml><?xml version="1.0" encoding="utf-8"?>
+<file path=ppt/slideLayouts/slideLayout26.xml><?xml version="1.0" encoding="utf-8"?>
 <p:sldLayout xmlns:a="http://schemas.openxmlformats.org/drawingml/2006/main" xmlns:r="http://schemas.openxmlformats.org/officeDocument/2006/relationships" xmlns:p="http://schemas.openxmlformats.org/presentationml/2006/main" showMasterSp="0" userDrawn="1">
   <p:cSld name="Title Subtitle and Content">
     <p:spTree>
@@ -8552,7 +8337,7 @@
 </p:sldLayout>
 </file>
 
-<file path=ppt/slideLayouts/slideLayout28.xml><?xml version="1.0" encoding="utf-8"?>
+<file path=ppt/slideLayouts/slideLayout27.xml><?xml version="1.0" encoding="utf-8"?>
 <p:sldLayout xmlns:a="http://schemas.openxmlformats.org/drawingml/2006/main" xmlns:r="http://schemas.openxmlformats.org/officeDocument/2006/relationships" xmlns:p="http://schemas.openxmlformats.org/presentationml/2006/main" showMasterSp="0" userDrawn="1">
   <p:cSld name="Title Only">
     <p:spTree>
@@ -8736,7 +8521,7 @@
 </p:sldLayout>
 </file>
 
-<file path=ppt/slideLayouts/slideLayout29.xml><?xml version="1.0" encoding="utf-8"?>
+<file path=ppt/slideLayouts/slideLayout28.xml><?xml version="1.0" encoding="utf-8"?>
 <p:sldLayout xmlns:a="http://schemas.openxmlformats.org/drawingml/2006/main" xmlns:r="http://schemas.openxmlformats.org/officeDocument/2006/relationships" xmlns:p="http://schemas.openxmlformats.org/presentationml/2006/main" showMasterSp="0" userDrawn="1">
   <p:cSld name="Divider Slide Blue">
     <p:bg>
@@ -11147,13 +10932,13 @@
           <p:nvPr/>
         </p:nvPicPr>
         <p:blipFill>
-          <a:blip r:embed="rId31">
+          <a:blip r:embed="rId30">
             <a:extLst>
               <a:ext uri="{28A0092B-C50C-407E-A947-70E740481C1C}">
                 <a14:useLocalDpi xmlns:a14="http://schemas.microsoft.com/office/drawing/2010/main" val="0"/>
               </a:ext>
               <a:ext uri="{96DAC541-7B7A-43D3-8B79-37D633B846F1}">
-                <asvg:svgBlip xmlns:asvg="http://schemas.microsoft.com/office/drawing/2016/SVG/main" r:embed="rId32"/>
+                <asvg:svgBlip xmlns:asvg="http://schemas.microsoft.com/office/drawing/2016/SVG/main" r:embed="rId31"/>
               </a:ext>
             </a:extLst>
           </a:blip>
@@ -11301,12 +11086,11 @@
     <p:sldLayoutId id="2147483749" r:id="rId21"/>
     <p:sldLayoutId id="2147483750" r:id="rId22"/>
     <p:sldLayoutId id="2147483751" r:id="rId23"/>
-    <p:sldLayoutId id="2147483752" r:id="rId24"/>
-    <p:sldLayoutId id="2147483753" r:id="rId25"/>
-    <p:sldLayoutId id="2147483754" r:id="rId26"/>
-    <p:sldLayoutId id="2147483756" r:id="rId27"/>
-    <p:sldLayoutId id="2147483757" r:id="rId28"/>
-    <p:sldLayoutId id="2147483758" r:id="rId29"/>
+    <p:sldLayoutId id="2147483753" r:id="rId24"/>
+    <p:sldLayoutId id="2147483754" r:id="rId25"/>
+    <p:sldLayoutId id="2147483756" r:id="rId26"/>
+    <p:sldLayoutId id="2147483757" r:id="rId27"/>
+    <p:sldLayoutId id="2147483758" r:id="rId28"/>
   </p:sldLayoutIdLst>
   <p:transition>
     <p:fade/>
@@ -19012,7 +18796,7 @@
           <a:p>
             <a:r>
               <a:rPr lang="en-US" dirty="0"/>
-              <a:t>Placeholder – Classifier Model</a:t>
+              <a:t>Classifier Model After Three Iterations</a:t>
             </a:r>
           </a:p>
         </p:txBody>
@@ -19032,7 +18816,7 @@
           <p:nvPr>
             <p:extLst>
               <p:ext uri="{D42A27DB-BD31-4B8C-83A1-F6EECF244321}">
-                <p14:modId xmlns:p14="http://schemas.microsoft.com/office/powerpoint/2010/main" val="4224405646"/>
+                <p14:modId xmlns:p14="http://schemas.microsoft.com/office/powerpoint/2010/main" val="2499891582"/>
               </p:ext>
             </p:extLst>
           </p:nvPr>
@@ -19154,7 +18938,7 @@
                       <a:pPr algn="ctr"/>
                       <a:r>
                         <a:rPr lang="en-US" sz="1600" dirty="0"/>
-                        <a:t>8,663</a:t>
+                        <a:t>8,590</a:t>
                       </a:r>
                     </a:p>
                   </a:txBody>
@@ -19168,7 +18952,7 @@
                       <a:pPr algn="ctr"/>
                       <a:r>
                         <a:rPr lang="en-US" sz="1600" dirty="0"/>
-                        <a:t>415</a:t>
+                        <a:t>480</a:t>
                       </a:r>
                     </a:p>
                   </a:txBody>
@@ -19214,7 +18998,7 @@
                       <a:pPr algn="ctr"/>
                       <a:r>
                         <a:rPr lang="en-US" sz="1600" dirty="0"/>
-                        <a:t>426</a:t>
+                        <a:t>359</a:t>
                       </a:r>
                     </a:p>
                   </a:txBody>
@@ -19228,7 +19012,7 @@
                       <a:pPr algn="ctr"/>
                       <a:r>
                         <a:rPr lang="en-US" sz="1600" dirty="0"/>
-                        <a:t>4,596</a:t>
+                        <a:t>4,663</a:t>
                       </a:r>
                     </a:p>
                   </a:txBody>
@@ -19259,7 +19043,7 @@
           <p:nvPr>
             <p:extLst>
               <p:ext uri="{D42A27DB-BD31-4B8C-83A1-F6EECF244321}">
-                <p14:modId xmlns:p14="http://schemas.microsoft.com/office/powerpoint/2010/main" val="1771435160"/>
+                <p14:modId xmlns:p14="http://schemas.microsoft.com/office/powerpoint/2010/main" val="1302684807"/>
               </p:ext>
             </p:extLst>
           </p:nvPr>
@@ -19423,7 +19207,7 @@
                       <a:pPr algn="ctr"/>
                       <a:r>
                         <a:rPr lang="en-US" sz="1600" dirty="0"/>
-                        <a:t>0.95</a:t>
+                        <a:t>0.96</a:t>
                       </a:r>
                     </a:p>
                   </a:txBody>
@@ -19511,7 +19295,7 @@
                       <a:pPr algn="ctr"/>
                       <a:r>
                         <a:rPr lang="en-US" sz="1600" dirty="0"/>
-                        <a:t>0.92</a:t>
+                        <a:t>0.91</a:t>
                       </a:r>
                     </a:p>
                   </a:txBody>
@@ -19525,7 +19309,7 @@
                       <a:pPr algn="ctr"/>
                       <a:r>
                         <a:rPr lang="en-US" sz="1600" dirty="0"/>
-                        <a:t>0.92</a:t>
+                        <a:t>0.93</a:t>
                       </a:r>
                     </a:p>
                   </a:txBody>
@@ -19810,10 +19594,10 @@
       </p:sp>
       <p:pic>
         <p:nvPicPr>
-          <p:cNvPr id="7" name="Picture 6">
+          <p:cNvPr id="8" name="Picture 7">
             <a:extLst>
               <a:ext uri="{FF2B5EF4-FFF2-40B4-BE49-F238E27FC236}">
-                <a16:creationId xmlns:a16="http://schemas.microsoft.com/office/drawing/2014/main" id="{999099BE-00C9-4DF4-979B-8D2BC2F2C24D}"/>
+                <a16:creationId xmlns:a16="http://schemas.microsoft.com/office/drawing/2014/main" id="{4E7B72FC-37AD-46B1-BEEC-8AD302722552}"/>
               </a:ext>
             </a:extLst>
           </p:cNvPr>
@@ -19830,8 +19614,8 @@
         </p:blipFill>
         <p:spPr>
           <a:xfrm>
-            <a:off x="5243233" y="1305269"/>
-            <a:ext cx="6419850" cy="2457450"/>
+            <a:off x="5158347" y="992285"/>
+            <a:ext cx="6429375" cy="2562225"/>
           </a:xfrm>
           <a:prstGeom prst="rect">
             <a:avLst/>
@@ -20040,7 +19824,7 @@
           <a:p>
             <a:r>
               <a:rPr lang="en-US" dirty="0"/>
-              <a:t>Postmortem/If We Had More Time</a:t>
+              <a:t>Conclusions and Postmortem</a:t>
             </a:r>
           </a:p>
         </p:txBody>

</xml_diff>

<commit_message>
ppt updated, panels added to viz notebook
</commit_message>
<xml_diff>
--- a/Project_3.pptx
+++ b/Project_3.pptx
@@ -18,7 +18,7 @@
     <p:sldId id="1457" r:id="rId6"/>
     <p:sldId id="4275" r:id="rId7"/>
     <p:sldId id="4274" r:id="rId8"/>
-    <p:sldId id="4262" r:id="rId9"/>
+    <p:sldId id="654" r:id="rId9"/>
     <p:sldId id="4270" r:id="rId10"/>
   </p:sldIdLst>
   <p:sldSz cx="12192000" cy="6858000"/>
@@ -140,846 +140,6 @@
 </p:presentation>
 </file>
 
-<file path=ppt/changesInfos/changesInfo1.xml><?xml version="1.0" encoding="utf-8"?>
-<pc:chgInfo xmlns:a="http://schemas.openxmlformats.org/drawingml/2006/main" xmlns:r="http://schemas.openxmlformats.org/officeDocument/2006/relationships" xmlns:ac="http://schemas.microsoft.com/office/drawing/2013/main/command" xmlns:pc="http://schemas.microsoft.com/office/powerpoint/2013/main/command">
-  <pc:docChgLst>
-    <pc:chgData name="Alex Wise" userId="840534413e3eb3ec" providerId="LiveId" clId="{E673EFDB-A2E9-4CAF-BD55-C38C1969773D}"/>
-    <pc:docChg chg="undo redo custSel addSld delSld modSld sldOrd delSection modSection">
-      <pc:chgData name="Alex Wise" userId="840534413e3eb3ec" providerId="LiveId" clId="{E673EFDB-A2E9-4CAF-BD55-C38C1969773D}" dt="2021-04-20T02:14:32.714" v="2936" actId="14100"/>
-      <pc:docMkLst>
-        <pc:docMk/>
-      </pc:docMkLst>
-      <pc:sldChg chg="modSp mod modNotesTx">
-        <pc:chgData name="Alex Wise" userId="840534413e3eb3ec" providerId="LiveId" clId="{E673EFDB-A2E9-4CAF-BD55-C38C1969773D}" dt="2021-04-20T00:25:02.717" v="1798" actId="20577"/>
-        <pc:sldMkLst>
-          <pc:docMk/>
-          <pc:sldMk cId="3274102174" sldId="318"/>
-        </pc:sldMkLst>
-        <pc:spChg chg="mod">
-          <ac:chgData name="Alex Wise" userId="840534413e3eb3ec" providerId="LiveId" clId="{E673EFDB-A2E9-4CAF-BD55-C38C1969773D}" dt="2021-04-18T19:13:08.793" v="23" actId="20577"/>
-          <ac:spMkLst>
-            <pc:docMk/>
-            <pc:sldMk cId="3274102174" sldId="318"/>
-            <ac:spMk id="24" creationId="{9F98EC11-B5C0-4DEA-AB20-D5F7CFEFC639}"/>
-          </ac:spMkLst>
-        </pc:spChg>
-      </pc:sldChg>
-      <pc:sldChg chg="delSp modSp mod">
-        <pc:chgData name="Alex Wise" userId="840534413e3eb3ec" providerId="LiveId" clId="{E673EFDB-A2E9-4CAF-BD55-C38C1969773D}" dt="2021-04-20T00:36:58.645" v="2537" actId="20577"/>
-        <pc:sldMkLst>
-          <pc:docMk/>
-          <pc:sldMk cId="273493080" sldId="319"/>
-        </pc:sldMkLst>
-        <pc:spChg chg="del">
-          <ac:chgData name="Alex Wise" userId="840534413e3eb3ec" providerId="LiveId" clId="{E673EFDB-A2E9-4CAF-BD55-C38C1969773D}" dt="2021-04-20T00:02:06.431" v="813" actId="478"/>
-          <ac:spMkLst>
-            <pc:docMk/>
-            <pc:sldMk cId="273493080" sldId="319"/>
-            <ac:spMk id="4" creationId="{E114BD33-9B3D-4284-A03E-0C5D21CD6F26}"/>
-          </ac:spMkLst>
-        </pc:spChg>
-        <pc:spChg chg="mod">
-          <ac:chgData name="Alex Wise" userId="840534413e3eb3ec" providerId="LiveId" clId="{E673EFDB-A2E9-4CAF-BD55-C38C1969773D}" dt="2021-04-20T00:36:51.877" v="2523" actId="20577"/>
-          <ac:spMkLst>
-            <pc:docMk/>
-            <pc:sldMk cId="273493080" sldId="319"/>
-            <ac:spMk id="50" creationId="{00000000-0000-0000-0000-000000000000}"/>
-          </ac:spMkLst>
-        </pc:spChg>
-        <pc:spChg chg="mod">
-          <ac:chgData name="Alex Wise" userId="840534413e3eb3ec" providerId="LiveId" clId="{E673EFDB-A2E9-4CAF-BD55-C38C1969773D}" dt="2021-04-20T00:36:18.820" v="2479" actId="20577"/>
-          <ac:spMkLst>
-            <pc:docMk/>
-            <pc:sldMk cId="273493080" sldId="319"/>
-            <ac:spMk id="52" creationId="{00000000-0000-0000-0000-000000000000}"/>
-          </ac:spMkLst>
-        </pc:spChg>
-        <pc:spChg chg="mod">
-          <ac:chgData name="Alex Wise" userId="840534413e3eb3ec" providerId="LiveId" clId="{E673EFDB-A2E9-4CAF-BD55-C38C1969773D}" dt="2021-04-20T00:36:30.973" v="2493" actId="20577"/>
-          <ac:spMkLst>
-            <pc:docMk/>
-            <pc:sldMk cId="273493080" sldId="319"/>
-            <ac:spMk id="53" creationId="{00000000-0000-0000-0000-000000000000}"/>
-          </ac:spMkLst>
-        </pc:spChg>
-        <pc:spChg chg="mod">
-          <ac:chgData name="Alex Wise" userId="840534413e3eb3ec" providerId="LiveId" clId="{E673EFDB-A2E9-4CAF-BD55-C38C1969773D}" dt="2021-04-20T00:36:58.645" v="2537" actId="20577"/>
-          <ac:spMkLst>
-            <pc:docMk/>
-            <pc:sldMk cId="273493080" sldId="319"/>
-            <ac:spMk id="54" creationId="{00000000-0000-0000-0000-000000000000}"/>
-          </ac:spMkLst>
-        </pc:spChg>
-        <pc:spChg chg="mod">
-          <ac:chgData name="Alex Wise" userId="840534413e3eb3ec" providerId="LiveId" clId="{E673EFDB-A2E9-4CAF-BD55-C38C1969773D}" dt="2021-04-20T00:36:44.389" v="2508" actId="20577"/>
-          <ac:spMkLst>
-            <pc:docMk/>
-            <pc:sldMk cId="273493080" sldId="319"/>
-            <ac:spMk id="57" creationId="{00000000-0000-0000-0000-000000000000}"/>
-          </ac:spMkLst>
-        </pc:spChg>
-      </pc:sldChg>
-      <pc:sldChg chg="modSp add del mod">
-        <pc:chgData name="Alex Wise" userId="840534413e3eb3ec" providerId="LiveId" clId="{E673EFDB-A2E9-4CAF-BD55-C38C1969773D}" dt="2021-04-19T23:47:32.954" v="424" actId="47"/>
-        <pc:sldMkLst>
-          <pc:docMk/>
-          <pc:sldMk cId="3949241255" sldId="644"/>
-        </pc:sldMkLst>
-        <pc:spChg chg="mod">
-          <ac:chgData name="Alex Wise" userId="840534413e3eb3ec" providerId="LiveId" clId="{E673EFDB-A2E9-4CAF-BD55-C38C1969773D}" dt="2021-04-19T23:34:44.311" v="276" actId="20577"/>
-          <ac:spMkLst>
-            <pc:docMk/>
-            <pc:sldMk cId="3949241255" sldId="644"/>
-            <ac:spMk id="5" creationId="{FF4060CE-CE3A-FE46-9926-A7BF459A0520}"/>
-          </ac:spMkLst>
-        </pc:spChg>
-      </pc:sldChg>
-      <pc:sldChg chg="del">
-        <pc:chgData name="Alex Wise" userId="840534413e3eb3ec" providerId="LiveId" clId="{E673EFDB-A2E9-4CAF-BD55-C38C1969773D}" dt="2021-04-19T23:30:05.921" v="103" actId="47"/>
-        <pc:sldMkLst>
-          <pc:docMk/>
-          <pc:sldMk cId="3107649157" sldId="650"/>
-        </pc:sldMkLst>
-      </pc:sldChg>
-      <pc:sldChg chg="addSp delSp modSp add del mod">
-        <pc:chgData name="Alex Wise" userId="840534413e3eb3ec" providerId="LiveId" clId="{E673EFDB-A2E9-4CAF-BD55-C38C1969773D}" dt="2021-04-20T00:02:38.797" v="819" actId="47"/>
-        <pc:sldMkLst>
-          <pc:docMk/>
-          <pc:sldMk cId="905252822" sldId="713"/>
-        </pc:sldMkLst>
-        <pc:spChg chg="del">
-          <ac:chgData name="Alex Wise" userId="840534413e3eb3ec" providerId="LiveId" clId="{E673EFDB-A2E9-4CAF-BD55-C38C1969773D}" dt="2021-04-20T00:02:08.767" v="814" actId="478"/>
-          <ac:spMkLst>
-            <pc:docMk/>
-            <pc:sldMk cId="905252822" sldId="713"/>
-            <ac:spMk id="2" creationId="{A1F2DECD-54F6-CB4D-B48F-32DD40D2588D}"/>
-          </ac:spMkLst>
-        </pc:spChg>
-        <pc:spChg chg="mod">
-          <ac:chgData name="Alex Wise" userId="840534413e3eb3ec" providerId="LiveId" clId="{E673EFDB-A2E9-4CAF-BD55-C38C1969773D}" dt="2021-04-19T23:43:29.646" v="285" actId="20577"/>
-          <ac:spMkLst>
-            <pc:docMk/>
-            <pc:sldMk cId="905252822" sldId="713"/>
-            <ac:spMk id="5" creationId="{FF4060CE-CE3A-FE46-9926-A7BF459A0520}"/>
-          </ac:spMkLst>
-        </pc:spChg>
-        <pc:spChg chg="add del">
-          <ac:chgData name="Alex Wise" userId="840534413e3eb3ec" providerId="LiveId" clId="{E673EFDB-A2E9-4CAF-BD55-C38C1969773D}" dt="2021-04-19T23:44:50.370" v="291" actId="478"/>
-          <ac:spMkLst>
-            <pc:docMk/>
-            <pc:sldMk cId="905252822" sldId="713"/>
-            <ac:spMk id="25" creationId="{249AC437-02E6-42F8-9617-0967F15E6513}"/>
-          </ac:spMkLst>
-        </pc:spChg>
-        <pc:spChg chg="mod">
-          <ac:chgData name="Alex Wise" userId="840534413e3eb3ec" providerId="LiveId" clId="{E673EFDB-A2E9-4CAF-BD55-C38C1969773D}" dt="2021-04-19T23:46:36.822" v="423" actId="20577"/>
-          <ac:spMkLst>
-            <pc:docMk/>
-            <pc:sldMk cId="905252822" sldId="713"/>
-            <ac:spMk id="31" creationId="{E5B8459D-9B06-4A17-BEE9-3F49EEE5C071}"/>
-          </ac:spMkLst>
-        </pc:spChg>
-        <pc:spChg chg="mod">
-          <ac:chgData name="Alex Wise" userId="840534413e3eb3ec" providerId="LiveId" clId="{E673EFDB-A2E9-4CAF-BD55-C38C1969773D}" dt="2021-04-19T23:45:46.126" v="350" actId="20577"/>
-          <ac:spMkLst>
-            <pc:docMk/>
-            <pc:sldMk cId="905252822" sldId="713"/>
-            <ac:spMk id="32" creationId="{2597D2FE-E1EB-47FA-B852-EC5E4AE71F1A}"/>
-          </ac:spMkLst>
-        </pc:spChg>
-        <pc:spChg chg="add del mod">
-          <ac:chgData name="Alex Wise" userId="840534413e3eb3ec" providerId="LiveId" clId="{E673EFDB-A2E9-4CAF-BD55-C38C1969773D}" dt="2021-04-19T23:46:05.390" v="390" actId="20577"/>
-          <ac:spMkLst>
-            <pc:docMk/>
-            <pc:sldMk cId="905252822" sldId="713"/>
-            <ac:spMk id="33" creationId="{3DC2FE50-91A5-4C98-BD0D-72EF708979B3}"/>
-          </ac:spMkLst>
-        </pc:spChg>
-        <pc:spChg chg="mod">
-          <ac:chgData name="Alex Wise" userId="840534413e3eb3ec" providerId="LiveId" clId="{E673EFDB-A2E9-4CAF-BD55-C38C1969773D}" dt="2021-04-19T23:45:53.422" v="366" actId="20577"/>
-          <ac:spMkLst>
-            <pc:docMk/>
-            <pc:sldMk cId="905252822" sldId="713"/>
-            <ac:spMk id="34" creationId="{3BD7282B-C18D-4073-A197-36BB315FCE89}"/>
-          </ac:spMkLst>
-        </pc:spChg>
-        <pc:spChg chg="add del mod">
-          <ac:chgData name="Alex Wise" userId="840534413e3eb3ec" providerId="LiveId" clId="{E673EFDB-A2E9-4CAF-BD55-C38C1969773D}" dt="2021-04-19T23:46:09.774" v="407" actId="20577"/>
-          <ac:spMkLst>
-            <pc:docMk/>
-            <pc:sldMk cId="905252822" sldId="713"/>
-            <ac:spMk id="35" creationId="{231D64F9-94E4-4844-85A4-23D2BA44CBB2}"/>
-          </ac:spMkLst>
-        </pc:spChg>
-        <pc:spChg chg="add del">
-          <ac:chgData name="Alex Wise" userId="840534413e3eb3ec" providerId="LiveId" clId="{E673EFDB-A2E9-4CAF-BD55-C38C1969773D}" dt="2021-04-19T23:44:50.370" v="291" actId="478"/>
-          <ac:spMkLst>
-            <pc:docMk/>
-            <pc:sldMk cId="905252822" sldId="713"/>
-            <ac:spMk id="71" creationId="{B1C04FA6-55FC-41B6-AFD0-AB250041B1E0}"/>
-          </ac:spMkLst>
-        </pc:spChg>
-        <pc:cxnChg chg="add del">
-          <ac:chgData name="Alex Wise" userId="840534413e3eb3ec" providerId="LiveId" clId="{E673EFDB-A2E9-4CAF-BD55-C38C1969773D}" dt="2021-04-19T23:44:52.424" v="295" actId="478"/>
-          <ac:cxnSpMkLst>
-            <pc:docMk/>
-            <pc:sldMk cId="905252822" sldId="713"/>
-            <ac:cxnSpMk id="38" creationId="{997DEEA1-0FD6-4DA7-8B63-7AFE72F1506B}"/>
-          </ac:cxnSpMkLst>
-        </pc:cxnChg>
-        <pc:cxnChg chg="add del">
-          <ac:chgData name="Alex Wise" userId="840534413e3eb3ec" providerId="LiveId" clId="{E673EFDB-A2E9-4CAF-BD55-C38C1969773D}" dt="2021-04-19T23:44:50.370" v="291" actId="478"/>
-          <ac:cxnSpMkLst>
-            <pc:docMk/>
-            <pc:sldMk cId="905252822" sldId="713"/>
-            <ac:cxnSpMk id="39" creationId="{86D8CE29-6BD7-4EA0-BC48-DCF82472AA4D}"/>
-          </ac:cxnSpMkLst>
-        </pc:cxnChg>
-        <pc:cxnChg chg="add del">
-          <ac:chgData name="Alex Wise" userId="840534413e3eb3ec" providerId="LiveId" clId="{E673EFDB-A2E9-4CAF-BD55-C38C1969773D}" dt="2021-04-19T23:44:51.888" v="294" actId="478"/>
-          <ac:cxnSpMkLst>
-            <pc:docMk/>
-            <pc:sldMk cId="905252822" sldId="713"/>
-            <ac:cxnSpMk id="66" creationId="{9649DE0E-4497-4256-95CC-106C8C7737F1}"/>
-          </ac:cxnSpMkLst>
-        </pc:cxnChg>
-        <pc:cxnChg chg="add del">
-          <ac:chgData name="Alex Wise" userId="840534413e3eb3ec" providerId="LiveId" clId="{E673EFDB-A2E9-4CAF-BD55-C38C1969773D}" dt="2021-04-19T23:44:51.128" v="292" actId="478"/>
-          <ac:cxnSpMkLst>
-            <pc:docMk/>
-            <pc:sldMk cId="905252822" sldId="713"/>
-            <ac:cxnSpMk id="67" creationId="{1451A2B8-2A00-4A1F-BC4A-3A3281143755}"/>
-          </ac:cxnSpMkLst>
-        </pc:cxnChg>
-      </pc:sldChg>
-      <pc:sldChg chg="del">
-        <pc:chgData name="Alex Wise" userId="840534413e3eb3ec" providerId="LiveId" clId="{E673EFDB-A2E9-4CAF-BD55-C38C1969773D}" dt="2021-04-18T19:14:04.162" v="28" actId="47"/>
-        <pc:sldMkLst>
-          <pc:docMk/>
-          <pc:sldMk cId="1899922442" sldId="757"/>
-        </pc:sldMkLst>
-      </pc:sldChg>
-      <pc:sldChg chg="addSp delSp modSp add mod modAnim modNotesTx">
-        <pc:chgData name="Alex Wise" userId="840534413e3eb3ec" providerId="LiveId" clId="{E673EFDB-A2E9-4CAF-BD55-C38C1969773D}" dt="2021-04-20T02:14:32.714" v="2936" actId="14100"/>
-        <pc:sldMkLst>
-          <pc:docMk/>
-          <pc:sldMk cId="3103422854" sldId="1457"/>
-        </pc:sldMkLst>
-        <pc:spChg chg="add mod">
-          <ac:chgData name="Alex Wise" userId="840534413e3eb3ec" providerId="LiveId" clId="{E673EFDB-A2E9-4CAF-BD55-C38C1969773D}" dt="2021-04-20T02:14:32.714" v="2936" actId="14100"/>
-          <ac:spMkLst>
-            <pc:docMk/>
-            <pc:sldMk cId="3103422854" sldId="1457"/>
-            <ac:spMk id="3" creationId="{121B0B8D-668F-42DE-A979-FA50D05B7C2D}"/>
-          </ac:spMkLst>
-        </pc:spChg>
-        <pc:spChg chg="add del">
-          <ac:chgData name="Alex Wise" userId="840534413e3eb3ec" providerId="LiveId" clId="{E673EFDB-A2E9-4CAF-BD55-C38C1969773D}" dt="2021-04-19T23:51:36.464" v="466" actId="478"/>
-          <ac:spMkLst>
-            <pc:docMk/>
-            <pc:sldMk cId="3103422854" sldId="1457"/>
-            <ac:spMk id="10" creationId="{43CCE5D4-E8F1-43CC-8703-F86C2BE729F0}"/>
-          </ac:spMkLst>
-        </pc:spChg>
-        <pc:spChg chg="mod">
-          <ac:chgData name="Alex Wise" userId="840534413e3eb3ec" providerId="LiveId" clId="{E673EFDB-A2E9-4CAF-BD55-C38C1969773D}" dt="2021-04-19T23:50:31.390" v="435" actId="20577"/>
-          <ac:spMkLst>
-            <pc:docMk/>
-            <pc:sldMk cId="3103422854" sldId="1457"/>
-            <ac:spMk id="14" creationId="{055A4668-9C7D-CD4D-8E46-10752769FFE5}"/>
-          </ac:spMkLst>
-        </pc:spChg>
-        <pc:spChg chg="add del">
-          <ac:chgData name="Alex Wise" userId="840534413e3eb3ec" providerId="LiveId" clId="{E673EFDB-A2E9-4CAF-BD55-C38C1969773D}" dt="2021-04-19T23:51:37.407" v="471" actId="478"/>
-          <ac:spMkLst>
-            <pc:docMk/>
-            <pc:sldMk cId="3103422854" sldId="1457"/>
-            <ac:spMk id="35" creationId="{38A48341-1A57-42C6-9738-E79001855A3F}"/>
-          </ac:spMkLst>
-        </pc:spChg>
-        <pc:spChg chg="add del">
-          <ac:chgData name="Alex Wise" userId="840534413e3eb3ec" providerId="LiveId" clId="{E673EFDB-A2E9-4CAF-BD55-C38C1969773D}" dt="2021-04-19T23:51:37.092" v="469" actId="478"/>
-          <ac:spMkLst>
-            <pc:docMk/>
-            <pc:sldMk cId="3103422854" sldId="1457"/>
-            <ac:spMk id="36" creationId="{8D552C86-A147-4CDE-AD26-53B8F909B908}"/>
-          </ac:spMkLst>
-        </pc:spChg>
-        <pc:spChg chg="mod">
-          <ac:chgData name="Alex Wise" userId="840534413e3eb3ec" providerId="LiveId" clId="{E673EFDB-A2E9-4CAF-BD55-C38C1969773D}" dt="2021-04-20T00:39:45.446" v="2542" actId="20577"/>
-          <ac:spMkLst>
-            <pc:docMk/>
-            <pc:sldMk cId="3103422854" sldId="1457"/>
-            <ac:spMk id="37" creationId="{00000000-0000-0000-0000-000000000000}"/>
-          </ac:spMkLst>
-        </pc:spChg>
-        <pc:spChg chg="add del">
-          <ac:chgData name="Alex Wise" userId="840534413e3eb3ec" providerId="LiveId" clId="{E673EFDB-A2E9-4CAF-BD55-C38C1969773D}" dt="2021-04-19T23:51:37.723" v="473" actId="478"/>
-          <ac:spMkLst>
-            <pc:docMk/>
-            <pc:sldMk cId="3103422854" sldId="1457"/>
-            <ac:spMk id="39" creationId="{F2538FB0-DCFE-4DF7-BF8E-163F7E701434}"/>
-          </ac:spMkLst>
-        </pc:spChg>
-        <pc:spChg chg="add mod">
-          <ac:chgData name="Alex Wise" userId="840534413e3eb3ec" providerId="LiveId" clId="{E673EFDB-A2E9-4CAF-BD55-C38C1969773D}" dt="2021-04-20T00:48:57.349" v="2800" actId="1036"/>
-          <ac:spMkLst>
-            <pc:docMk/>
-            <pc:sldMk cId="3103422854" sldId="1457"/>
-            <ac:spMk id="40" creationId="{71350E98-8F3E-45E9-A4E3-563A14757860}"/>
-          </ac:spMkLst>
-        </pc:spChg>
-        <pc:spChg chg="add mod">
-          <ac:chgData name="Alex Wise" userId="840534413e3eb3ec" providerId="LiveId" clId="{E673EFDB-A2E9-4CAF-BD55-C38C1969773D}" dt="2021-04-20T00:48:57.349" v="2800" actId="1036"/>
-          <ac:spMkLst>
-            <pc:docMk/>
-            <pc:sldMk cId="3103422854" sldId="1457"/>
-            <ac:spMk id="41" creationId="{DB55B8F9-C44A-474D-94F8-63CE2791361F}"/>
-          </ac:spMkLst>
-        </pc:spChg>
-        <pc:spChg chg="add del mod">
-          <ac:chgData name="Alex Wise" userId="840534413e3eb3ec" providerId="LiveId" clId="{E673EFDB-A2E9-4CAF-BD55-C38C1969773D}" dt="2021-04-20T00:41:35.477" v="2612" actId="478"/>
-          <ac:spMkLst>
-            <pc:docMk/>
-            <pc:sldMk cId="3103422854" sldId="1457"/>
-            <ac:spMk id="42" creationId="{06C81B5F-AE1A-479E-AF75-0AD490715ABE}"/>
-          </ac:spMkLst>
-        </pc:spChg>
-        <pc:spChg chg="add del mod">
-          <ac:chgData name="Alex Wise" userId="840534413e3eb3ec" providerId="LiveId" clId="{E673EFDB-A2E9-4CAF-BD55-C38C1969773D}" dt="2021-04-20T00:41:33.997" v="2611" actId="478"/>
-          <ac:spMkLst>
-            <pc:docMk/>
-            <pc:sldMk cId="3103422854" sldId="1457"/>
-            <ac:spMk id="43" creationId="{0F49336D-73F6-4AD3-A1CE-5A9A728D1C03}"/>
-          </ac:spMkLst>
-        </pc:spChg>
-        <pc:spChg chg="add del mod">
-          <ac:chgData name="Alex Wise" userId="840534413e3eb3ec" providerId="LiveId" clId="{E673EFDB-A2E9-4CAF-BD55-C38C1969773D}" dt="2021-04-20T00:41:32.317" v="2610" actId="478"/>
-          <ac:spMkLst>
-            <pc:docMk/>
-            <pc:sldMk cId="3103422854" sldId="1457"/>
-            <ac:spMk id="44" creationId="{372E4D07-5133-4CD5-AFB5-C652C8895722}"/>
-          </ac:spMkLst>
-        </pc:spChg>
-        <pc:spChg chg="add del">
-          <ac:chgData name="Alex Wise" userId="840534413e3eb3ec" providerId="LiveId" clId="{E673EFDB-A2E9-4CAF-BD55-C38C1969773D}" dt="2021-04-19T23:51:38.046" v="475" actId="478"/>
-          <ac:spMkLst>
-            <pc:docMk/>
-            <pc:sldMk cId="3103422854" sldId="1457"/>
-            <ac:spMk id="45" creationId="{3229C583-FC28-41BA-AE2C-0ECADD756928}"/>
-          </ac:spMkLst>
-        </pc:spChg>
-        <pc:spChg chg="add del">
-          <ac:chgData name="Alex Wise" userId="840534413e3eb3ec" providerId="LiveId" clId="{E673EFDB-A2E9-4CAF-BD55-C38C1969773D}" dt="2021-04-19T23:51:38.368" v="477" actId="478"/>
-          <ac:spMkLst>
-            <pc:docMk/>
-            <pc:sldMk cId="3103422854" sldId="1457"/>
-            <ac:spMk id="46" creationId="{51628D51-870E-4145-B7B6-D4029CCA3ED5}"/>
-          </ac:spMkLst>
-        </pc:spChg>
-        <pc:spChg chg="add del mod">
-          <ac:chgData name="Alex Wise" userId="840534413e3eb3ec" providerId="LiveId" clId="{E673EFDB-A2E9-4CAF-BD55-C38C1969773D}" dt="2021-04-20T00:41:30.996" v="2609" actId="478"/>
-          <ac:spMkLst>
-            <pc:docMk/>
-            <pc:sldMk cId="3103422854" sldId="1457"/>
-            <ac:spMk id="48" creationId="{3E8280BB-CBE8-4965-99B0-2E2B444F80DC}"/>
-          </ac:spMkLst>
-        </pc:spChg>
-        <pc:spChg chg="add del mod">
-          <ac:chgData name="Alex Wise" userId="840534413e3eb3ec" providerId="LiveId" clId="{E673EFDB-A2E9-4CAF-BD55-C38C1969773D}" dt="2021-04-20T00:41:27.701" v="2607" actId="478"/>
-          <ac:spMkLst>
-            <pc:docMk/>
-            <pc:sldMk cId="3103422854" sldId="1457"/>
-            <ac:spMk id="49" creationId="{AF180510-6FC8-44DD-B9DB-742F00E7A4A2}"/>
-          </ac:spMkLst>
-        </pc:spChg>
-        <pc:spChg chg="del mod">
-          <ac:chgData name="Alex Wise" userId="840534413e3eb3ec" providerId="LiveId" clId="{E673EFDB-A2E9-4CAF-BD55-C38C1969773D}" dt="2021-04-20T00:02:10.878" v="816" actId="478"/>
-          <ac:spMkLst>
-            <pc:docMk/>
-            <pc:sldMk cId="3103422854" sldId="1457"/>
-            <ac:spMk id="50" creationId="{5EADCAF3-87F0-411D-B684-C1DACE3A58F7}"/>
-          </ac:spMkLst>
-        </pc:spChg>
-        <pc:spChg chg="add del mod">
-          <ac:chgData name="Alex Wise" userId="840534413e3eb3ec" providerId="LiveId" clId="{E673EFDB-A2E9-4CAF-BD55-C38C1969773D}" dt="2021-04-20T00:41:26.109" v="2606" actId="478"/>
-          <ac:spMkLst>
-            <pc:docMk/>
-            <pc:sldMk cId="3103422854" sldId="1457"/>
-            <ac:spMk id="51" creationId="{373494C6-6489-4E87-9FCF-2A8243B50415}"/>
-          </ac:spMkLst>
-        </pc:spChg>
-        <pc:spChg chg="add mod">
-          <ac:chgData name="Alex Wise" userId="840534413e3eb3ec" providerId="LiveId" clId="{E673EFDB-A2E9-4CAF-BD55-C38C1969773D}" dt="2021-04-20T00:48:57.349" v="2800" actId="1036"/>
-          <ac:spMkLst>
-            <pc:docMk/>
-            <pc:sldMk cId="3103422854" sldId="1457"/>
-            <ac:spMk id="52" creationId="{69FCCA9E-5F5A-44A4-ADF2-A85C7F2822F6}"/>
-          </ac:spMkLst>
-        </pc:spChg>
-        <pc:spChg chg="del mod">
-          <ac:chgData name="Alex Wise" userId="840534413e3eb3ec" providerId="LiveId" clId="{E673EFDB-A2E9-4CAF-BD55-C38C1969773D}" dt="2021-04-20T00:42:07.509" v="2615" actId="478"/>
-          <ac:spMkLst>
-            <pc:docMk/>
-            <pc:sldMk cId="3103422854" sldId="1457"/>
-            <ac:spMk id="53" creationId="{61AF081A-EA86-EF49-9200-A46AC5FC3089}"/>
-          </ac:spMkLst>
-        </pc:spChg>
-        <pc:spChg chg="add mod">
-          <ac:chgData name="Alex Wise" userId="840534413e3eb3ec" providerId="LiveId" clId="{E673EFDB-A2E9-4CAF-BD55-C38C1969773D}" dt="2021-04-20T00:48:57.349" v="2800" actId="1036"/>
-          <ac:spMkLst>
-            <pc:docMk/>
-            <pc:sldMk cId="3103422854" sldId="1457"/>
-            <ac:spMk id="54" creationId="{28371047-B9B9-469A-83D9-1914E0C254F5}"/>
-          </ac:spMkLst>
-        </pc:spChg>
-        <pc:spChg chg="add del mod">
-          <ac:chgData name="Alex Wise" userId="840534413e3eb3ec" providerId="LiveId" clId="{E673EFDB-A2E9-4CAF-BD55-C38C1969773D}" dt="2021-04-20T00:41:25.071" v="2605" actId="478"/>
-          <ac:spMkLst>
-            <pc:docMk/>
-            <pc:sldMk cId="3103422854" sldId="1457"/>
-            <ac:spMk id="55" creationId="{93E9C9E6-33D1-4548-8507-1B334E69BE0B}"/>
-          </ac:spMkLst>
-        </pc:spChg>
-        <pc:spChg chg="add del">
-          <ac:chgData name="Alex Wise" userId="840534413e3eb3ec" providerId="LiveId" clId="{E673EFDB-A2E9-4CAF-BD55-C38C1969773D}" dt="2021-04-19T23:51:38.914" v="479" actId="478"/>
-          <ac:spMkLst>
-            <pc:docMk/>
-            <pc:sldMk cId="3103422854" sldId="1457"/>
-            <ac:spMk id="56" creationId="{9EE1CEDE-87A7-4C17-B3B1-716855B73918}"/>
-          </ac:spMkLst>
-        </pc:spChg>
-        <pc:spChg chg="add mod">
-          <ac:chgData name="Alex Wise" userId="840534413e3eb3ec" providerId="LiveId" clId="{E673EFDB-A2E9-4CAF-BD55-C38C1969773D}" dt="2021-04-20T00:48:57.349" v="2800" actId="1036"/>
-          <ac:spMkLst>
-            <pc:docMk/>
-            <pc:sldMk cId="3103422854" sldId="1457"/>
-            <ac:spMk id="58" creationId="{7E5670D4-DB65-4384-9875-702FA25A7F28}"/>
-          </ac:spMkLst>
-        </pc:spChg>
-        <pc:spChg chg="add mod">
-          <ac:chgData name="Alex Wise" userId="840534413e3eb3ec" providerId="LiveId" clId="{E673EFDB-A2E9-4CAF-BD55-C38C1969773D}" dt="2021-04-20T00:48:57.349" v="2800" actId="1036"/>
-          <ac:spMkLst>
-            <pc:docMk/>
-            <pc:sldMk cId="3103422854" sldId="1457"/>
-            <ac:spMk id="59" creationId="{68042B92-1CD4-48E0-81FD-375E05A6AF45}"/>
-          </ac:spMkLst>
-        </pc:spChg>
-        <pc:spChg chg="add del mod">
-          <ac:chgData name="Alex Wise" userId="840534413e3eb3ec" providerId="LiveId" clId="{E673EFDB-A2E9-4CAF-BD55-C38C1969773D}" dt="2021-04-20T00:41:28.844" v="2608" actId="478"/>
-          <ac:spMkLst>
-            <pc:docMk/>
-            <pc:sldMk cId="3103422854" sldId="1457"/>
-            <ac:spMk id="60" creationId="{40D09DD5-8585-4F08-A002-F240983A87EA}"/>
-          </ac:spMkLst>
-        </pc:spChg>
-        <pc:spChg chg="add mod">
-          <ac:chgData name="Alex Wise" userId="840534413e3eb3ec" providerId="LiveId" clId="{E673EFDB-A2E9-4CAF-BD55-C38C1969773D}" dt="2021-04-20T00:48:57.349" v="2800" actId="1036"/>
-          <ac:spMkLst>
-            <pc:docMk/>
-            <pc:sldMk cId="3103422854" sldId="1457"/>
-            <ac:spMk id="61" creationId="{5F966FC4-C5FA-458F-9BB9-0452E2B31A80}"/>
-          </ac:spMkLst>
-        </pc:spChg>
-        <pc:spChg chg="add del mod">
-          <ac:chgData name="Alex Wise" userId="840534413e3eb3ec" providerId="LiveId" clId="{E673EFDB-A2E9-4CAF-BD55-C38C1969773D}" dt="2021-04-20T00:54:35.429" v="2827" actId="478"/>
-          <ac:spMkLst>
-            <pc:docMk/>
-            <pc:sldMk cId="3103422854" sldId="1457"/>
-            <ac:spMk id="64" creationId="{97FA8DC5-FEEA-4778-B669-2E5F8EB1DEC4}"/>
-          </ac:spMkLst>
-        </pc:spChg>
-        <pc:spChg chg="add mod">
-          <ac:chgData name="Alex Wise" userId="840534413e3eb3ec" providerId="LiveId" clId="{E673EFDB-A2E9-4CAF-BD55-C38C1969773D}" dt="2021-04-20T00:54:39.772" v="2845" actId="1035"/>
-          <ac:spMkLst>
-            <pc:docMk/>
-            <pc:sldMk cId="3103422854" sldId="1457"/>
-            <ac:spMk id="65" creationId="{082A4E25-6B5A-4E01-B00C-D15A7D8D79C9}"/>
-          </ac:spMkLst>
-        </pc:spChg>
-        <pc:spChg chg="add del">
-          <ac:chgData name="Alex Wise" userId="840534413e3eb3ec" providerId="LiveId" clId="{E673EFDB-A2E9-4CAF-BD55-C38C1969773D}" dt="2021-04-19T23:51:36.745" v="467" actId="478"/>
-          <ac:spMkLst>
-            <pc:docMk/>
-            <pc:sldMk cId="3103422854" sldId="1457"/>
-            <ac:spMk id="66" creationId="{3ADC1C72-77B9-48B2-A74C-95809323BF57}"/>
-          </ac:spMkLst>
-        </pc:spChg>
-        <pc:spChg chg="mod">
-          <ac:chgData name="Alex Wise" userId="840534413e3eb3ec" providerId="LiveId" clId="{E673EFDB-A2E9-4CAF-BD55-C38C1969773D}" dt="2021-04-20T00:11:32.606" v="946" actId="1037"/>
-          <ac:spMkLst>
-            <pc:docMk/>
-            <pc:sldMk cId="3103422854" sldId="1457"/>
-            <ac:spMk id="73" creationId="{FAAD75F5-B4BF-BB47-8257-C73EDD54E3C7}"/>
-          </ac:spMkLst>
-        </pc:spChg>
-        <pc:spChg chg="mod">
-          <ac:chgData name="Alex Wise" userId="840534413e3eb3ec" providerId="LiveId" clId="{E673EFDB-A2E9-4CAF-BD55-C38C1969773D}" dt="2021-04-20T00:11:32.606" v="946" actId="1037"/>
-          <ac:spMkLst>
-            <pc:docMk/>
-            <pc:sldMk cId="3103422854" sldId="1457"/>
-            <ac:spMk id="74" creationId="{730D52D9-572E-5240-91DE-4BDAFB769658}"/>
-          </ac:spMkLst>
-        </pc:spChg>
-        <pc:spChg chg="mod">
-          <ac:chgData name="Alex Wise" userId="840534413e3eb3ec" providerId="LiveId" clId="{E673EFDB-A2E9-4CAF-BD55-C38C1969773D}" dt="2021-04-20T00:11:32.606" v="946" actId="1037"/>
-          <ac:spMkLst>
-            <pc:docMk/>
-            <pc:sldMk cId="3103422854" sldId="1457"/>
-            <ac:spMk id="75" creationId="{101EDF4B-7DF0-5F4C-B08E-A77C42999817}"/>
-          </ac:spMkLst>
-        </pc:spChg>
-        <pc:spChg chg="mod">
-          <ac:chgData name="Alex Wise" userId="840534413e3eb3ec" providerId="LiveId" clId="{E673EFDB-A2E9-4CAF-BD55-C38C1969773D}" dt="2021-04-20T00:12:06.826" v="981" actId="1037"/>
-          <ac:spMkLst>
-            <pc:docMk/>
-            <pc:sldMk cId="3103422854" sldId="1457"/>
-            <ac:spMk id="76" creationId="{B20538D8-B2E8-DB4F-AD05-4846EF6441C6}"/>
-          </ac:spMkLst>
-        </pc:spChg>
-        <pc:spChg chg="mod">
-          <ac:chgData name="Alex Wise" userId="840534413e3eb3ec" providerId="LiveId" clId="{E673EFDB-A2E9-4CAF-BD55-C38C1969773D}" dt="2021-04-20T00:40:18.094" v="2569" actId="20577"/>
-          <ac:spMkLst>
-            <pc:docMk/>
-            <pc:sldMk cId="3103422854" sldId="1457"/>
-            <ac:spMk id="77" creationId="{8DCDBA8B-8176-7F45-89B9-A1C6F12B6AE9}"/>
-          </ac:spMkLst>
-        </pc:spChg>
-        <pc:spChg chg="mod">
-          <ac:chgData name="Alex Wise" userId="840534413e3eb3ec" providerId="LiveId" clId="{E673EFDB-A2E9-4CAF-BD55-C38C1969773D}" dt="2021-04-20T00:40:29.765" v="2578" actId="20577"/>
-          <ac:spMkLst>
-            <pc:docMk/>
-            <pc:sldMk cId="3103422854" sldId="1457"/>
-            <ac:spMk id="79" creationId="{972B5058-EDCD-7A40-948F-CE23DEA9118D}"/>
-          </ac:spMkLst>
-        </pc:spChg>
-        <pc:spChg chg="add mod">
-          <ac:chgData name="Alex Wise" userId="840534413e3eb3ec" providerId="LiveId" clId="{E673EFDB-A2E9-4CAF-BD55-C38C1969773D}" dt="2021-04-20T00:54:39.772" v="2845" actId="1035"/>
-          <ac:spMkLst>
-            <pc:docMk/>
-            <pc:sldMk cId="3103422854" sldId="1457"/>
-            <ac:spMk id="81" creationId="{42742E5D-B9EE-49C8-B693-EDB233E0CB69}"/>
-          </ac:spMkLst>
-        </pc:spChg>
-        <pc:spChg chg="add mod">
-          <ac:chgData name="Alex Wise" userId="840534413e3eb3ec" providerId="LiveId" clId="{E673EFDB-A2E9-4CAF-BD55-C38C1969773D}" dt="2021-04-20T00:54:58.165" v="2871" actId="20577"/>
-          <ac:spMkLst>
-            <pc:docMk/>
-            <pc:sldMk cId="3103422854" sldId="1457"/>
-            <ac:spMk id="82" creationId="{5671E752-8868-4B88-A9E7-8B211E4BCE26}"/>
-          </ac:spMkLst>
-        </pc:spChg>
-        <pc:spChg chg="add mod">
-          <ac:chgData name="Alex Wise" userId="840534413e3eb3ec" providerId="LiveId" clId="{E673EFDB-A2E9-4CAF-BD55-C38C1969773D}" dt="2021-04-20T00:55:44.861" v="2894" actId="20577"/>
-          <ac:spMkLst>
-            <pc:docMk/>
-            <pc:sldMk cId="3103422854" sldId="1457"/>
-            <ac:spMk id="83" creationId="{E7FEC5F2-A11E-439B-BD57-5B7B9DD2A9F1}"/>
-          </ac:spMkLst>
-        </pc:spChg>
-        <pc:spChg chg="mod">
-          <ac:chgData name="Alex Wise" userId="840534413e3eb3ec" providerId="LiveId" clId="{E673EFDB-A2E9-4CAF-BD55-C38C1969773D}" dt="2021-04-20T00:39:51.517" v="2546" actId="20577"/>
-          <ac:spMkLst>
-            <pc:docMk/>
-            <pc:sldMk cId="3103422854" sldId="1457"/>
-            <ac:spMk id="99" creationId="{08E0150D-A724-465F-81E1-D49CEE03BBAB}"/>
-          </ac:spMkLst>
-        </pc:spChg>
-        <pc:spChg chg="mod">
-          <ac:chgData name="Alex Wise" userId="840534413e3eb3ec" providerId="LiveId" clId="{E673EFDB-A2E9-4CAF-BD55-C38C1969773D}" dt="2021-04-20T00:39:54.653" v="2549" actId="20577"/>
-          <ac:spMkLst>
-            <pc:docMk/>
-            <pc:sldMk cId="3103422854" sldId="1457"/>
-            <ac:spMk id="100" creationId="{970D0698-F159-470C-BF1E-22787F28AA9D}"/>
-          </ac:spMkLst>
-        </pc:spChg>
-        <pc:spChg chg="mod">
-          <ac:chgData name="Alex Wise" userId="840534413e3eb3ec" providerId="LiveId" clId="{E673EFDB-A2E9-4CAF-BD55-C38C1969773D}" dt="2021-04-20T00:39:57.972" v="2552" actId="20577"/>
-          <ac:spMkLst>
-            <pc:docMk/>
-            <pc:sldMk cId="3103422854" sldId="1457"/>
-            <ac:spMk id="123" creationId="{847B7F3F-79FE-4A99-AB8B-296A572B4183}"/>
-          </ac:spMkLst>
-        </pc:spChg>
-        <pc:grpChg chg="mod">
-          <ac:chgData name="Alex Wise" userId="840534413e3eb3ec" providerId="LiveId" clId="{E673EFDB-A2E9-4CAF-BD55-C38C1969773D}" dt="2021-04-20T00:48:57.349" v="2800" actId="1036"/>
-          <ac:grpSpMkLst>
-            <pc:docMk/>
-            <pc:sldMk cId="3103422854" sldId="1457"/>
-            <ac:grpSpMk id="2" creationId="{07EB37D1-3845-4640-A4A7-38C548DE7914}"/>
-          </ac:grpSpMkLst>
-        </pc:grpChg>
-        <pc:picChg chg="add del">
-          <ac:chgData name="Alex Wise" userId="840534413e3eb3ec" providerId="LiveId" clId="{E673EFDB-A2E9-4CAF-BD55-C38C1969773D}" dt="2021-04-19T23:51:36.918" v="468" actId="478"/>
-          <ac:picMkLst>
-            <pc:docMk/>
-            <pc:sldMk cId="3103422854" sldId="1457"/>
-            <ac:picMk id="62" creationId="{C1F217D1-DCE2-FB4A-ADA5-C8D5D5D2B9B0}"/>
-          </ac:picMkLst>
-        </pc:picChg>
-        <pc:picChg chg="add del">
-          <ac:chgData name="Alex Wise" userId="840534413e3eb3ec" providerId="LiveId" clId="{E673EFDB-A2E9-4CAF-BD55-C38C1969773D}" dt="2021-04-19T23:51:38.212" v="476" actId="478"/>
-          <ac:picMkLst>
-            <pc:docMk/>
-            <pc:sldMk cId="3103422854" sldId="1457"/>
-            <ac:picMk id="67" creationId="{C2E4AFA1-F1A3-A24D-964C-1A708F618B00}"/>
-          </ac:picMkLst>
-        </pc:picChg>
-        <pc:picChg chg="add del">
-          <ac:chgData name="Alex Wise" userId="840534413e3eb3ec" providerId="LiveId" clId="{E673EFDB-A2E9-4CAF-BD55-C38C1969773D}" dt="2021-04-19T23:51:38.662" v="478" actId="478"/>
-          <ac:picMkLst>
-            <pc:docMk/>
-            <pc:sldMk cId="3103422854" sldId="1457"/>
-            <ac:picMk id="68" creationId="{C0569314-DD78-A645-B1DD-91C07F0FFBC4}"/>
-          </ac:picMkLst>
-        </pc:picChg>
-        <pc:picChg chg="add del">
-          <ac:chgData name="Alex Wise" userId="840534413e3eb3ec" providerId="LiveId" clId="{E673EFDB-A2E9-4CAF-BD55-C38C1969773D}" dt="2021-04-19T23:51:37.571" v="472" actId="478"/>
-          <ac:picMkLst>
-            <pc:docMk/>
-            <pc:sldMk cId="3103422854" sldId="1457"/>
-            <ac:picMk id="69" creationId="{950A2021-5951-834A-B5F8-1BF2A1D27C39}"/>
-          </ac:picMkLst>
-        </pc:picChg>
-        <pc:picChg chg="add del">
-          <ac:chgData name="Alex Wise" userId="840534413e3eb3ec" providerId="LiveId" clId="{E673EFDB-A2E9-4CAF-BD55-C38C1969773D}" dt="2021-04-19T23:51:37.879" v="474" actId="478"/>
-          <ac:picMkLst>
-            <pc:docMk/>
-            <pc:sldMk cId="3103422854" sldId="1457"/>
-            <ac:picMk id="70" creationId="{0BBB8267-767C-8040-8FAA-DC07C88CC277}"/>
-          </ac:picMkLst>
-        </pc:picChg>
-        <pc:picChg chg="del">
-          <ac:chgData name="Alex Wise" userId="840534413e3eb3ec" providerId="LiveId" clId="{E673EFDB-A2E9-4CAF-BD55-C38C1969773D}" dt="2021-04-19T23:51:41.582" v="480" actId="478"/>
-          <ac:picMkLst>
-            <pc:docMk/>
-            <pc:sldMk cId="3103422854" sldId="1457"/>
-            <ac:picMk id="71" creationId="{0AF96DCC-82DF-4F6C-A930-D3AF9E9CABED}"/>
-          </ac:picMkLst>
-        </pc:picChg>
-        <pc:picChg chg="add del">
-          <ac:chgData name="Alex Wise" userId="840534413e3eb3ec" providerId="LiveId" clId="{E673EFDB-A2E9-4CAF-BD55-C38C1969773D}" dt="2021-04-19T23:51:37.250" v="470" actId="478"/>
-          <ac:picMkLst>
-            <pc:docMk/>
-            <pc:sldMk cId="3103422854" sldId="1457"/>
-            <ac:picMk id="72" creationId="{31E13997-DAE3-3F4D-BE23-802A7B0582EB}"/>
-          </ac:picMkLst>
-        </pc:picChg>
-        <pc:cxnChg chg="mod">
-          <ac:chgData name="Alex Wise" userId="840534413e3eb3ec" providerId="LiveId" clId="{E673EFDB-A2E9-4CAF-BD55-C38C1969773D}" dt="2021-04-20T00:42:18.739" v="2616" actId="1076"/>
-          <ac:cxnSpMkLst>
-            <pc:docMk/>
-            <pc:sldMk cId="3103422854" sldId="1457"/>
-            <ac:cxnSpMk id="13" creationId="{ECD30EF0-68F5-4CA3-89E9-84A2A26369F3}"/>
-          </ac:cxnSpMkLst>
-        </pc:cxnChg>
-      </pc:sldChg>
-      <pc:sldChg chg="addSp delSp modSp mod ord">
-        <pc:chgData name="Alex Wise" userId="840534413e3eb3ec" providerId="LiveId" clId="{E673EFDB-A2E9-4CAF-BD55-C38C1969773D}" dt="2021-04-20T00:51:16.782" v="2805" actId="1076"/>
-        <pc:sldMkLst>
-          <pc:docMk/>
-          <pc:sldMk cId="2834139938" sldId="4255"/>
-        </pc:sldMkLst>
-        <pc:spChg chg="mod">
-          <ac:chgData name="Alex Wise" userId="840534413e3eb3ec" providerId="LiveId" clId="{E673EFDB-A2E9-4CAF-BD55-C38C1969773D}" dt="2021-04-20T00:47:49.957" v="2752" actId="1036"/>
-          <ac:spMkLst>
-            <pc:docMk/>
-            <pc:sldMk cId="2834139938" sldId="4255"/>
-            <ac:spMk id="16" creationId="{D494A936-80BE-4DC2-8B5C-B0389ACE6F1F}"/>
-          </ac:spMkLst>
-        </pc:spChg>
-        <pc:spChg chg="mod">
-          <ac:chgData name="Alex Wise" userId="840534413e3eb3ec" providerId="LiveId" clId="{E673EFDB-A2E9-4CAF-BD55-C38C1969773D}" dt="2021-04-20T00:47:49.957" v="2752" actId="1036"/>
-          <ac:spMkLst>
-            <pc:docMk/>
-            <pc:sldMk cId="2834139938" sldId="4255"/>
-            <ac:spMk id="21" creationId="{CF186DA3-E131-412E-8F9B-9B134DEB00A9}"/>
-          </ac:spMkLst>
-        </pc:spChg>
-        <pc:spChg chg="del mod">
-          <ac:chgData name="Alex Wise" userId="840534413e3eb3ec" providerId="LiveId" clId="{E673EFDB-A2E9-4CAF-BD55-C38C1969773D}" dt="2021-04-20T00:35:47.877" v="2445" actId="478"/>
-          <ac:spMkLst>
-            <pc:docMk/>
-            <pc:sldMk cId="2834139938" sldId="4255"/>
-            <ac:spMk id="25" creationId="{50D36FA5-B956-45B0-ACD2-C24E4745905A}"/>
-          </ac:spMkLst>
-        </pc:spChg>
-        <pc:spChg chg="mod">
-          <ac:chgData name="Alex Wise" userId="840534413e3eb3ec" providerId="LiveId" clId="{E673EFDB-A2E9-4CAF-BD55-C38C1969773D}" dt="2021-04-20T00:47:49.957" v="2752" actId="1036"/>
-          <ac:spMkLst>
-            <pc:docMk/>
-            <pc:sldMk cId="2834139938" sldId="4255"/>
-            <ac:spMk id="29" creationId="{DA71739B-8F3D-4F76-BD80-4E6B8FBFEE77}"/>
-          </ac:spMkLst>
-        </pc:spChg>
-        <pc:spChg chg="del">
-          <ac:chgData name="Alex Wise" userId="840534413e3eb3ec" providerId="LiveId" clId="{E673EFDB-A2E9-4CAF-BD55-C38C1969773D}" dt="2021-04-20T00:18:34.366" v="1191" actId="478"/>
-          <ac:spMkLst>
-            <pc:docMk/>
-            <pc:sldMk cId="2834139938" sldId="4255"/>
-            <ac:spMk id="35" creationId="{B3615C2D-21BA-447B-80C3-8EBFAF419B69}"/>
-          </ac:spMkLst>
-        </pc:spChg>
-        <pc:graphicFrameChg chg="modGraphic">
-          <ac:chgData name="Alex Wise" userId="840534413e3eb3ec" providerId="LiveId" clId="{E673EFDB-A2E9-4CAF-BD55-C38C1969773D}" dt="2021-04-20T00:19:58.581" v="1497" actId="20577"/>
-          <ac:graphicFrameMkLst>
-            <pc:docMk/>
-            <pc:sldMk cId="2834139938" sldId="4255"/>
-            <ac:graphicFrameMk id="11" creationId="{27CA79E5-6189-4BA9-B3BF-16EDDE13DE6A}"/>
-          </ac:graphicFrameMkLst>
-        </pc:graphicFrameChg>
-        <pc:picChg chg="del">
-          <ac:chgData name="Alex Wise" userId="840534413e3eb3ec" providerId="LiveId" clId="{E673EFDB-A2E9-4CAF-BD55-C38C1969773D}" dt="2021-04-20T00:31:08.269" v="2150" actId="478"/>
-          <ac:picMkLst>
-            <pc:docMk/>
-            <pc:sldMk cId="2834139938" sldId="4255"/>
-            <ac:picMk id="19" creationId="{0178FBC3-C9E6-43BF-8373-EDF1B5921223}"/>
-          </ac:picMkLst>
-        </pc:picChg>
-        <pc:picChg chg="add del mod">
-          <ac:chgData name="Alex Wise" userId="840534413e3eb3ec" providerId="LiveId" clId="{E673EFDB-A2E9-4CAF-BD55-C38C1969773D}" dt="2021-04-20T00:50:59.173" v="2801" actId="478"/>
-          <ac:picMkLst>
-            <pc:docMk/>
-            <pc:sldMk cId="2834139938" sldId="4255"/>
-            <ac:picMk id="22" creationId="{19FAB541-ED60-4698-9F26-F1C35FCF4068}"/>
-          </ac:picMkLst>
-        </pc:picChg>
-        <pc:picChg chg="add mod">
-          <ac:chgData name="Alex Wise" userId="840534413e3eb3ec" providerId="LiveId" clId="{E673EFDB-A2E9-4CAF-BD55-C38C1969773D}" dt="2021-04-20T00:51:16.782" v="2805" actId="1076"/>
-          <ac:picMkLst>
-            <pc:docMk/>
-            <pc:sldMk cId="2834139938" sldId="4255"/>
-            <ac:picMk id="23" creationId="{D9043F41-29A6-4F43-8CDD-3E59FD9D4755}"/>
-          </ac:picMkLst>
-        </pc:picChg>
-        <pc:picChg chg="del">
-          <ac:chgData name="Alex Wise" userId="840534413e3eb3ec" providerId="LiveId" clId="{E673EFDB-A2E9-4CAF-BD55-C38C1969773D}" dt="2021-04-20T00:35:50.229" v="2446" actId="478"/>
-          <ac:picMkLst>
-            <pc:docMk/>
-            <pc:sldMk cId="2834139938" sldId="4255"/>
-            <ac:picMk id="37" creationId="{4F8D349C-989E-4AE2-BA39-E8EF23546B60}"/>
-          </ac:picMkLst>
-        </pc:picChg>
-        <pc:picChg chg="mod">
-          <ac:chgData name="Alex Wise" userId="840534413e3eb3ec" providerId="LiveId" clId="{E673EFDB-A2E9-4CAF-BD55-C38C1969773D}" dt="2021-04-20T00:51:11.809" v="2804" actId="14100"/>
-          <ac:picMkLst>
-            <pc:docMk/>
-            <pc:sldMk cId="2834139938" sldId="4255"/>
-            <ac:picMk id="38" creationId="{2E78A9AC-937B-4BC8-AF7B-E57BD54F8C52}"/>
-          </ac:picMkLst>
-        </pc:picChg>
-        <pc:picChg chg="mod">
-          <ac:chgData name="Alex Wise" userId="840534413e3eb3ec" providerId="LiveId" clId="{E673EFDB-A2E9-4CAF-BD55-C38C1969773D}" dt="2021-04-20T00:51:07.764" v="2803" actId="14100"/>
-          <ac:picMkLst>
-            <pc:docMk/>
-            <pc:sldMk cId="2834139938" sldId="4255"/>
-            <ac:picMk id="39" creationId="{F1ED8F50-9A1B-4789-9101-3CA6296EE119}"/>
-          </ac:picMkLst>
-        </pc:picChg>
-      </pc:sldChg>
-      <pc:sldChg chg="modSp mod modNotesTx">
-        <pc:chgData name="Alex Wise" userId="840534413e3eb3ec" providerId="LiveId" clId="{E673EFDB-A2E9-4CAF-BD55-C38C1969773D}" dt="2021-04-20T00:33:44.542" v="2444" actId="20577"/>
-        <pc:sldMkLst>
-          <pc:docMk/>
-          <pc:sldMk cId="3891324679" sldId="4262"/>
-        </pc:sldMkLst>
-        <pc:spChg chg="mod">
-          <ac:chgData name="Alex Wise" userId="840534413e3eb3ec" providerId="LiveId" clId="{E673EFDB-A2E9-4CAF-BD55-C38C1969773D}" dt="2021-04-20T00:33:44.542" v="2444" actId="20577"/>
-          <ac:spMkLst>
-            <pc:docMk/>
-            <pc:sldMk cId="3891324679" sldId="4262"/>
-            <ac:spMk id="5" creationId="{1029405C-2954-407F-968E-0E9B8107B001}"/>
-          </ac:spMkLst>
-        </pc:spChg>
-      </pc:sldChg>
-      <pc:sldChg chg="del ord modNotesTx">
-        <pc:chgData name="Alex Wise" userId="840534413e3eb3ec" providerId="LiveId" clId="{E673EFDB-A2E9-4CAF-BD55-C38C1969773D}" dt="2021-04-19T23:49:57.063" v="426" actId="47"/>
-        <pc:sldMkLst>
-          <pc:docMk/>
-          <pc:sldMk cId="3867198644" sldId="4271"/>
-        </pc:sldMkLst>
-      </pc:sldChg>
-      <pc:sldChg chg="del">
-        <pc:chgData name="Alex Wise" userId="840534413e3eb3ec" providerId="LiveId" clId="{E673EFDB-A2E9-4CAF-BD55-C38C1969773D}" dt="2021-04-20T00:25:55.022" v="1800" actId="47"/>
-        <pc:sldMkLst>
-          <pc:docMk/>
-          <pc:sldMk cId="3344111802" sldId="4273"/>
-        </pc:sldMkLst>
-      </pc:sldChg>
-      <pc:sldChg chg="delSp modSp new mod">
-        <pc:chgData name="Alex Wise" userId="840534413e3eb3ec" providerId="LiveId" clId="{E673EFDB-A2E9-4CAF-BD55-C38C1969773D}" dt="2021-04-20T02:01:49.843" v="2935" actId="20577"/>
-        <pc:sldMkLst>
-          <pc:docMk/>
-          <pc:sldMk cId="3552195715" sldId="4274"/>
-        </pc:sldMkLst>
-        <pc:spChg chg="del">
-          <ac:chgData name="Alex Wise" userId="840534413e3eb3ec" providerId="LiveId" clId="{E673EFDB-A2E9-4CAF-BD55-C38C1969773D}" dt="2021-04-20T00:02:13.879" v="817" actId="478"/>
-          <ac:spMkLst>
-            <pc:docMk/>
-            <pc:sldMk cId="3552195715" sldId="4274"/>
-            <ac:spMk id="2" creationId="{D80D2EE2-2453-4E74-822C-AE44A7947560}"/>
-          </ac:spMkLst>
-        </pc:spChg>
-        <pc:spChg chg="mod">
-          <ac:chgData name="Alex Wise" userId="840534413e3eb3ec" providerId="LiveId" clId="{E673EFDB-A2E9-4CAF-BD55-C38C1969773D}" dt="2021-04-20T02:01:49.843" v="2935" actId="20577"/>
-          <ac:spMkLst>
-            <pc:docMk/>
-            <pc:sldMk cId="3552195715" sldId="4274"/>
-            <ac:spMk id="4" creationId="{9A51B892-AA72-40B9-AC8A-05BE64B0217E}"/>
-          </ac:spMkLst>
-        </pc:spChg>
-        <pc:spChg chg="mod">
-          <ac:chgData name="Alex Wise" userId="840534413e3eb3ec" providerId="LiveId" clId="{E673EFDB-A2E9-4CAF-BD55-C38C1969773D}" dt="2021-04-20T00:31:55.139" v="2175" actId="20577"/>
-          <ac:spMkLst>
-            <pc:docMk/>
-            <pc:sldMk cId="3552195715" sldId="4274"/>
-            <ac:spMk id="5" creationId="{045B8B9F-D6E0-40D0-804E-1512F318E5AD}"/>
-          </ac:spMkLst>
-        </pc:spChg>
-      </pc:sldChg>
-      <pc:sldChg chg="delSp modSp add mod modNotesTx">
-        <pc:chgData name="Alex Wise" userId="840534413e3eb3ec" providerId="LiveId" clId="{E673EFDB-A2E9-4CAF-BD55-C38C1969773D}" dt="2021-04-20T00:43:27.117" v="2731" actId="20577"/>
-        <pc:sldMkLst>
-          <pc:docMk/>
-          <pc:sldMk cId="3749372390" sldId="4275"/>
-        </pc:sldMkLst>
-        <pc:spChg chg="del">
-          <ac:chgData name="Alex Wise" userId="840534413e3eb3ec" providerId="LiveId" clId="{E673EFDB-A2E9-4CAF-BD55-C38C1969773D}" dt="2021-04-20T00:02:16.669" v="818" actId="478"/>
-          <ac:spMkLst>
-            <pc:docMk/>
-            <pc:sldMk cId="3749372390" sldId="4275"/>
-            <ac:spMk id="2" creationId="{D80D2EE2-2453-4E74-822C-AE44A7947560}"/>
-          </ac:spMkLst>
-        </pc:spChg>
-        <pc:spChg chg="mod">
-          <ac:chgData name="Alex Wise" userId="840534413e3eb3ec" providerId="LiveId" clId="{E673EFDB-A2E9-4CAF-BD55-C38C1969773D}" dt="2021-04-20T00:32:11.718" v="2199" actId="20577"/>
-          <ac:spMkLst>
-            <pc:docMk/>
-            <pc:sldMk cId="3749372390" sldId="4275"/>
-            <ac:spMk id="5" creationId="{045B8B9F-D6E0-40D0-804E-1512F318E5AD}"/>
-          </ac:spMkLst>
-        </pc:spChg>
-      </pc:sldChg>
-      <pc:sldMasterChg chg="delSldLayout">
-        <pc:chgData name="Alex Wise" userId="840534413e3eb3ec" providerId="LiveId" clId="{E673EFDB-A2E9-4CAF-BD55-C38C1969773D}" dt="2021-04-18T19:14:04.162" v="28" actId="47"/>
-        <pc:sldMasterMkLst>
-          <pc:docMk/>
-          <pc:sldMasterMk cId="4220988333" sldId="2147483691"/>
-        </pc:sldMasterMkLst>
-        <pc:sldLayoutChg chg="del">
-          <pc:chgData name="Alex Wise" userId="840534413e3eb3ec" providerId="LiveId" clId="{E673EFDB-A2E9-4CAF-BD55-C38C1969773D}" dt="2021-04-18T19:14:04.162" v="28" actId="47"/>
-          <pc:sldLayoutMkLst>
-            <pc:docMk/>
-            <pc:sldMasterMk cId="4220988333" sldId="2147483691"/>
-            <pc:sldLayoutMk cId="2728694898" sldId="2147483755"/>
-          </pc:sldLayoutMkLst>
-        </pc:sldLayoutChg>
-      </pc:sldMasterChg>
-    </pc:docChg>
-  </pc:docChgLst>
-</pc:chgInfo>
-</file>
-
 <file path=ppt/handoutMasters/handoutMaster1.xml><?xml version="1.0" encoding="utf-8"?>
 <p:handoutMaster xmlns:a="http://schemas.openxmlformats.org/drawingml/2006/main" xmlns:r="http://schemas.openxmlformats.org/officeDocument/2006/relationships" xmlns:p="http://schemas.openxmlformats.org/presentationml/2006/main">
   <p:cSld>
@@ -1068,7 +228,7 @@
                 <a:latin typeface="Arial" panose="020B0604020202020204" pitchFamily="34" charset="0"/>
                 <a:cs typeface="Arial" panose="020B0604020202020204" pitchFamily="34" charset="0"/>
               </a:rPr>
-              <a:t>4/21/2021</a:t>
+              <a:t>4/24/2021</a:t>
             </a:fld>
             <a:endParaRPr lang="en-US" sz="1000" dirty="0">
               <a:latin typeface="Arial" panose="020B0604020202020204" pitchFamily="34" charset="0"/>
@@ -1249,7 +409,7 @@
           <a:p>
             <a:fld id="{58B8B8CD-F4D7-423F-966E-8A058DF60DFE}" type="datetime1">
               <a:rPr lang="en-US" smtClean="0"/>
-              <a:t>4/21/2021</a:t>
+              <a:t>4/24/2021</a:t>
             </a:fld>
             <a:endParaRPr lang="en-US" dirty="0"/>
           </a:p>
@@ -1585,7 +745,7 @@
           <a:p>
             <a:fld id="{05409AE7-6877-4C14-86F0-BB63E25A6E0D}" type="datetime1">
               <a:rPr lang="en-US" smtClean="0"/>
-              <a:t>4/21/2021</a:t>
+              <a:t>4/24/2021</a:t>
             </a:fld>
             <a:endParaRPr lang="en-US" dirty="0"/>
           </a:p>
@@ -1714,7 +874,7 @@
           <a:p>
             <a:fld id="{EE032E31-25FA-5843-9B22-66794CE8E083}" type="datetime1">
               <a:rPr lang="en-US" smtClean="0"/>
-              <a:t>4/21/2021</a:t>
+              <a:t>4/24/2021</a:t>
             </a:fld>
             <a:endParaRPr lang="en-US" dirty="0"/>
           </a:p>
@@ -2329,7 +1489,7 @@
           <a:p>
             <a:fld id="{EE032E31-25FA-5843-9B22-66794CE8E083}" type="datetime1">
               <a:rPr lang="en-US" smtClean="0"/>
-              <a:t>4/21/2021</a:t>
+              <a:t>4/24/2021</a:t>
             </a:fld>
             <a:endParaRPr lang="en-US" dirty="0"/>
           </a:p>
@@ -2392,6 +1552,75 @@
           <a:bodyPr/>
           <a:lstStyle/>
           <a:p>
+            <a:pPr marL="171450" marR="0" lvl="0" indent="-171450" algn="l" defTabSz="914400" rtl="0" eaLnBrk="1" fontAlgn="auto" latinLnBrk="0" hangingPunct="1">
+              <a:lnSpc>
+                <a:spcPct val="100000"/>
+              </a:lnSpc>
+              <a:spcBef>
+                <a:spcPts val="0"/>
+              </a:spcBef>
+              <a:spcAft>
+                <a:spcPts val="0"/>
+              </a:spcAft>
+              <a:buClrTx/>
+              <a:buSzTx/>
+              <a:buFont typeface="Arial" panose="020B0604020202020204" pitchFamily="34" charset="0"/>
+              <a:buChar char="•"/>
+              <a:tabLst/>
+              <a:defRPr/>
+            </a:pPr>
+            <a:r>
+              <a:rPr lang="en-US" sz="1000" dirty="0"/>
+              <a:t>After three iterations, we created a parsimonious data set that used four features (manufacturer, contract, customer, and rejection reason) which didn’t sacrifice too much accuracy</a:t>
+            </a:r>
+          </a:p>
+          <a:p>
+            <a:pPr marL="171450" marR="0" lvl="0" indent="-171450" algn="l" defTabSz="914400" rtl="0" eaLnBrk="1" fontAlgn="auto" latinLnBrk="0" hangingPunct="1">
+              <a:lnSpc>
+                <a:spcPct val="100000"/>
+              </a:lnSpc>
+              <a:spcBef>
+                <a:spcPts val="0"/>
+              </a:spcBef>
+              <a:spcAft>
+                <a:spcPts val="0"/>
+              </a:spcAft>
+              <a:buClrTx/>
+              <a:buSzTx/>
+              <a:buFont typeface="Arial" panose="020B0604020202020204" pitchFamily="34" charset="0"/>
+              <a:buChar char="•"/>
+              <a:tabLst/>
+              <a:defRPr/>
+            </a:pPr>
+            <a:r>
+              <a:rPr lang="en-US" sz="1000" dirty="0"/>
+              <a:t>In our data set, false negatives are actually the most damaging. We may classify something as a write off, but we actually should have resubmitted the claim and received payment.</a:t>
+            </a:r>
+          </a:p>
+          <a:p>
+            <a:pPr marL="171450" marR="0" lvl="0" indent="-171450" algn="l" defTabSz="914400" rtl="0" eaLnBrk="1" fontAlgn="auto" latinLnBrk="0" hangingPunct="1">
+              <a:lnSpc>
+                <a:spcPct val="100000"/>
+              </a:lnSpc>
+              <a:spcBef>
+                <a:spcPts val="0"/>
+              </a:spcBef>
+              <a:spcAft>
+                <a:spcPts val="0"/>
+              </a:spcAft>
+              <a:buClrTx/>
+              <a:buSzTx/>
+              <a:buFont typeface="Arial" panose="020B0604020202020204" pitchFamily="34" charset="0"/>
+              <a:buChar char="•"/>
+              <a:tabLst/>
+              <a:defRPr/>
+            </a:pPr>
+            <a:r>
+              <a:rPr lang="en-US" sz="1000" dirty="0"/>
+              <a:t>So we want a good recall score for our write off activity</a:t>
+            </a:r>
+          </a:p>
+          <a:p>
             <a:pPr marL="0" marR="0" lvl="0" indent="0" algn="l" defTabSz="914400" rtl="0" eaLnBrk="1" fontAlgn="auto" latinLnBrk="0" hangingPunct="1">
               <a:lnSpc>
                 <a:spcPct val="100000"/>
@@ -2480,13 +1709,8 @@
             </a:pPr>
             <a:r>
               <a:rPr lang="en-US" sz="1000" dirty="0"/>
-              <a:t>Used feature importance to keep </a:t>
-            </a:r>
-            <a:r>
-              <a:rPr lang="en-US" sz="1000"/>
-              <a:t>scaling down</a:t>
-            </a:r>
-            <a:endParaRPr lang="en-US" sz="1000" dirty="0"/>
+              <a:t>Used feature importance to keep scaling down</a:t>
+            </a:r>
           </a:p>
           <a:p>
             <a:endParaRPr lang="en-US" dirty="0"/>
@@ -2638,9 +1862,9 @@
           <a:bodyPr/>
           <a:lstStyle/>
           <a:p>
-            <a:fld id="{EE032E31-25FA-5843-9B22-66794CE8E083}" type="datetime1">
+            <a:fld id="{69E6E978-30DC-3E4F-AEEA-15C5B55C775D}" type="datetime1">
               <a:rPr lang="en-US" smtClean="0"/>
-              <a:t>4/21/2021</a:t>
+              <a:t>4/24/2021</a:t>
             </a:fld>
             <a:endParaRPr lang="en-US" dirty="0"/>
           </a:p>
@@ -2694,7 +1918,7 @@
     </p:spTree>
     <p:extLst>
       <p:ext uri="{BB962C8B-B14F-4D97-AF65-F5344CB8AC3E}">
-        <p14:creationId xmlns:p14="http://schemas.microsoft.com/office/powerpoint/2010/main" val="1029600252"/>
+        <p14:creationId xmlns:p14="http://schemas.microsoft.com/office/powerpoint/2010/main" val="3859504842"/>
       </p:ext>
     </p:extLst>
   </p:cSld>
@@ -2769,7 +1993,7 @@
           <a:p>
             <a:fld id="{EE032E31-25FA-5843-9B22-66794CE8E083}" type="datetime1">
               <a:rPr lang="en-US" smtClean="0"/>
-              <a:t>4/21/2021</a:t>
+              <a:t>4/24/2021</a:t>
             </a:fld>
             <a:endParaRPr lang="en-US" dirty="0"/>
           </a:p>
@@ -3321,7 +2545,7 @@
           <a:p>
             <a:fld id="{69CA356C-3E76-4361-8A29-C4D3A3799A48}" type="datetime1">
               <a:rPr lang="en-US" smtClean="0"/>
-              <a:t>4/21/2021</a:t>
+              <a:t>4/24/2021</a:t>
             </a:fld>
             <a:endParaRPr lang="en-US" dirty="0"/>
           </a:p>
@@ -5004,7 +4228,7 @@
           <a:p>
             <a:fld id="{BF95C05F-96E7-4A44-BBF7-5CCA7ADEC192}" type="datetime1">
               <a:rPr lang="en-US" smtClean="0"/>
-              <a:t>4/21/2021</a:t>
+              <a:t>4/24/2021</a:t>
             </a:fld>
             <a:endParaRPr lang="en-US" dirty="0"/>
           </a:p>
@@ -5228,7 +4452,7 @@
           <a:p>
             <a:fld id="{C5D0804D-3253-4D0C-8E4C-04BBAE4EBC72}" type="datetime1">
               <a:rPr lang="en-US" smtClean="0"/>
-              <a:t>4/21/2021</a:t>
+              <a:t>4/24/2021</a:t>
             </a:fld>
             <a:endParaRPr lang="en-US" dirty="0"/>
           </a:p>
@@ -6047,7 +5271,7 @@
           <a:p>
             <a:fld id="{13E81DC0-083F-46F7-A159-A864F704612E}" type="datetime1">
               <a:rPr lang="en-US" smtClean="0"/>
-              <a:t>4/21/2021</a:t>
+              <a:t>4/24/2021</a:t>
             </a:fld>
             <a:endParaRPr lang="en-US" dirty="0"/>
           </a:p>
@@ -6800,7 +6024,7 @@
             </a:pPr>
             <a:fld id="{17FDBBF9-841E-4DBE-9D68-070720FCDF71}" type="datetime1">
               <a:rPr lang="en-US" smtClean="0"/>
-              <a:t>4/21/2021</a:t>
+              <a:t>4/24/2021</a:t>
             </a:fld>
             <a:endParaRPr dirty="0"/>
           </a:p>
@@ -6920,7 +6144,7 @@
                   <a:srgbClr val="005A8C"/>
                 </a:solidFill>
               </a:rPr>
-              <a:t>4/21/2021</a:t>
+              <a:t>4/24/2021</a:t>
             </a:fld>
             <a:endParaRPr dirty="0">
               <a:solidFill>
@@ -7154,7 +6378,7 @@
           <a:p>
             <a:fld id="{0F8E20AF-A5CA-449B-87BE-6387B4C6D14D}" type="datetime1">
               <a:rPr lang="en-US" smtClean="0"/>
-              <a:t>4/21/2021</a:t>
+              <a:t>4/24/2021</a:t>
             </a:fld>
             <a:endParaRPr dirty="0"/>
           </a:p>
@@ -7352,7 +6576,7 @@
                   <a:prstClr val="white"/>
                 </a:solidFill>
               </a:rPr>
-              <a:t>4/21/2021</a:t>
+              <a:t>4/24/2021</a:t>
             </a:fld>
             <a:endParaRPr dirty="0">
               <a:solidFill>
@@ -7670,7 +6894,7 @@
                   <a:prstClr val="white"/>
                 </a:solidFill>
               </a:rPr>
-              <a:t>4/21/2021</a:t>
+              <a:t>4/24/2021</a:t>
             </a:fld>
             <a:endParaRPr dirty="0">
               <a:solidFill>
@@ -7984,7 +7208,7 @@
             </a:pPr>
             <a:fld id="{F0C93554-6F59-4CDE-943A-B5ECBD7D7E8C}" type="datetime1">
               <a:rPr lang="en-US" smtClean="0"/>
-              <a:t>4/21/2021</a:t>
+              <a:t>4/24/2021</a:t>
             </a:fld>
             <a:endParaRPr lang="en-US" dirty="0"/>
           </a:p>
@@ -8155,7 +7379,7 @@
           <a:p>
             <a:fld id="{B8164D97-5126-42B4-979F-10E2B637584F}" type="datetime1">
               <a:rPr lang="en-US" smtClean="0"/>
-              <a:t>4/21/2021</a:t>
+              <a:t>4/24/2021</a:t>
             </a:fld>
             <a:endParaRPr lang="en-US" dirty="0"/>
           </a:p>
@@ -8453,7 +7677,7 @@
           <a:p>
             <a:fld id="{99323AAB-B6A8-489B-9563-6C5CA35ECA06}" type="datetime1">
               <a:rPr lang="en-US" smtClean="0"/>
-              <a:t>4/21/2021</a:t>
+              <a:t>4/24/2021</a:t>
             </a:fld>
             <a:endParaRPr lang="en-US" dirty="0"/>
           </a:p>
@@ -8713,7 +7937,7 @@
           <a:p>
             <a:fld id="{7764B447-1BE3-4665-82DA-5995DB4C2E29}" type="datetime1">
               <a:rPr lang="en-US" smtClean="0"/>
-              <a:t>4/21/2021</a:t>
+              <a:t>4/24/2021</a:t>
             </a:fld>
             <a:endParaRPr lang="en-US" dirty="0"/>
           </a:p>
@@ -8932,7 +8156,7 @@
           <a:p>
             <a:fld id="{E4506C6D-77F3-418D-BF81-DBBF9FBEF6CB}" type="datetime1">
               <a:rPr lang="en-US" smtClean="0"/>
-              <a:t>4/21/2021</a:t>
+              <a:t>4/24/2021</a:t>
             </a:fld>
             <a:endParaRPr lang="en-US" dirty="0"/>
           </a:p>
@@ -10610,7 +9834,7 @@
           <a:p>
             <a:fld id="{BA7F4066-49E4-414A-90B2-7ABE78478270}" type="datetime1">
               <a:rPr lang="en-US" smtClean="0"/>
-              <a:t>4/21/2021</a:t>
+              <a:t>4/24/2021</a:t>
             </a:fld>
             <a:endParaRPr lang="en-US" dirty="0"/>
           </a:p>
@@ -10875,7 +10099,7 @@
           <a:p>
             <a:fld id="{770CB35E-DF6A-4AB5-9B94-DD24C8388384}" type="datetime1">
               <a:rPr lang="en-US" smtClean="0"/>
-              <a:t>4/21/2021</a:t>
+              <a:t>4/24/2021</a:t>
             </a:fld>
             <a:endParaRPr lang="en-US" dirty="0"/>
           </a:p>
@@ -19776,7 +19000,7 @@
           <p:cNvPr id="4" name="Slide Number Placeholder 3">
             <a:extLst>
               <a:ext uri="{FF2B5EF4-FFF2-40B4-BE49-F238E27FC236}">
-                <a16:creationId xmlns:a16="http://schemas.microsoft.com/office/drawing/2014/main" id="{A6DE7AEE-F543-554C-B3C5-1F00B1669ADE}"/>
+                <a16:creationId xmlns:a16="http://schemas.microsoft.com/office/drawing/2014/main" id="{5A0604FD-E082-4A49-9D1C-0E6192131204}"/>
               </a:ext>
             </a:extLst>
           </p:cNvPr>
@@ -19784,7 +19008,7 @@
             <a:spLocks noGrp="1"/>
           </p:cNvSpPr>
           <p:nvPr>
-            <p:ph type="sldNum" sz="quarter" idx="11"/>
+            <p:ph type="sldNum" sz="quarter" idx="16"/>
           </p:nvPr>
         </p:nvSpPr>
         <p:spPr/>
@@ -19803,10 +19027,10 @@
       </p:sp>
       <p:sp>
         <p:nvSpPr>
-          <p:cNvPr id="6" name="Title 5">
+          <p:cNvPr id="5" name="Title 4">
             <a:extLst>
               <a:ext uri="{FF2B5EF4-FFF2-40B4-BE49-F238E27FC236}">
-                <a16:creationId xmlns:a16="http://schemas.microsoft.com/office/drawing/2014/main" id="{E4C98F3C-D1E4-144A-9D35-C02A19043A72}"/>
+                <a16:creationId xmlns:a16="http://schemas.microsoft.com/office/drawing/2014/main" id="{6A9FA595-83A4-2245-B6BB-EBDF031C64D8}"/>
               </a:ext>
             </a:extLst>
           </p:cNvPr>
@@ -19824,77 +19048,1403 @@
           <a:p>
             <a:r>
               <a:rPr lang="en-US" dirty="0"/>
-              <a:t>Conclusions and Postmortem</a:t>
-            </a:r>
-          </a:p>
-        </p:txBody>
-      </p:sp>
-      <p:sp>
-        <p:nvSpPr>
-          <p:cNvPr id="5" name="Content Placeholder 4">
+              <a:t>Conclusions</a:t>
+            </a:r>
+          </a:p>
+        </p:txBody>
+      </p:sp>
+      <p:grpSp>
+        <p:nvGrpSpPr>
+          <p:cNvPr id="3" name="Group 2">
             <a:extLst>
               <a:ext uri="{FF2B5EF4-FFF2-40B4-BE49-F238E27FC236}">
-                <a16:creationId xmlns:a16="http://schemas.microsoft.com/office/drawing/2014/main" id="{1029405C-2954-407F-968E-0E9B8107B001}"/>
+                <a16:creationId xmlns:a16="http://schemas.microsoft.com/office/drawing/2014/main" id="{B173EA57-4006-394D-A349-C808D9964188}"/>
               </a:ext>
             </a:extLst>
           </p:cNvPr>
-          <p:cNvSpPr>
-            <a:spLocks noGrp="1"/>
-          </p:cNvSpPr>
-          <p:nvPr>
-            <p:ph sz="quarter" idx="13"/>
-          </p:nvPr>
-        </p:nvSpPr>
-        <p:spPr/>
-        <p:txBody>
-          <a:bodyPr>
-            <a:normAutofit/>
-          </a:bodyPr>
-          <a:lstStyle/>
-          <a:p>
-            <a:pPr>
-              <a:spcAft>
-                <a:spcPts val="1200"/>
-              </a:spcAft>
-            </a:pPr>
-            <a:r>
-              <a:rPr lang="en-US" dirty="0"/>
-              <a:t>Apply these visualizations and models to other business units (one of four represented)</a:t>
-            </a:r>
-          </a:p>
-          <a:p>
-            <a:pPr>
-              <a:spcAft>
-                <a:spcPts val="1200"/>
-              </a:spcAft>
-            </a:pPr>
-            <a:r>
-              <a:rPr lang="en-US" dirty="0"/>
-              <a:t>Apply across different time horizons to see if model accuracy remains high</a:t>
-            </a:r>
-          </a:p>
-          <a:p>
-            <a:pPr>
-              <a:spcAft>
-                <a:spcPts val="1200"/>
-              </a:spcAft>
-            </a:pPr>
-            <a:endParaRPr lang="en-US" dirty="0"/>
-          </a:p>
-          <a:p>
-            <a:pPr>
-              <a:spcAft>
-                <a:spcPts val="1200"/>
-              </a:spcAft>
-            </a:pPr>
-            <a:endParaRPr lang="en-US" dirty="0"/>
-          </a:p>
-        </p:txBody>
-      </p:sp>
+          <p:cNvGrpSpPr/>
+          <p:nvPr/>
+        </p:nvGrpSpPr>
+        <p:grpSpPr>
+          <a:xfrm>
+            <a:off x="356616" y="1069848"/>
+            <a:ext cx="11477685" cy="4865917"/>
+            <a:chOff x="356616" y="1106424"/>
+            <a:chExt cx="11477685" cy="4865917"/>
+          </a:xfrm>
+        </p:grpSpPr>
+        <p:sp>
+          <p:nvSpPr>
+            <p:cNvPr id="38" name="Isosceles Triangle 52">
+              <a:extLst>
+                <a:ext uri="{FF2B5EF4-FFF2-40B4-BE49-F238E27FC236}">
+                  <a16:creationId xmlns:a16="http://schemas.microsoft.com/office/drawing/2014/main" id="{CCDC4B98-B1B9-8B4F-A179-A7CBBA0C86D0}"/>
+                </a:ext>
+              </a:extLst>
+            </p:cNvPr>
+            <p:cNvSpPr/>
+            <p:nvPr/>
+          </p:nvSpPr>
+          <p:spPr>
+            <a:xfrm rot="5400000">
+              <a:off x="4630146" y="3716250"/>
+              <a:ext cx="2774909" cy="335116"/>
+            </a:xfrm>
+            <a:prstGeom prst="triangle">
+              <a:avLst/>
+            </a:prstGeom>
+            <a:solidFill>
+              <a:srgbClr val="CCDEE8"/>
+            </a:solidFill>
+            <a:ln>
+              <a:noFill/>
+            </a:ln>
+          </p:spPr>
+          <p:style>
+            <a:lnRef idx="2">
+              <a:schemeClr val="accent1">
+                <a:shade val="50000"/>
+              </a:schemeClr>
+            </a:lnRef>
+            <a:fillRef idx="1">
+              <a:schemeClr val="accent1"/>
+            </a:fillRef>
+            <a:effectRef idx="0">
+              <a:schemeClr val="accent1"/>
+            </a:effectRef>
+            <a:fontRef idx="minor">
+              <a:schemeClr val="lt1"/>
+            </a:fontRef>
+          </p:style>
+          <p:txBody>
+            <a:bodyPr rtlCol="0" anchor="ctr"/>
+            <a:lstStyle/>
+            <a:p>
+              <a:pPr algn="ctr"/>
+              <a:endParaRPr lang="en-US" dirty="0"/>
+            </a:p>
+          </p:txBody>
+        </p:sp>
+        <p:sp>
+          <p:nvSpPr>
+            <p:cNvPr id="21" name="TextBox 20">
+              <a:extLst>
+                <a:ext uri="{FF2B5EF4-FFF2-40B4-BE49-F238E27FC236}">
+                  <a16:creationId xmlns:a16="http://schemas.microsoft.com/office/drawing/2014/main" id="{FF6BBA13-3CB8-044C-A8DB-9240D18B89C3}"/>
+                </a:ext>
+              </a:extLst>
+            </p:cNvPr>
+            <p:cNvSpPr txBox="1"/>
+            <p:nvPr/>
+          </p:nvSpPr>
+          <p:spPr>
+            <a:xfrm>
+              <a:off x="356616" y="1106424"/>
+              <a:ext cx="5527343" cy="358907"/>
+            </a:xfrm>
+            <a:prstGeom prst="rect">
+              <a:avLst/>
+            </a:prstGeom>
+            <a:noFill/>
+            <a:ln w="38100">
+              <a:noFill/>
+            </a:ln>
+          </p:spPr>
+          <p:txBody>
+            <a:bodyPr wrap="square" lIns="0" tIns="0" rIns="0" bIns="0" rtlCol="0" anchor="b">
+              <a:noAutofit/>
+            </a:bodyPr>
+            <a:lstStyle/>
+            <a:p>
+              <a:r>
+                <a:rPr lang="en-US" sz="1600" b="1" dirty="0">
+                  <a:solidFill>
+                    <a:schemeClr val="tx2"/>
+                  </a:solidFill>
+                </a:rPr>
+                <a:t>Our Visuals and Models Enable Meaningful Action</a:t>
+              </a:r>
+            </a:p>
+          </p:txBody>
+        </p:sp>
+        <p:cxnSp>
+          <p:nvCxnSpPr>
+            <p:cNvPr id="22" name="Straight Connector 21">
+              <a:extLst>
+                <a:ext uri="{FF2B5EF4-FFF2-40B4-BE49-F238E27FC236}">
+                  <a16:creationId xmlns:a16="http://schemas.microsoft.com/office/drawing/2014/main" id="{78E22D18-4887-E840-94CD-D813C4B62AE7}"/>
+                </a:ext>
+              </a:extLst>
+            </p:cNvPr>
+            <p:cNvCxnSpPr>
+              <a:cxnSpLocks/>
+            </p:cNvCxnSpPr>
+            <p:nvPr/>
+          </p:nvCxnSpPr>
+          <p:spPr>
+            <a:xfrm flipV="1">
+              <a:off x="356616" y="1572768"/>
+              <a:ext cx="5522989" cy="0"/>
+            </a:xfrm>
+            <a:prstGeom prst="line">
+              <a:avLst/>
+            </a:prstGeom>
+            <a:ln w="28575" cap="rnd">
+              <a:solidFill>
+                <a:schemeClr val="tx2"/>
+              </a:solidFill>
+              <a:prstDash val="sysDot"/>
+            </a:ln>
+          </p:spPr>
+          <p:style>
+            <a:lnRef idx="1">
+              <a:schemeClr val="accent1"/>
+            </a:lnRef>
+            <a:fillRef idx="0">
+              <a:schemeClr val="accent1"/>
+            </a:fillRef>
+            <a:effectRef idx="0">
+              <a:schemeClr val="accent1"/>
+            </a:effectRef>
+            <a:fontRef idx="minor">
+              <a:schemeClr val="tx1"/>
+            </a:fontRef>
+          </p:style>
+        </p:cxnSp>
+        <p:sp>
+          <p:nvSpPr>
+            <p:cNvPr id="23" name="TextBox 22">
+              <a:extLst>
+                <a:ext uri="{FF2B5EF4-FFF2-40B4-BE49-F238E27FC236}">
+                  <a16:creationId xmlns:a16="http://schemas.microsoft.com/office/drawing/2014/main" id="{DAF9C74D-346C-B847-9396-7ECF640FA6C0}"/>
+                </a:ext>
+              </a:extLst>
+            </p:cNvPr>
+            <p:cNvSpPr txBox="1"/>
+            <p:nvPr/>
+          </p:nvSpPr>
+          <p:spPr>
+            <a:xfrm>
+              <a:off x="6300718" y="1106424"/>
+              <a:ext cx="5527343" cy="358907"/>
+            </a:xfrm>
+            <a:prstGeom prst="rect">
+              <a:avLst/>
+            </a:prstGeom>
+            <a:noFill/>
+            <a:ln w="38100">
+              <a:noFill/>
+            </a:ln>
+          </p:spPr>
+          <p:txBody>
+            <a:bodyPr wrap="square" lIns="0" tIns="0" rIns="0" bIns="0" rtlCol="0" anchor="b">
+              <a:noAutofit/>
+            </a:bodyPr>
+            <a:lstStyle/>
+            <a:p>
+              <a:r>
+                <a:rPr lang="en-US" sz="1600" b="1" dirty="0">
+                  <a:solidFill>
+                    <a:schemeClr val="tx2"/>
+                  </a:solidFill>
+                </a:rPr>
+                <a:t>Working Capital Improvement Can Easily be Made</a:t>
+              </a:r>
+            </a:p>
+          </p:txBody>
+        </p:sp>
+        <p:cxnSp>
+          <p:nvCxnSpPr>
+            <p:cNvPr id="24" name="Straight Connector 23">
+              <a:extLst>
+                <a:ext uri="{FF2B5EF4-FFF2-40B4-BE49-F238E27FC236}">
+                  <a16:creationId xmlns:a16="http://schemas.microsoft.com/office/drawing/2014/main" id="{F42D66C4-B64D-B246-8D7C-758ECE17BD42}"/>
+                </a:ext>
+              </a:extLst>
+            </p:cNvPr>
+            <p:cNvCxnSpPr>
+              <a:cxnSpLocks/>
+            </p:cNvCxnSpPr>
+            <p:nvPr/>
+          </p:nvCxnSpPr>
+          <p:spPr>
+            <a:xfrm flipV="1">
+              <a:off x="6295690" y="1572768"/>
+              <a:ext cx="5522989" cy="0"/>
+            </a:xfrm>
+            <a:prstGeom prst="line">
+              <a:avLst/>
+            </a:prstGeom>
+            <a:ln w="28575" cap="rnd">
+              <a:solidFill>
+                <a:schemeClr val="tx2"/>
+              </a:solidFill>
+              <a:prstDash val="sysDot"/>
+            </a:ln>
+          </p:spPr>
+          <p:style>
+            <a:lnRef idx="1">
+              <a:schemeClr val="accent1"/>
+            </a:lnRef>
+            <a:fillRef idx="0">
+              <a:schemeClr val="accent1"/>
+            </a:fillRef>
+            <a:effectRef idx="0">
+              <a:schemeClr val="accent1"/>
+            </a:effectRef>
+            <a:fontRef idx="minor">
+              <a:schemeClr val="tx1"/>
+            </a:fontRef>
+          </p:style>
+        </p:cxnSp>
+        <p:sp>
+          <p:nvSpPr>
+            <p:cNvPr id="25" name="Rectangle 24">
+              <a:extLst>
+                <a:ext uri="{FF2B5EF4-FFF2-40B4-BE49-F238E27FC236}">
+                  <a16:creationId xmlns:a16="http://schemas.microsoft.com/office/drawing/2014/main" id="{3C3815D6-706E-9647-AD97-7D37C83E8C70}"/>
+                </a:ext>
+              </a:extLst>
+            </p:cNvPr>
+            <p:cNvSpPr/>
+            <p:nvPr/>
+          </p:nvSpPr>
+          <p:spPr>
+            <a:xfrm>
+              <a:off x="356616" y="1820464"/>
+              <a:ext cx="5300140" cy="4126688"/>
+            </a:xfrm>
+            <a:prstGeom prst="rect">
+              <a:avLst/>
+            </a:prstGeom>
+            <a:solidFill>
+              <a:schemeClr val="bg1"/>
+            </a:solidFill>
+            <a:ln w="19050">
+              <a:solidFill>
+                <a:schemeClr val="tx2"/>
+              </a:solidFill>
+              <a:prstDash val="solid"/>
+            </a:ln>
+          </p:spPr>
+          <p:style>
+            <a:lnRef idx="2">
+              <a:schemeClr val="accent1">
+                <a:shade val="50000"/>
+              </a:schemeClr>
+            </a:lnRef>
+            <a:fillRef idx="1">
+              <a:schemeClr val="accent1"/>
+            </a:fillRef>
+            <a:effectRef idx="0">
+              <a:schemeClr val="accent1"/>
+            </a:effectRef>
+            <a:fontRef idx="minor">
+              <a:schemeClr val="lt1"/>
+            </a:fontRef>
+          </p:style>
+          <p:txBody>
+            <a:bodyPr rtlCol="0" anchor="ctr"/>
+            <a:lstStyle/>
+            <a:p>
+              <a:pPr algn="ctr"/>
+              <a:endParaRPr lang="en-US" dirty="0"/>
+            </a:p>
+          </p:txBody>
+        </p:sp>
+        <p:sp>
+          <p:nvSpPr>
+            <p:cNvPr id="27" name="Content Placeholder 1">
+              <a:extLst>
+                <a:ext uri="{FF2B5EF4-FFF2-40B4-BE49-F238E27FC236}">
+                  <a16:creationId xmlns:a16="http://schemas.microsoft.com/office/drawing/2014/main" id="{F69F7902-EEA1-D44A-A93B-FFEA5869587D}"/>
+                </a:ext>
+              </a:extLst>
+            </p:cNvPr>
+            <p:cNvSpPr txBox="1">
+              <a:spLocks/>
+            </p:cNvSpPr>
+            <p:nvPr/>
+          </p:nvSpPr>
+          <p:spPr>
+            <a:xfrm>
+              <a:off x="603787" y="2014143"/>
+              <a:ext cx="4806997" cy="3617377"/>
+            </a:xfrm>
+            <a:prstGeom prst="rect">
+              <a:avLst/>
+            </a:prstGeom>
+          </p:spPr>
+          <p:txBody>
+            <a:bodyPr anchor="t"/>
+            <a:lstStyle>
+              <a:lvl1pPr marL="228600" indent="-228600" algn="l" defTabSz="914400" rtl="0" eaLnBrk="1" latinLnBrk="0" hangingPunct="1">
+                <a:lnSpc>
+                  <a:spcPct val="100000"/>
+                </a:lnSpc>
+                <a:spcBef>
+                  <a:spcPts val="0"/>
+                </a:spcBef>
+                <a:spcAft>
+                  <a:spcPts val="600"/>
+                </a:spcAft>
+                <a:buFont typeface="Arial" panose="020B0604020202020204" pitchFamily="34" charset="0"/>
+                <a:buChar char="•"/>
+                <a:defRPr sz="2200" kern="1200" baseline="0">
+                  <a:solidFill>
+                    <a:schemeClr val="tx1">
+                      <a:lumMod val="75000"/>
+                      <a:lumOff val="25000"/>
+                    </a:schemeClr>
+                  </a:solidFill>
+                  <a:latin typeface="+mn-lt"/>
+                  <a:ea typeface="+mn-ea"/>
+                  <a:cs typeface="+mn-cs"/>
+                </a:defRPr>
+              </a:lvl1pPr>
+              <a:lvl2pPr marL="685800" indent="-228600" algn="l" defTabSz="914400" rtl="0" eaLnBrk="1" latinLnBrk="0" hangingPunct="1">
+                <a:lnSpc>
+                  <a:spcPct val="100000"/>
+                </a:lnSpc>
+                <a:spcBef>
+                  <a:spcPts val="0"/>
+                </a:spcBef>
+                <a:spcAft>
+                  <a:spcPts val="600"/>
+                </a:spcAft>
+                <a:buFont typeface="Arial" panose="020B0604020202020204" pitchFamily="34" charset="0"/>
+                <a:buChar char="–"/>
+                <a:defRPr sz="2000" kern="1200" baseline="0">
+                  <a:solidFill>
+                    <a:schemeClr val="tx1">
+                      <a:lumMod val="75000"/>
+                      <a:lumOff val="25000"/>
+                    </a:schemeClr>
+                  </a:solidFill>
+                  <a:latin typeface="+mn-lt"/>
+                  <a:ea typeface="+mn-ea"/>
+                  <a:cs typeface="+mn-cs"/>
+                </a:defRPr>
+              </a:lvl2pPr>
+              <a:lvl3pPr marL="1143000" indent="-228600" algn="l" defTabSz="914400" rtl="0" eaLnBrk="1" latinLnBrk="0" hangingPunct="1">
+                <a:lnSpc>
+                  <a:spcPct val="100000"/>
+                </a:lnSpc>
+                <a:spcBef>
+                  <a:spcPts val="0"/>
+                </a:spcBef>
+                <a:spcAft>
+                  <a:spcPts val="600"/>
+                </a:spcAft>
+                <a:buFont typeface="Arial" panose="020B0604020202020204" pitchFamily="34" charset="0"/>
+                <a:buChar char="–"/>
+                <a:defRPr sz="1800" kern="1200" baseline="0">
+                  <a:solidFill>
+                    <a:schemeClr val="tx1">
+                      <a:lumMod val="75000"/>
+                      <a:lumOff val="25000"/>
+                    </a:schemeClr>
+                  </a:solidFill>
+                  <a:latin typeface="+mn-lt"/>
+                  <a:ea typeface="+mn-ea"/>
+                  <a:cs typeface="+mn-cs"/>
+                </a:defRPr>
+              </a:lvl3pPr>
+              <a:lvl4pPr marL="1600200" indent="-228600" algn="l" defTabSz="914400" rtl="0" eaLnBrk="1" latinLnBrk="0" hangingPunct="1">
+                <a:lnSpc>
+                  <a:spcPct val="100000"/>
+                </a:lnSpc>
+                <a:spcBef>
+                  <a:spcPts val="0"/>
+                </a:spcBef>
+                <a:spcAft>
+                  <a:spcPts val="600"/>
+                </a:spcAft>
+                <a:buFont typeface="Arial" panose="020B0604020202020204" pitchFamily="34" charset="0"/>
+                <a:buChar char="•"/>
+                <a:defRPr sz="1600" kern="1200" baseline="0">
+                  <a:solidFill>
+                    <a:schemeClr val="tx1">
+                      <a:lumMod val="75000"/>
+                      <a:lumOff val="25000"/>
+                    </a:schemeClr>
+                  </a:solidFill>
+                  <a:latin typeface="+mn-lt"/>
+                  <a:ea typeface="+mn-ea"/>
+                  <a:cs typeface="+mn-cs"/>
+                </a:defRPr>
+              </a:lvl4pPr>
+              <a:lvl5pPr marL="2057400" indent="-228600" algn="l" defTabSz="914400" rtl="0" eaLnBrk="1" latinLnBrk="0" hangingPunct="1">
+                <a:lnSpc>
+                  <a:spcPct val="100000"/>
+                </a:lnSpc>
+                <a:spcBef>
+                  <a:spcPts val="0"/>
+                </a:spcBef>
+                <a:spcAft>
+                  <a:spcPts val="600"/>
+                </a:spcAft>
+                <a:buFont typeface="Arial" panose="020B0604020202020204" pitchFamily="34" charset="0"/>
+                <a:buChar char="•"/>
+                <a:defRPr sz="1400" kern="1200">
+                  <a:solidFill>
+                    <a:schemeClr val="tx1">
+                      <a:lumMod val="75000"/>
+                      <a:lumOff val="25000"/>
+                    </a:schemeClr>
+                  </a:solidFill>
+                  <a:latin typeface="+mn-lt"/>
+                  <a:ea typeface="+mn-ea"/>
+                  <a:cs typeface="+mn-cs"/>
+                </a:defRPr>
+              </a:lvl5pPr>
+              <a:lvl6pPr marL="2514600" indent="-228600" algn="l" defTabSz="914400" rtl="0" eaLnBrk="1" latinLnBrk="0" hangingPunct="1">
+                <a:lnSpc>
+                  <a:spcPct val="90000"/>
+                </a:lnSpc>
+                <a:spcBef>
+                  <a:spcPts val="500"/>
+                </a:spcBef>
+                <a:buFont typeface="Arial" panose="020B0604020202020204" pitchFamily="34" charset="0"/>
+                <a:buChar char="•"/>
+                <a:defRPr sz="1800" kern="1200">
+                  <a:solidFill>
+                    <a:schemeClr val="tx1"/>
+                  </a:solidFill>
+                  <a:latin typeface="+mn-lt"/>
+                  <a:ea typeface="+mn-ea"/>
+                  <a:cs typeface="+mn-cs"/>
+                </a:defRPr>
+              </a:lvl6pPr>
+              <a:lvl7pPr marL="2971800" indent="-228600" algn="l" defTabSz="914400" rtl="0" eaLnBrk="1" latinLnBrk="0" hangingPunct="1">
+                <a:lnSpc>
+                  <a:spcPct val="90000"/>
+                </a:lnSpc>
+                <a:spcBef>
+                  <a:spcPts val="500"/>
+                </a:spcBef>
+                <a:buFont typeface="Arial" panose="020B0604020202020204" pitchFamily="34" charset="0"/>
+                <a:buChar char="•"/>
+                <a:defRPr sz="1800" kern="1200">
+                  <a:solidFill>
+                    <a:schemeClr val="tx1"/>
+                  </a:solidFill>
+                  <a:latin typeface="+mn-lt"/>
+                  <a:ea typeface="+mn-ea"/>
+                  <a:cs typeface="+mn-cs"/>
+                </a:defRPr>
+              </a:lvl7pPr>
+              <a:lvl8pPr marL="3429000" indent="-228600" algn="l" defTabSz="914400" rtl="0" eaLnBrk="1" latinLnBrk="0" hangingPunct="1">
+                <a:lnSpc>
+                  <a:spcPct val="90000"/>
+                </a:lnSpc>
+                <a:spcBef>
+                  <a:spcPts val="500"/>
+                </a:spcBef>
+                <a:buFont typeface="Arial" panose="020B0604020202020204" pitchFamily="34" charset="0"/>
+                <a:buChar char="•"/>
+                <a:defRPr sz="1800" kern="1200">
+                  <a:solidFill>
+                    <a:schemeClr val="tx1"/>
+                  </a:solidFill>
+                  <a:latin typeface="+mn-lt"/>
+                  <a:ea typeface="+mn-ea"/>
+                  <a:cs typeface="+mn-cs"/>
+                </a:defRPr>
+              </a:lvl8pPr>
+              <a:lvl9pPr marL="3886200" indent="-228600" algn="l" defTabSz="914400" rtl="0" eaLnBrk="1" latinLnBrk="0" hangingPunct="1">
+                <a:lnSpc>
+                  <a:spcPct val="90000"/>
+                </a:lnSpc>
+                <a:spcBef>
+                  <a:spcPts val="500"/>
+                </a:spcBef>
+                <a:buFont typeface="Arial" panose="020B0604020202020204" pitchFamily="34" charset="0"/>
+                <a:buChar char="•"/>
+                <a:defRPr sz="1800" kern="1200">
+                  <a:solidFill>
+                    <a:schemeClr val="tx1"/>
+                  </a:solidFill>
+                  <a:latin typeface="+mn-lt"/>
+                  <a:ea typeface="+mn-ea"/>
+                  <a:cs typeface="+mn-cs"/>
+                </a:defRPr>
+              </a:lvl9pPr>
+            </a:lstStyle>
+            <a:p>
+              <a:pPr marL="182880" indent="-182880"/>
+              <a:r>
+                <a:rPr lang="en-US" sz="2000" dirty="0"/>
+                <a:t>Management can quickly see which manufacturers are driving the most write offs, and which are needlessly delaying payment</a:t>
+              </a:r>
+            </a:p>
+            <a:p>
+              <a:pPr marL="182880" indent="-182880"/>
+              <a:r>
+                <a:rPr lang="en-US" sz="2000" dirty="0"/>
+                <a:t>Our model allows for faster resubmissions of incorrectly denied payments</a:t>
+              </a:r>
+            </a:p>
+            <a:p>
+              <a:pPr marL="182880" indent="-182880"/>
+              <a:r>
+                <a:rPr lang="en-US" sz="2000" dirty="0"/>
+                <a:t>Contracts that have reimbursement discrepancies can be quickly identified and corrected</a:t>
+              </a:r>
+            </a:p>
+          </p:txBody>
+        </p:sp>
+        <p:grpSp>
+          <p:nvGrpSpPr>
+            <p:cNvPr id="31" name="Group 30">
+              <a:extLst>
+                <a:ext uri="{FF2B5EF4-FFF2-40B4-BE49-F238E27FC236}">
+                  <a16:creationId xmlns:a16="http://schemas.microsoft.com/office/drawing/2014/main" id="{EF912073-D4FC-9C4C-A9E8-6696D6AA9EA7}"/>
+                </a:ext>
+              </a:extLst>
+            </p:cNvPr>
+            <p:cNvGrpSpPr/>
+            <p:nvPr/>
+          </p:nvGrpSpPr>
+          <p:grpSpPr>
+            <a:xfrm>
+              <a:off x="6300971" y="1805903"/>
+              <a:ext cx="5533330" cy="2025282"/>
+              <a:chOff x="6300971" y="2032840"/>
+              <a:chExt cx="5487988" cy="2025282"/>
+            </a:xfrm>
+          </p:grpSpPr>
+          <p:sp>
+            <p:nvSpPr>
+              <p:cNvPr id="28" name="Rectangle 27">
+                <a:extLst>
+                  <a:ext uri="{FF2B5EF4-FFF2-40B4-BE49-F238E27FC236}">
+                    <a16:creationId xmlns:a16="http://schemas.microsoft.com/office/drawing/2014/main" id="{AC37463B-11CA-FA46-A86A-13C8EDDBDD72}"/>
+                  </a:ext>
+                </a:extLst>
+              </p:cNvPr>
+              <p:cNvSpPr/>
+              <p:nvPr/>
+            </p:nvSpPr>
+            <p:spPr>
+              <a:xfrm>
+                <a:off x="6302559" y="2032840"/>
+                <a:ext cx="5486400" cy="2025282"/>
+              </a:xfrm>
+              <a:prstGeom prst="rect">
+                <a:avLst/>
+              </a:prstGeom>
+              <a:solidFill>
+                <a:srgbClr val="CCDEE8"/>
+              </a:solidFill>
+              <a:ln>
+                <a:noFill/>
+              </a:ln>
+            </p:spPr>
+            <p:style>
+              <a:lnRef idx="2">
+                <a:schemeClr val="accent1">
+                  <a:shade val="50000"/>
+                </a:schemeClr>
+              </a:lnRef>
+              <a:fillRef idx="1">
+                <a:schemeClr val="accent1"/>
+              </a:fillRef>
+              <a:effectRef idx="0">
+                <a:schemeClr val="accent1"/>
+              </a:effectRef>
+              <a:fontRef idx="minor">
+                <a:schemeClr val="lt1"/>
+              </a:fontRef>
+            </p:style>
+            <p:txBody>
+              <a:bodyPr rtlCol="0" anchor="ctr"/>
+              <a:lstStyle/>
+              <a:p>
+                <a:pPr algn="ctr"/>
+                <a:endParaRPr lang="en-US" dirty="0"/>
+              </a:p>
+            </p:txBody>
+          </p:sp>
+          <p:sp>
+            <p:nvSpPr>
+              <p:cNvPr id="29" name="Rectangle 28">
+                <a:extLst>
+                  <a:ext uri="{FF2B5EF4-FFF2-40B4-BE49-F238E27FC236}">
+                    <a16:creationId xmlns:a16="http://schemas.microsoft.com/office/drawing/2014/main" id="{53FA5E62-8027-654D-8966-E7921961FAB4}"/>
+                  </a:ext>
+                </a:extLst>
+              </p:cNvPr>
+              <p:cNvSpPr/>
+              <p:nvPr/>
+            </p:nvSpPr>
+            <p:spPr>
+              <a:xfrm>
+                <a:off x="6300971" y="2032840"/>
+                <a:ext cx="5487987" cy="425767"/>
+              </a:xfrm>
+              <a:prstGeom prst="rect">
+                <a:avLst/>
+              </a:prstGeom>
+              <a:solidFill>
+                <a:schemeClr val="tx2"/>
+              </a:solidFill>
+              <a:ln w="3175">
+                <a:noFill/>
+              </a:ln>
+            </p:spPr>
+            <p:style>
+              <a:lnRef idx="2">
+                <a:schemeClr val="accent1">
+                  <a:shade val="50000"/>
+                </a:schemeClr>
+              </a:lnRef>
+              <a:fillRef idx="1">
+                <a:schemeClr val="accent1"/>
+              </a:fillRef>
+              <a:effectRef idx="0">
+                <a:schemeClr val="accent1"/>
+              </a:effectRef>
+              <a:fontRef idx="minor">
+                <a:schemeClr val="lt1"/>
+              </a:fontRef>
+            </p:style>
+            <p:txBody>
+              <a:bodyPr lIns="182880" rtlCol="0" anchor="ctr"/>
+              <a:lstStyle/>
+              <a:p>
+                <a:r>
+                  <a:rPr lang="da-DK" sz="1400" b="1" dirty="0">
+                    <a:solidFill>
+                      <a:schemeClr val="bg1"/>
+                    </a:solidFill>
+                  </a:rPr>
+                  <a:t>Using Our Model, With 96% Certainty...</a:t>
+                </a:r>
+                <a:endParaRPr lang="en-US" sz="1400" b="1" dirty="0">
+                  <a:solidFill>
+                    <a:schemeClr val="bg1"/>
+                  </a:solidFill>
+                </a:endParaRPr>
+              </a:p>
+            </p:txBody>
+          </p:sp>
+          <p:sp>
+            <p:nvSpPr>
+              <p:cNvPr id="30" name="Content Placeholder 1">
+                <a:extLst>
+                  <a:ext uri="{FF2B5EF4-FFF2-40B4-BE49-F238E27FC236}">
+                    <a16:creationId xmlns:a16="http://schemas.microsoft.com/office/drawing/2014/main" id="{F12C6D76-4BF1-8B42-A228-99418FFE8069}"/>
+                  </a:ext>
+                </a:extLst>
+              </p:cNvPr>
+              <p:cNvSpPr txBox="1">
+                <a:spLocks/>
+              </p:cNvSpPr>
+              <p:nvPr/>
+            </p:nvSpPr>
+            <p:spPr>
+              <a:xfrm>
+                <a:off x="6507207" y="2603386"/>
+                <a:ext cx="5083359" cy="1270210"/>
+              </a:xfrm>
+              <a:prstGeom prst="rect">
+                <a:avLst/>
+              </a:prstGeom>
+            </p:spPr>
+            <p:txBody>
+              <a:bodyPr lIns="0" tIns="0" rIns="0" bIns="0" anchor="t"/>
+              <a:lstStyle>
+                <a:lvl1pPr marL="228600" indent="-228600" algn="l" defTabSz="914400" rtl="0" eaLnBrk="1" latinLnBrk="0" hangingPunct="1">
+                  <a:lnSpc>
+                    <a:spcPct val="100000"/>
+                  </a:lnSpc>
+                  <a:spcBef>
+                    <a:spcPts val="0"/>
+                  </a:spcBef>
+                  <a:spcAft>
+                    <a:spcPts val="600"/>
+                  </a:spcAft>
+                  <a:buFont typeface="Arial" panose="020B0604020202020204" pitchFamily="34" charset="0"/>
+                  <a:buChar char="•"/>
+                  <a:defRPr sz="2200" kern="1200" baseline="0">
+                    <a:solidFill>
+                      <a:schemeClr val="tx1">
+                        <a:lumMod val="75000"/>
+                        <a:lumOff val="25000"/>
+                      </a:schemeClr>
+                    </a:solidFill>
+                    <a:latin typeface="+mn-lt"/>
+                    <a:ea typeface="+mn-ea"/>
+                    <a:cs typeface="+mn-cs"/>
+                  </a:defRPr>
+                </a:lvl1pPr>
+                <a:lvl2pPr marL="685800" indent="-228600" algn="l" defTabSz="914400" rtl="0" eaLnBrk="1" latinLnBrk="0" hangingPunct="1">
+                  <a:lnSpc>
+                    <a:spcPct val="100000"/>
+                  </a:lnSpc>
+                  <a:spcBef>
+                    <a:spcPts val="0"/>
+                  </a:spcBef>
+                  <a:spcAft>
+                    <a:spcPts val="600"/>
+                  </a:spcAft>
+                  <a:buFont typeface="Arial" panose="020B0604020202020204" pitchFamily="34" charset="0"/>
+                  <a:buChar char="–"/>
+                  <a:defRPr sz="2000" kern="1200" baseline="0">
+                    <a:solidFill>
+                      <a:schemeClr val="tx1">
+                        <a:lumMod val="75000"/>
+                        <a:lumOff val="25000"/>
+                      </a:schemeClr>
+                    </a:solidFill>
+                    <a:latin typeface="+mn-lt"/>
+                    <a:ea typeface="+mn-ea"/>
+                    <a:cs typeface="+mn-cs"/>
+                  </a:defRPr>
+                </a:lvl2pPr>
+                <a:lvl3pPr marL="1143000" indent="-228600" algn="l" defTabSz="914400" rtl="0" eaLnBrk="1" latinLnBrk="0" hangingPunct="1">
+                  <a:lnSpc>
+                    <a:spcPct val="100000"/>
+                  </a:lnSpc>
+                  <a:spcBef>
+                    <a:spcPts val="0"/>
+                  </a:spcBef>
+                  <a:spcAft>
+                    <a:spcPts val="600"/>
+                  </a:spcAft>
+                  <a:buFont typeface="Arial" panose="020B0604020202020204" pitchFamily="34" charset="0"/>
+                  <a:buChar char="–"/>
+                  <a:defRPr sz="1800" kern="1200" baseline="0">
+                    <a:solidFill>
+                      <a:schemeClr val="tx1">
+                        <a:lumMod val="75000"/>
+                        <a:lumOff val="25000"/>
+                      </a:schemeClr>
+                    </a:solidFill>
+                    <a:latin typeface="+mn-lt"/>
+                    <a:ea typeface="+mn-ea"/>
+                    <a:cs typeface="+mn-cs"/>
+                  </a:defRPr>
+                </a:lvl3pPr>
+                <a:lvl4pPr marL="1600200" indent="-228600" algn="l" defTabSz="914400" rtl="0" eaLnBrk="1" latinLnBrk="0" hangingPunct="1">
+                  <a:lnSpc>
+                    <a:spcPct val="100000"/>
+                  </a:lnSpc>
+                  <a:spcBef>
+                    <a:spcPts val="0"/>
+                  </a:spcBef>
+                  <a:spcAft>
+                    <a:spcPts val="600"/>
+                  </a:spcAft>
+                  <a:buFont typeface="Arial" panose="020B0604020202020204" pitchFamily="34" charset="0"/>
+                  <a:buChar char="•"/>
+                  <a:defRPr sz="1600" kern="1200" baseline="0">
+                    <a:solidFill>
+                      <a:schemeClr val="tx1">
+                        <a:lumMod val="75000"/>
+                        <a:lumOff val="25000"/>
+                      </a:schemeClr>
+                    </a:solidFill>
+                    <a:latin typeface="+mn-lt"/>
+                    <a:ea typeface="+mn-ea"/>
+                    <a:cs typeface="+mn-cs"/>
+                  </a:defRPr>
+                </a:lvl4pPr>
+                <a:lvl5pPr marL="2057400" indent="-228600" algn="l" defTabSz="914400" rtl="0" eaLnBrk="1" latinLnBrk="0" hangingPunct="1">
+                  <a:lnSpc>
+                    <a:spcPct val="100000"/>
+                  </a:lnSpc>
+                  <a:spcBef>
+                    <a:spcPts val="0"/>
+                  </a:spcBef>
+                  <a:spcAft>
+                    <a:spcPts val="600"/>
+                  </a:spcAft>
+                  <a:buFont typeface="Arial" panose="020B0604020202020204" pitchFamily="34" charset="0"/>
+                  <a:buChar char="•"/>
+                  <a:defRPr sz="1400" kern="1200">
+                    <a:solidFill>
+                      <a:schemeClr val="tx1">
+                        <a:lumMod val="75000"/>
+                        <a:lumOff val="25000"/>
+                      </a:schemeClr>
+                    </a:solidFill>
+                    <a:latin typeface="+mn-lt"/>
+                    <a:ea typeface="+mn-ea"/>
+                    <a:cs typeface="+mn-cs"/>
+                  </a:defRPr>
+                </a:lvl5pPr>
+                <a:lvl6pPr marL="2514600" indent="-228600" algn="l" defTabSz="914400" rtl="0" eaLnBrk="1" latinLnBrk="0" hangingPunct="1">
+                  <a:lnSpc>
+                    <a:spcPct val="90000"/>
+                  </a:lnSpc>
+                  <a:spcBef>
+                    <a:spcPts val="500"/>
+                  </a:spcBef>
+                  <a:buFont typeface="Arial" panose="020B0604020202020204" pitchFamily="34" charset="0"/>
+                  <a:buChar char="•"/>
+                  <a:defRPr sz="1800" kern="1200">
+                    <a:solidFill>
+                      <a:schemeClr val="tx1"/>
+                    </a:solidFill>
+                    <a:latin typeface="+mn-lt"/>
+                    <a:ea typeface="+mn-ea"/>
+                    <a:cs typeface="+mn-cs"/>
+                  </a:defRPr>
+                </a:lvl6pPr>
+                <a:lvl7pPr marL="2971800" indent="-228600" algn="l" defTabSz="914400" rtl="0" eaLnBrk="1" latinLnBrk="0" hangingPunct="1">
+                  <a:lnSpc>
+                    <a:spcPct val="90000"/>
+                  </a:lnSpc>
+                  <a:spcBef>
+                    <a:spcPts val="500"/>
+                  </a:spcBef>
+                  <a:buFont typeface="Arial" panose="020B0604020202020204" pitchFamily="34" charset="0"/>
+                  <a:buChar char="•"/>
+                  <a:defRPr sz="1800" kern="1200">
+                    <a:solidFill>
+                      <a:schemeClr val="tx1"/>
+                    </a:solidFill>
+                    <a:latin typeface="+mn-lt"/>
+                    <a:ea typeface="+mn-ea"/>
+                    <a:cs typeface="+mn-cs"/>
+                  </a:defRPr>
+                </a:lvl7pPr>
+                <a:lvl8pPr marL="3429000" indent="-228600" algn="l" defTabSz="914400" rtl="0" eaLnBrk="1" latinLnBrk="0" hangingPunct="1">
+                  <a:lnSpc>
+                    <a:spcPct val="90000"/>
+                  </a:lnSpc>
+                  <a:spcBef>
+                    <a:spcPts val="500"/>
+                  </a:spcBef>
+                  <a:buFont typeface="Arial" panose="020B0604020202020204" pitchFamily="34" charset="0"/>
+                  <a:buChar char="•"/>
+                  <a:defRPr sz="1800" kern="1200">
+                    <a:solidFill>
+                      <a:schemeClr val="tx1"/>
+                    </a:solidFill>
+                    <a:latin typeface="+mn-lt"/>
+                    <a:ea typeface="+mn-ea"/>
+                    <a:cs typeface="+mn-cs"/>
+                  </a:defRPr>
+                </a:lvl8pPr>
+                <a:lvl9pPr marL="3886200" indent="-228600" algn="l" defTabSz="914400" rtl="0" eaLnBrk="1" latinLnBrk="0" hangingPunct="1">
+                  <a:lnSpc>
+                    <a:spcPct val="90000"/>
+                  </a:lnSpc>
+                  <a:spcBef>
+                    <a:spcPts val="500"/>
+                  </a:spcBef>
+                  <a:buFont typeface="Arial" panose="020B0604020202020204" pitchFamily="34" charset="0"/>
+                  <a:buChar char="•"/>
+                  <a:defRPr sz="1800" kern="1200">
+                    <a:solidFill>
+                      <a:schemeClr val="tx1"/>
+                    </a:solidFill>
+                    <a:latin typeface="+mn-lt"/>
+                    <a:ea typeface="+mn-ea"/>
+                    <a:cs typeface="+mn-cs"/>
+                  </a:defRPr>
+                </a:lvl9pPr>
+              </a:lstStyle>
+              <a:p>
+                <a:pPr marL="182880" indent="-182880">
+                  <a:spcAft>
+                    <a:spcPts val="300"/>
+                  </a:spcAft>
+                </a:pPr>
+                <a:r>
+                  <a:rPr lang="en-US" sz="1400" dirty="0"/>
+                  <a:t>McKesson can resubmit $3.9M in quarterly denied claims at Day 1 vs. an average current resolution timeframe of 35 days</a:t>
+                </a:r>
+              </a:p>
+              <a:p>
+                <a:pPr marL="182880" indent="-182880">
+                  <a:spcAft>
+                    <a:spcPts val="300"/>
+                  </a:spcAft>
+                </a:pPr>
+                <a:r>
+                  <a:rPr lang="en-US" sz="1400" dirty="0"/>
+                  <a:t>Manufacturers take an average of 5 days to respond</a:t>
+                </a:r>
+              </a:p>
+              <a:p>
+                <a:pPr marL="182880" indent="-182880">
+                  <a:spcAft>
+                    <a:spcPts val="300"/>
+                  </a:spcAft>
+                </a:pPr>
+                <a:r>
+                  <a:rPr lang="en-US" sz="1400" dirty="0"/>
+                  <a:t>McKesson could improve its cash conversion cycle by </a:t>
+                </a:r>
+                <a:r>
+                  <a:rPr lang="en-US" sz="1400" b="1" dirty="0"/>
+                  <a:t>30 days</a:t>
+                </a:r>
+              </a:p>
+              <a:p>
+                <a:pPr marL="182880" indent="-182880">
+                  <a:spcAft>
+                    <a:spcPts val="300"/>
+                  </a:spcAft>
+                </a:pPr>
+                <a:r>
+                  <a:rPr lang="en-US" sz="1400" dirty="0"/>
+                  <a:t>An improvement of </a:t>
+                </a:r>
+                <a:r>
+                  <a:rPr lang="en-US" sz="1400" b="1" dirty="0"/>
+                  <a:t>86%</a:t>
+                </a:r>
+              </a:p>
+              <a:p>
+                <a:pPr>
+                  <a:spcAft>
+                    <a:spcPts val="0"/>
+                  </a:spcAft>
+                </a:pPr>
+                <a:endParaRPr lang="en-US" sz="1400" dirty="0"/>
+              </a:p>
+            </p:txBody>
+          </p:sp>
+        </p:grpSp>
+        <p:grpSp>
+          <p:nvGrpSpPr>
+            <p:cNvPr id="32" name="Group 31">
+              <a:extLst>
+                <a:ext uri="{FF2B5EF4-FFF2-40B4-BE49-F238E27FC236}">
+                  <a16:creationId xmlns:a16="http://schemas.microsoft.com/office/drawing/2014/main" id="{F8163C74-DAFC-724A-BEA0-6F8F308B48E5}"/>
+                </a:ext>
+              </a:extLst>
+            </p:cNvPr>
+            <p:cNvGrpSpPr/>
+            <p:nvPr/>
+          </p:nvGrpSpPr>
+          <p:grpSpPr>
+            <a:xfrm>
+              <a:off x="6300971" y="3947059"/>
+              <a:ext cx="5533330" cy="2025282"/>
+              <a:chOff x="6300971" y="2032840"/>
+              <a:chExt cx="5487988" cy="2025282"/>
+            </a:xfrm>
+          </p:grpSpPr>
+          <p:sp>
+            <p:nvSpPr>
+              <p:cNvPr id="33" name="Rectangle 32">
+                <a:extLst>
+                  <a:ext uri="{FF2B5EF4-FFF2-40B4-BE49-F238E27FC236}">
+                    <a16:creationId xmlns:a16="http://schemas.microsoft.com/office/drawing/2014/main" id="{4646F8A5-E2BA-E04A-B3BD-A2E20100CADD}"/>
+                  </a:ext>
+                </a:extLst>
+              </p:cNvPr>
+              <p:cNvSpPr/>
+              <p:nvPr/>
+            </p:nvSpPr>
+            <p:spPr>
+              <a:xfrm>
+                <a:off x="6302559" y="2032840"/>
+                <a:ext cx="5486400" cy="2025282"/>
+              </a:xfrm>
+              <a:prstGeom prst="rect">
+                <a:avLst/>
+              </a:prstGeom>
+              <a:solidFill>
+                <a:srgbClr val="CCDEE8"/>
+              </a:solidFill>
+              <a:ln>
+                <a:noFill/>
+              </a:ln>
+            </p:spPr>
+            <p:style>
+              <a:lnRef idx="2">
+                <a:schemeClr val="accent1">
+                  <a:shade val="50000"/>
+                </a:schemeClr>
+              </a:lnRef>
+              <a:fillRef idx="1">
+                <a:schemeClr val="accent1"/>
+              </a:fillRef>
+              <a:effectRef idx="0">
+                <a:schemeClr val="accent1"/>
+              </a:effectRef>
+              <a:fontRef idx="minor">
+                <a:schemeClr val="lt1"/>
+              </a:fontRef>
+            </p:style>
+            <p:txBody>
+              <a:bodyPr rtlCol="0" anchor="ctr"/>
+              <a:lstStyle/>
+              <a:p>
+                <a:pPr algn="ctr"/>
+                <a:endParaRPr lang="en-US" dirty="0"/>
+              </a:p>
+            </p:txBody>
+          </p:sp>
+          <p:sp>
+            <p:nvSpPr>
+              <p:cNvPr id="34" name="Rectangle 33">
+                <a:extLst>
+                  <a:ext uri="{FF2B5EF4-FFF2-40B4-BE49-F238E27FC236}">
+                    <a16:creationId xmlns:a16="http://schemas.microsoft.com/office/drawing/2014/main" id="{146A0F6D-F4DE-0C42-8E19-43F24C6A4B60}"/>
+                  </a:ext>
+                </a:extLst>
+              </p:cNvPr>
+              <p:cNvSpPr/>
+              <p:nvPr/>
+            </p:nvSpPr>
+            <p:spPr>
+              <a:xfrm>
+                <a:off x="6300971" y="2032840"/>
+                <a:ext cx="5487987" cy="425767"/>
+              </a:xfrm>
+              <a:prstGeom prst="rect">
+                <a:avLst/>
+              </a:prstGeom>
+              <a:solidFill>
+                <a:schemeClr val="tx2"/>
+              </a:solidFill>
+              <a:ln w="3175">
+                <a:noFill/>
+              </a:ln>
+            </p:spPr>
+            <p:style>
+              <a:lnRef idx="2">
+                <a:schemeClr val="accent1">
+                  <a:shade val="50000"/>
+                </a:schemeClr>
+              </a:lnRef>
+              <a:fillRef idx="1">
+                <a:schemeClr val="accent1"/>
+              </a:fillRef>
+              <a:effectRef idx="0">
+                <a:schemeClr val="accent1"/>
+              </a:effectRef>
+              <a:fontRef idx="minor">
+                <a:schemeClr val="lt1"/>
+              </a:fontRef>
+            </p:style>
+            <p:txBody>
+              <a:bodyPr lIns="182880" rtlCol="0" anchor="ctr"/>
+              <a:lstStyle/>
+              <a:p>
+                <a:r>
+                  <a:rPr lang="da-DK" sz="1400" b="1" dirty="0">
+                    <a:solidFill>
+                      <a:schemeClr val="bg1"/>
+                    </a:solidFill>
+                  </a:rPr>
+                  <a:t>If We Had More Time</a:t>
+                </a:r>
+                <a:endParaRPr lang="en-US" sz="1400" b="1" dirty="0">
+                  <a:solidFill>
+                    <a:schemeClr val="bg1"/>
+                  </a:solidFill>
+                </a:endParaRPr>
+              </a:p>
+            </p:txBody>
+          </p:sp>
+          <p:sp>
+            <p:nvSpPr>
+              <p:cNvPr id="35" name="Content Placeholder 1">
+                <a:extLst>
+                  <a:ext uri="{FF2B5EF4-FFF2-40B4-BE49-F238E27FC236}">
+                    <a16:creationId xmlns:a16="http://schemas.microsoft.com/office/drawing/2014/main" id="{BFAA09AD-EE3C-E540-B306-25F23E345C44}"/>
+                  </a:ext>
+                </a:extLst>
+              </p:cNvPr>
+              <p:cNvSpPr txBox="1">
+                <a:spLocks/>
+              </p:cNvSpPr>
+              <p:nvPr/>
+            </p:nvSpPr>
+            <p:spPr>
+              <a:xfrm>
+                <a:off x="6500065" y="2609611"/>
+                <a:ext cx="5083359" cy="1270210"/>
+              </a:xfrm>
+              <a:prstGeom prst="rect">
+                <a:avLst/>
+              </a:prstGeom>
+            </p:spPr>
+            <p:txBody>
+              <a:bodyPr lIns="0" tIns="0" rIns="0" bIns="0" anchor="t"/>
+              <a:lstStyle>
+                <a:lvl1pPr marL="228600" indent="-228600" algn="l" defTabSz="914400" rtl="0" eaLnBrk="1" latinLnBrk="0" hangingPunct="1">
+                  <a:lnSpc>
+                    <a:spcPct val="100000"/>
+                  </a:lnSpc>
+                  <a:spcBef>
+                    <a:spcPts val="0"/>
+                  </a:spcBef>
+                  <a:spcAft>
+                    <a:spcPts val="600"/>
+                  </a:spcAft>
+                  <a:buFont typeface="Arial" panose="020B0604020202020204" pitchFamily="34" charset="0"/>
+                  <a:buChar char="•"/>
+                  <a:defRPr sz="2200" kern="1200" baseline="0">
+                    <a:solidFill>
+                      <a:schemeClr val="tx1">
+                        <a:lumMod val="75000"/>
+                        <a:lumOff val="25000"/>
+                      </a:schemeClr>
+                    </a:solidFill>
+                    <a:latin typeface="+mn-lt"/>
+                    <a:ea typeface="+mn-ea"/>
+                    <a:cs typeface="+mn-cs"/>
+                  </a:defRPr>
+                </a:lvl1pPr>
+                <a:lvl2pPr marL="685800" indent="-228600" algn="l" defTabSz="914400" rtl="0" eaLnBrk="1" latinLnBrk="0" hangingPunct="1">
+                  <a:lnSpc>
+                    <a:spcPct val="100000"/>
+                  </a:lnSpc>
+                  <a:spcBef>
+                    <a:spcPts val="0"/>
+                  </a:spcBef>
+                  <a:spcAft>
+                    <a:spcPts val="600"/>
+                  </a:spcAft>
+                  <a:buFont typeface="Arial" panose="020B0604020202020204" pitchFamily="34" charset="0"/>
+                  <a:buChar char="–"/>
+                  <a:defRPr sz="2000" kern="1200" baseline="0">
+                    <a:solidFill>
+                      <a:schemeClr val="tx1">
+                        <a:lumMod val="75000"/>
+                        <a:lumOff val="25000"/>
+                      </a:schemeClr>
+                    </a:solidFill>
+                    <a:latin typeface="+mn-lt"/>
+                    <a:ea typeface="+mn-ea"/>
+                    <a:cs typeface="+mn-cs"/>
+                  </a:defRPr>
+                </a:lvl2pPr>
+                <a:lvl3pPr marL="1143000" indent="-228600" algn="l" defTabSz="914400" rtl="0" eaLnBrk="1" latinLnBrk="0" hangingPunct="1">
+                  <a:lnSpc>
+                    <a:spcPct val="100000"/>
+                  </a:lnSpc>
+                  <a:spcBef>
+                    <a:spcPts val="0"/>
+                  </a:spcBef>
+                  <a:spcAft>
+                    <a:spcPts val="600"/>
+                  </a:spcAft>
+                  <a:buFont typeface="Arial" panose="020B0604020202020204" pitchFamily="34" charset="0"/>
+                  <a:buChar char="–"/>
+                  <a:defRPr sz="1800" kern="1200" baseline="0">
+                    <a:solidFill>
+                      <a:schemeClr val="tx1">
+                        <a:lumMod val="75000"/>
+                        <a:lumOff val="25000"/>
+                      </a:schemeClr>
+                    </a:solidFill>
+                    <a:latin typeface="+mn-lt"/>
+                    <a:ea typeface="+mn-ea"/>
+                    <a:cs typeface="+mn-cs"/>
+                  </a:defRPr>
+                </a:lvl3pPr>
+                <a:lvl4pPr marL="1600200" indent="-228600" algn="l" defTabSz="914400" rtl="0" eaLnBrk="1" latinLnBrk="0" hangingPunct="1">
+                  <a:lnSpc>
+                    <a:spcPct val="100000"/>
+                  </a:lnSpc>
+                  <a:spcBef>
+                    <a:spcPts val="0"/>
+                  </a:spcBef>
+                  <a:spcAft>
+                    <a:spcPts val="600"/>
+                  </a:spcAft>
+                  <a:buFont typeface="Arial" panose="020B0604020202020204" pitchFamily="34" charset="0"/>
+                  <a:buChar char="•"/>
+                  <a:defRPr sz="1600" kern="1200" baseline="0">
+                    <a:solidFill>
+                      <a:schemeClr val="tx1">
+                        <a:lumMod val="75000"/>
+                        <a:lumOff val="25000"/>
+                      </a:schemeClr>
+                    </a:solidFill>
+                    <a:latin typeface="+mn-lt"/>
+                    <a:ea typeface="+mn-ea"/>
+                    <a:cs typeface="+mn-cs"/>
+                  </a:defRPr>
+                </a:lvl4pPr>
+                <a:lvl5pPr marL="2057400" indent="-228600" algn="l" defTabSz="914400" rtl="0" eaLnBrk="1" latinLnBrk="0" hangingPunct="1">
+                  <a:lnSpc>
+                    <a:spcPct val="100000"/>
+                  </a:lnSpc>
+                  <a:spcBef>
+                    <a:spcPts val="0"/>
+                  </a:spcBef>
+                  <a:spcAft>
+                    <a:spcPts val="600"/>
+                  </a:spcAft>
+                  <a:buFont typeface="Arial" panose="020B0604020202020204" pitchFamily="34" charset="0"/>
+                  <a:buChar char="•"/>
+                  <a:defRPr sz="1400" kern="1200">
+                    <a:solidFill>
+                      <a:schemeClr val="tx1">
+                        <a:lumMod val="75000"/>
+                        <a:lumOff val="25000"/>
+                      </a:schemeClr>
+                    </a:solidFill>
+                    <a:latin typeface="+mn-lt"/>
+                    <a:ea typeface="+mn-ea"/>
+                    <a:cs typeface="+mn-cs"/>
+                  </a:defRPr>
+                </a:lvl5pPr>
+                <a:lvl6pPr marL="2514600" indent="-228600" algn="l" defTabSz="914400" rtl="0" eaLnBrk="1" latinLnBrk="0" hangingPunct="1">
+                  <a:lnSpc>
+                    <a:spcPct val="90000"/>
+                  </a:lnSpc>
+                  <a:spcBef>
+                    <a:spcPts val="500"/>
+                  </a:spcBef>
+                  <a:buFont typeface="Arial" panose="020B0604020202020204" pitchFamily="34" charset="0"/>
+                  <a:buChar char="•"/>
+                  <a:defRPr sz="1800" kern="1200">
+                    <a:solidFill>
+                      <a:schemeClr val="tx1"/>
+                    </a:solidFill>
+                    <a:latin typeface="+mn-lt"/>
+                    <a:ea typeface="+mn-ea"/>
+                    <a:cs typeface="+mn-cs"/>
+                  </a:defRPr>
+                </a:lvl6pPr>
+                <a:lvl7pPr marL="2971800" indent="-228600" algn="l" defTabSz="914400" rtl="0" eaLnBrk="1" latinLnBrk="0" hangingPunct="1">
+                  <a:lnSpc>
+                    <a:spcPct val="90000"/>
+                  </a:lnSpc>
+                  <a:spcBef>
+                    <a:spcPts val="500"/>
+                  </a:spcBef>
+                  <a:buFont typeface="Arial" panose="020B0604020202020204" pitchFamily="34" charset="0"/>
+                  <a:buChar char="•"/>
+                  <a:defRPr sz="1800" kern="1200">
+                    <a:solidFill>
+                      <a:schemeClr val="tx1"/>
+                    </a:solidFill>
+                    <a:latin typeface="+mn-lt"/>
+                    <a:ea typeface="+mn-ea"/>
+                    <a:cs typeface="+mn-cs"/>
+                  </a:defRPr>
+                </a:lvl7pPr>
+                <a:lvl8pPr marL="3429000" indent="-228600" algn="l" defTabSz="914400" rtl="0" eaLnBrk="1" latinLnBrk="0" hangingPunct="1">
+                  <a:lnSpc>
+                    <a:spcPct val="90000"/>
+                  </a:lnSpc>
+                  <a:spcBef>
+                    <a:spcPts val="500"/>
+                  </a:spcBef>
+                  <a:buFont typeface="Arial" panose="020B0604020202020204" pitchFamily="34" charset="0"/>
+                  <a:buChar char="•"/>
+                  <a:defRPr sz="1800" kern="1200">
+                    <a:solidFill>
+                      <a:schemeClr val="tx1"/>
+                    </a:solidFill>
+                    <a:latin typeface="+mn-lt"/>
+                    <a:ea typeface="+mn-ea"/>
+                    <a:cs typeface="+mn-cs"/>
+                  </a:defRPr>
+                </a:lvl8pPr>
+                <a:lvl9pPr marL="3886200" indent="-228600" algn="l" defTabSz="914400" rtl="0" eaLnBrk="1" latinLnBrk="0" hangingPunct="1">
+                  <a:lnSpc>
+                    <a:spcPct val="90000"/>
+                  </a:lnSpc>
+                  <a:spcBef>
+                    <a:spcPts val="500"/>
+                  </a:spcBef>
+                  <a:buFont typeface="Arial" panose="020B0604020202020204" pitchFamily="34" charset="0"/>
+                  <a:buChar char="•"/>
+                  <a:defRPr sz="1800" kern="1200">
+                    <a:solidFill>
+                      <a:schemeClr val="tx1"/>
+                    </a:solidFill>
+                    <a:latin typeface="+mn-lt"/>
+                    <a:ea typeface="+mn-ea"/>
+                    <a:cs typeface="+mn-cs"/>
+                  </a:defRPr>
+                </a:lvl9pPr>
+              </a:lstStyle>
+              <a:p>
+                <a:pPr marL="182880" indent="-182880">
+                  <a:spcAft>
+                    <a:spcPts val="300"/>
+                  </a:spcAft>
+                </a:pPr>
+                <a:r>
+                  <a:rPr lang="en-US" sz="1400" dirty="0"/>
+                  <a:t>Apply our visualizations and models to other business units (one of four represented)</a:t>
+                </a:r>
+              </a:p>
+              <a:p>
+                <a:pPr marL="182880" indent="-182880">
+                  <a:spcAft>
+                    <a:spcPts val="300"/>
+                  </a:spcAft>
+                </a:pPr>
+                <a:r>
+                  <a:rPr lang="en-US" sz="1400" dirty="0"/>
+                  <a:t>See if our model accuracy remains high across different time periods</a:t>
+                </a:r>
+              </a:p>
+            </p:txBody>
+          </p:sp>
+        </p:grpSp>
+        <p:sp>
+          <p:nvSpPr>
+            <p:cNvPr id="6" name="TextBox 5">
+              <a:extLst>
+                <a:ext uri="{FF2B5EF4-FFF2-40B4-BE49-F238E27FC236}">
+                  <a16:creationId xmlns:a16="http://schemas.microsoft.com/office/drawing/2014/main" id="{E044C573-8C38-3C47-9518-F21A06F931F9}"/>
+                </a:ext>
+              </a:extLst>
+            </p:cNvPr>
+            <p:cNvSpPr txBox="1"/>
+            <p:nvPr/>
+          </p:nvSpPr>
+          <p:spPr>
+            <a:xfrm>
+              <a:off x="5169877" y="1901237"/>
+              <a:ext cx="0" cy="0"/>
+            </a:xfrm>
+            <a:prstGeom prst="rect">
+              <a:avLst/>
+            </a:prstGeom>
+            <a:solidFill>
+              <a:srgbClr val="DEE8D3"/>
+            </a:solidFill>
+            <a:ln w="38100">
+              <a:noFill/>
+              <a:round/>
+            </a:ln>
+          </p:spPr>
+          <p:txBody>
+            <a:bodyPr wrap="none" lIns="91440" tIns="91440" rIns="91440" bIns="91440" rtlCol="0" anchor="ctr">
+              <a:noAutofit/>
+            </a:bodyPr>
+            <a:lstStyle/>
+            <a:p>
+              <a:pPr marL="0" algn="l">
+                <a:spcAft>
+                  <a:spcPts val="600"/>
+                </a:spcAft>
+              </a:pPr>
+              <a:endParaRPr lang="en-US" sz="1400" b="1" dirty="0">
+                <a:solidFill>
+                  <a:schemeClr val="tx1">
+                    <a:lumMod val="75000"/>
+                    <a:lumOff val="25000"/>
+                  </a:schemeClr>
+                </a:solidFill>
+              </a:endParaRPr>
+            </a:p>
+          </p:txBody>
+        </p:sp>
+      </p:grpSp>
     </p:spTree>
     <p:extLst>
       <p:ext uri="{BB962C8B-B14F-4D97-AF65-F5344CB8AC3E}">
-        <p14:creationId xmlns:p14="http://schemas.microsoft.com/office/powerpoint/2010/main" val="3891324679"/>
+        <p14:creationId xmlns:p14="http://schemas.microsoft.com/office/powerpoint/2010/main" val="3579537991"/>
       </p:ext>
     </p:extLst>
   </p:cSld>

</xml_diff>

<commit_message>
project summary added to readme file
</commit_message>
<xml_diff>
--- a/Project_3.pptx
+++ b/Project_3.pptx
@@ -1571,7 +1571,7 @@
             </a:pPr>
             <a:r>
               <a:rPr lang="en-US" sz="1000" dirty="0"/>
-              <a:t>After three iterations, we created a parsimonious data set that used four features (manufacturer, contract, customer, and rejection reason) which didn’t sacrifice too much accuracy</a:t>
+              <a:t>After three iterations, we created a parsimonious data set that only needed four features (manufacturer, contract, customer, and rejection reason) which didn’t sacrifice too much accuracy</a:t>
             </a:r>
           </a:p>
           <a:p>
@@ -1594,7 +1594,7 @@
             </a:pPr>
             <a:r>
               <a:rPr lang="en-US" sz="1000" dirty="0"/>
-              <a:t>In our data set, false negatives are actually the most damaging. We may classify something as a write off, but we actually should have resubmitted the claim and received payment.</a:t>
+              <a:t>In our data set, false negatives are actually the most damaging. We want to avoid suggesting a write off should be taken, when we actually should have resubmitted the claim for payment.</a:t>
             </a:r>
           </a:p>
           <a:p>
@@ -1619,6 +1619,26 @@
               <a:rPr lang="en-US" sz="1000" dirty="0"/>
               <a:t>So we want a good recall score for our write off activity</a:t>
             </a:r>
+          </a:p>
+          <a:p>
+            <a:pPr marL="0" marR="0" lvl="0" indent="0" algn="l" defTabSz="914400" rtl="0" eaLnBrk="1" fontAlgn="auto" latinLnBrk="0" hangingPunct="1">
+              <a:lnSpc>
+                <a:spcPct val="100000"/>
+              </a:lnSpc>
+              <a:spcBef>
+                <a:spcPts val="0"/>
+              </a:spcBef>
+              <a:spcAft>
+                <a:spcPts val="0"/>
+              </a:spcAft>
+              <a:buClrTx/>
+              <a:buSzTx/>
+              <a:buFontTx/>
+              <a:buNone/>
+              <a:tabLst/>
+              <a:defRPr/>
+            </a:pPr>
+            <a:endParaRPr lang="en-US" sz="1000" dirty="0"/>
           </a:p>
           <a:p>
             <a:pPr marL="0" marR="0" lvl="0" indent="0" algn="l" defTabSz="914400" rtl="0" eaLnBrk="1" fontAlgn="auto" latinLnBrk="0" hangingPunct="1">

</xml_diff>

<commit_message>
slightly updated viz notebook
</commit_message>
<xml_diff>
--- a/Project_3.pptx
+++ b/Project_3.pptx
@@ -228,7 +228,7 @@
                 <a:latin typeface="Arial" panose="020B0604020202020204" pitchFamily="34" charset="0"/>
                 <a:cs typeface="Arial" panose="020B0604020202020204" pitchFamily="34" charset="0"/>
               </a:rPr>
-              <a:t>4/24/2021</a:t>
+              <a:t>4/26/2021</a:t>
             </a:fld>
             <a:endParaRPr lang="en-US" sz="1000" dirty="0">
               <a:latin typeface="Arial" panose="020B0604020202020204" pitchFamily="34" charset="0"/>
@@ -409,7 +409,7 @@
           <a:p>
             <a:fld id="{58B8B8CD-F4D7-423F-966E-8A058DF60DFE}" type="datetime1">
               <a:rPr lang="en-US" smtClean="0"/>
-              <a:t>4/24/2021</a:t>
+              <a:t>4/26/2021</a:t>
             </a:fld>
             <a:endParaRPr lang="en-US" dirty="0"/>
           </a:p>
@@ -745,7 +745,7 @@
           <a:p>
             <a:fld id="{05409AE7-6877-4C14-86F0-BB63E25A6E0D}" type="datetime1">
               <a:rPr lang="en-US" smtClean="0"/>
-              <a:t>4/24/2021</a:t>
+              <a:t>4/26/2021</a:t>
             </a:fld>
             <a:endParaRPr lang="en-US" dirty="0"/>
           </a:p>
@@ -874,7 +874,7 @@
           <a:p>
             <a:fld id="{EE032E31-25FA-5843-9B22-66794CE8E083}" type="datetime1">
               <a:rPr lang="en-US" smtClean="0"/>
-              <a:t>4/24/2021</a:t>
+              <a:t>4/26/2021</a:t>
             </a:fld>
             <a:endParaRPr lang="en-US" dirty="0"/>
           </a:p>
@@ -990,7 +990,7 @@
             </a:pPr>
             <a:r>
               <a:rPr lang="en-US" dirty="0"/>
-              <a:t>A contract is entered into between a customer and manufacturer, however the product is purchased from McKesson. The contract price is less than McKesson’s acquisition cost, leading to the need for a reimbursement, which varies from customer to customer</a:t>
+              <a:t>A contract is entered into between a customer and manufacturer, however the product is purchased from McKesson. The contract price is less than McKesson’s acquisition cost, leading to the need for a reimbursement. The reimbursement amount can vary from customer to customer</a:t>
             </a:r>
           </a:p>
         </p:txBody>
@@ -1142,7 +1142,10 @@
           </a:bodyPr>
           <a:lstStyle/>
           <a:p>
-            <a:endParaRPr lang="en-US" dirty="0"/>
+            <a:r>
+              <a:rPr lang="en-US" dirty="0"/>
+              <a:t>Reimbursements are created at time of customer purchase. ~99% of the time, the reimbursement is paid without issue, but sometimes they are denied. </a:t>
+            </a:r>
           </a:p>
         </p:txBody>
       </p:sp>
@@ -1286,7 +1289,40 @@
           <a:bodyPr/>
           <a:lstStyle/>
           <a:p>
-            <a:endParaRPr lang="en-US" dirty="0"/>
+            <a:r>
+              <a:rPr lang="en-US" dirty="0"/>
+              <a:t>$5.6M in denied claims</a:t>
+            </a:r>
+          </a:p>
+          <a:p>
+            <a:r>
+              <a:rPr lang="en-US" dirty="0"/>
+              <a:t>$3.9M in resubmissions</a:t>
+            </a:r>
+          </a:p>
+          <a:p>
+            <a:r>
+              <a:rPr lang="en-US" dirty="0"/>
+              <a:t>$1.7M in write offs </a:t>
+            </a:r>
+          </a:p>
+          <a:p>
+            <a:r>
+              <a:rPr lang="en-US" dirty="0"/>
+              <a:t>Spend ~$250k </a:t>
+            </a:r>
+            <a:r>
+              <a:rPr lang="en-US"/>
+              <a:t>in annual </a:t>
+            </a:r>
+            <a:r>
+              <a:rPr lang="en-US" dirty="0"/>
+              <a:t>labor to reconcile </a:t>
+            </a:r>
+            <a:r>
+              <a:rPr lang="en-US"/>
+              <a:t>these transactions </a:t>
+            </a:r>
           </a:p>
         </p:txBody>
       </p:sp>
@@ -1489,7 +1525,7 @@
           <a:p>
             <a:fld id="{EE032E31-25FA-5843-9B22-66794CE8E083}" type="datetime1">
               <a:rPr lang="en-US" smtClean="0"/>
-              <a:t>4/24/2021</a:t>
+              <a:t>4/26/2021</a:t>
             </a:fld>
             <a:endParaRPr lang="en-US" dirty="0"/>
           </a:p>
@@ -1754,7 +1790,7 @@
           <a:p>
             <a:fld id="{58B8B8CD-F4D7-423F-966E-8A058DF60DFE}" type="datetime1">
               <a:rPr lang="en-US" smtClean="0"/>
-              <a:t>4/24/2021</a:t>
+              <a:t>4/26/2021</a:t>
             </a:fld>
             <a:endParaRPr lang="en-US" dirty="0"/>
           </a:p>
@@ -1884,7 +1920,7 @@
           <a:p>
             <a:fld id="{69E6E978-30DC-3E4F-AEEA-15C5B55C775D}" type="datetime1">
               <a:rPr lang="en-US" smtClean="0"/>
-              <a:t>4/24/2021</a:t>
+              <a:t>4/26/2021</a:t>
             </a:fld>
             <a:endParaRPr lang="en-US" dirty="0"/>
           </a:p>
@@ -2013,7 +2049,7 @@
           <a:p>
             <a:fld id="{EE032E31-25FA-5843-9B22-66794CE8E083}" type="datetime1">
               <a:rPr lang="en-US" smtClean="0"/>
-              <a:t>4/24/2021</a:t>
+              <a:t>4/26/2021</a:t>
             </a:fld>
             <a:endParaRPr lang="en-US" dirty="0"/>
           </a:p>
@@ -2565,7 +2601,7 @@
           <a:p>
             <a:fld id="{69CA356C-3E76-4361-8A29-C4D3A3799A48}" type="datetime1">
               <a:rPr lang="en-US" smtClean="0"/>
-              <a:t>4/24/2021</a:t>
+              <a:t>4/26/2021</a:t>
             </a:fld>
             <a:endParaRPr lang="en-US" dirty="0"/>
           </a:p>
@@ -4248,7 +4284,7 @@
           <a:p>
             <a:fld id="{BF95C05F-96E7-4A44-BBF7-5CCA7ADEC192}" type="datetime1">
               <a:rPr lang="en-US" smtClean="0"/>
-              <a:t>4/24/2021</a:t>
+              <a:t>4/26/2021</a:t>
             </a:fld>
             <a:endParaRPr lang="en-US" dirty="0"/>
           </a:p>
@@ -4472,7 +4508,7 @@
           <a:p>
             <a:fld id="{C5D0804D-3253-4D0C-8E4C-04BBAE4EBC72}" type="datetime1">
               <a:rPr lang="en-US" smtClean="0"/>
-              <a:t>4/24/2021</a:t>
+              <a:t>4/26/2021</a:t>
             </a:fld>
             <a:endParaRPr lang="en-US" dirty="0"/>
           </a:p>
@@ -5291,7 +5327,7 @@
           <a:p>
             <a:fld id="{13E81DC0-083F-46F7-A159-A864F704612E}" type="datetime1">
               <a:rPr lang="en-US" smtClean="0"/>
-              <a:t>4/24/2021</a:t>
+              <a:t>4/26/2021</a:t>
             </a:fld>
             <a:endParaRPr lang="en-US" dirty="0"/>
           </a:p>
@@ -6044,7 +6080,7 @@
             </a:pPr>
             <a:fld id="{17FDBBF9-841E-4DBE-9D68-070720FCDF71}" type="datetime1">
               <a:rPr lang="en-US" smtClean="0"/>
-              <a:t>4/24/2021</a:t>
+              <a:t>4/26/2021</a:t>
             </a:fld>
             <a:endParaRPr dirty="0"/>
           </a:p>
@@ -6164,7 +6200,7 @@
                   <a:srgbClr val="005A8C"/>
                 </a:solidFill>
               </a:rPr>
-              <a:t>4/24/2021</a:t>
+              <a:t>4/26/2021</a:t>
             </a:fld>
             <a:endParaRPr dirty="0">
               <a:solidFill>
@@ -6398,7 +6434,7 @@
           <a:p>
             <a:fld id="{0F8E20AF-A5CA-449B-87BE-6387B4C6D14D}" type="datetime1">
               <a:rPr lang="en-US" smtClean="0"/>
-              <a:t>4/24/2021</a:t>
+              <a:t>4/26/2021</a:t>
             </a:fld>
             <a:endParaRPr dirty="0"/>
           </a:p>
@@ -6596,7 +6632,7 @@
                   <a:prstClr val="white"/>
                 </a:solidFill>
               </a:rPr>
-              <a:t>4/24/2021</a:t>
+              <a:t>4/26/2021</a:t>
             </a:fld>
             <a:endParaRPr dirty="0">
               <a:solidFill>
@@ -6914,7 +6950,7 @@
                   <a:prstClr val="white"/>
                 </a:solidFill>
               </a:rPr>
-              <a:t>4/24/2021</a:t>
+              <a:t>4/26/2021</a:t>
             </a:fld>
             <a:endParaRPr dirty="0">
               <a:solidFill>
@@ -7228,7 +7264,7 @@
             </a:pPr>
             <a:fld id="{F0C93554-6F59-4CDE-943A-B5ECBD7D7E8C}" type="datetime1">
               <a:rPr lang="en-US" smtClean="0"/>
-              <a:t>4/24/2021</a:t>
+              <a:t>4/26/2021</a:t>
             </a:fld>
             <a:endParaRPr lang="en-US" dirty="0"/>
           </a:p>
@@ -7399,7 +7435,7 @@
           <a:p>
             <a:fld id="{B8164D97-5126-42B4-979F-10E2B637584F}" type="datetime1">
               <a:rPr lang="en-US" smtClean="0"/>
-              <a:t>4/24/2021</a:t>
+              <a:t>4/26/2021</a:t>
             </a:fld>
             <a:endParaRPr lang="en-US" dirty="0"/>
           </a:p>
@@ -7697,7 +7733,7 @@
           <a:p>
             <a:fld id="{99323AAB-B6A8-489B-9563-6C5CA35ECA06}" type="datetime1">
               <a:rPr lang="en-US" smtClean="0"/>
-              <a:t>4/24/2021</a:t>
+              <a:t>4/26/2021</a:t>
             </a:fld>
             <a:endParaRPr lang="en-US" dirty="0"/>
           </a:p>
@@ -7957,7 +7993,7 @@
           <a:p>
             <a:fld id="{7764B447-1BE3-4665-82DA-5995DB4C2E29}" type="datetime1">
               <a:rPr lang="en-US" smtClean="0"/>
-              <a:t>4/24/2021</a:t>
+              <a:t>4/26/2021</a:t>
             </a:fld>
             <a:endParaRPr lang="en-US" dirty="0"/>
           </a:p>
@@ -8176,7 +8212,7 @@
           <a:p>
             <a:fld id="{E4506C6D-77F3-418D-BF81-DBBF9FBEF6CB}" type="datetime1">
               <a:rPr lang="en-US" smtClean="0"/>
-              <a:t>4/24/2021</a:t>
+              <a:t>4/26/2021</a:t>
             </a:fld>
             <a:endParaRPr lang="en-US" dirty="0"/>
           </a:p>
@@ -9854,7 +9890,7 @@
           <a:p>
             <a:fld id="{BA7F4066-49E4-414A-90B2-7ABE78478270}" type="datetime1">
               <a:rPr lang="en-US" smtClean="0"/>
-              <a:t>4/24/2021</a:t>
+              <a:t>4/26/2021</a:t>
             </a:fld>
             <a:endParaRPr lang="en-US" dirty="0"/>
           </a:p>
@@ -10119,7 +10155,7 @@
           <a:p>
             <a:fld id="{770CB35E-DF6A-4AB5-9B94-DD24C8388384}" type="datetime1">
               <a:rPr lang="en-US" smtClean="0"/>
-              <a:t>4/24/2021</a:t>
+              <a:t>4/26/2021</a:t>
             </a:fld>
             <a:endParaRPr lang="en-US" dirty="0"/>
           </a:p>
@@ -20068,7 +20104,15 @@
                 </a:pPr>
                 <a:r>
                   <a:rPr lang="en-US" sz="1400" dirty="0"/>
-                  <a:t>McKesson can resubmit $3.9M in quarterly denied claims at Day 1 vs. an average current resolution timeframe of 35 days</a:t>
+                  <a:t>McKesson can </a:t>
+                </a:r>
+                <a:r>
+                  <a:rPr lang="en-US" sz="1400" b="1" dirty="0"/>
+                  <a:t>resubmit $3.9M </a:t>
+                </a:r>
+                <a:r>
+                  <a:rPr lang="en-US" sz="1400" dirty="0"/>
+                  <a:t>in quarterly denied claims at Day 1 vs. an average current resolution timeframe of 35 days</a:t>
                 </a:r>
               </a:p>
               <a:p>

</xml_diff>